<commit_message>
solvers: contraDC: update s-parameters generation to auto load INTERCONNECT
</commit_message>
<xml_diff>
--- a/SiEPIC_Photonics_Package/solvers_simulators/contraDC/Documentation/contraDC_Simulator.pptx
+++ b/SiEPIC_Photonics_Package/solvers_simulators/contraDC/Documentation/contraDC_Simulator.pptx
@@ -7,10 +7,10 @@
     <p:sldMasterId id="2147484533" r:id="rId3"/>
   </p:sldMasterIdLst>
   <p:notesMasterIdLst>
-    <p:notesMasterId r:id="rId14"/>
+    <p:notesMasterId r:id="rId15"/>
   </p:notesMasterIdLst>
   <p:handoutMasterIdLst>
-    <p:handoutMasterId r:id="rId15"/>
+    <p:handoutMasterId r:id="rId16"/>
   </p:handoutMasterIdLst>
   <p:sldIdLst>
     <p:sldId id="426" r:id="rId4"/>
@@ -21,8 +21,9 @@
     <p:sldId id="453" r:id="rId9"/>
     <p:sldId id="454" r:id="rId10"/>
     <p:sldId id="456" r:id="rId11"/>
-    <p:sldId id="455" r:id="rId12"/>
-    <p:sldId id="457" r:id="rId13"/>
+    <p:sldId id="458" r:id="rId12"/>
+    <p:sldId id="455" r:id="rId13"/>
+    <p:sldId id="457" r:id="rId14"/>
   </p:sldIdLst>
   <p:sldSz cx="9144000" cy="6858000" type="screen4x3"/>
   <p:notesSz cx="6858000" cy="9144000"/>
@@ -17546,7 +17547,7 @@
           <a:p>
             <a:r>
               <a:rPr lang="en-US" sz="2000" b="1" dirty="0" smtClean="0"/>
-              <a:t>Contributors</a:t>
+              <a:t>Next to come…</a:t>
             </a:r>
             <a:endParaRPr lang="en-US" sz="2000" b="1" dirty="0"/>
           </a:p>
@@ -17593,6 +17594,328 @@
               <a:rPr lang="en-US" altLang="zh-CN" smtClean="0"/>
               <a:pPr/>
               <a:t>10</a:t>
+            </a:fld>
+            <a:endParaRPr lang="en-US" altLang="zh-CN"/>
+          </a:p>
+        </p:txBody>
+      </p:sp>
+      <p:sp>
+        <p:nvSpPr>
+          <p:cNvPr id="6" name="TextBox 5"/>
+          <p:cNvSpPr txBox="1"/>
+          <p:nvPr/>
+        </p:nvSpPr>
+        <p:spPr>
+          <a:xfrm>
+            <a:off x="457200" y="1182103"/>
+            <a:ext cx="8579296" cy="1123384"/>
+          </a:xfrm>
+          <a:prstGeom prst="rect">
+            <a:avLst/>
+          </a:prstGeom>
+          <a:noFill/>
+        </p:spPr>
+        <p:txBody>
+          <a:bodyPr wrap="square" rtlCol="0">
+            <a:spAutoFit/>
+          </a:bodyPr>
+          <a:lstStyle/>
+          <a:p>
+            <a:pPr marL="285750" indent="-285750">
+              <a:buFont typeface="Arial" panose="020B0604020202020204" pitchFamily="34" charset="0"/>
+              <a:buChar char="•"/>
+            </a:pPr>
+            <a:r>
+              <a:rPr lang="en-US" dirty="0" smtClean="0">
+                <a:solidFill>
+                  <a:srgbClr val="002060"/>
+                </a:solidFill>
+              </a:rPr>
+              <a:t>Parameterized sidewall angle</a:t>
+            </a:r>
+          </a:p>
+          <a:p>
+            <a:pPr marL="285750" indent="-285750">
+              <a:buFont typeface="Arial" panose="020B0604020202020204" pitchFamily="34" charset="0"/>
+              <a:buChar char="•"/>
+            </a:pPr>
+            <a:endParaRPr lang="en-US" dirty="0" smtClean="0">
+              <a:solidFill>
+                <a:srgbClr val="002060"/>
+              </a:solidFill>
+            </a:endParaRPr>
+          </a:p>
+          <a:p>
+            <a:pPr marL="285750" indent="-285750">
+              <a:buFont typeface="Arial" panose="020B0604020202020204" pitchFamily="34" charset="0"/>
+              <a:buChar char="•"/>
+            </a:pPr>
+            <a:r>
+              <a:rPr lang="en-US" dirty="0" smtClean="0">
+                <a:solidFill>
+                  <a:srgbClr val="002060"/>
+                </a:solidFill>
+              </a:rPr>
+              <a:t>Model sensitivity to process variations and corner analysis</a:t>
+            </a:r>
+            <a:endParaRPr lang="en-US" dirty="0">
+              <a:solidFill>
+                <a:srgbClr val="002060"/>
+              </a:solidFill>
+            </a:endParaRPr>
+          </a:p>
+          <a:p>
+            <a:pPr marL="742950" lvl="1" indent="-285750">
+              <a:buFont typeface="Arial" panose="020B0604020202020204" pitchFamily="34" charset="0"/>
+              <a:buChar char="•"/>
+            </a:pPr>
+            <a:r>
+              <a:rPr lang="en-US" sz="1300" dirty="0" smtClean="0">
+                <a:solidFill>
+                  <a:srgbClr val="002060"/>
+                </a:solidFill>
+              </a:rPr>
+              <a:t>Conclusion: bandwidth is somewhat stable, central wavelength not quite.</a:t>
+            </a:r>
+          </a:p>
+        </p:txBody>
+      </p:sp>
+      <p:graphicFrame>
+        <p:nvGraphicFramePr>
+          <p:cNvPr id="7" name="Chart 6"/>
+          <p:cNvGraphicFramePr>
+            <a:graphicFrameLocks/>
+          </p:cNvGraphicFramePr>
+          <p:nvPr>
+            <p:extLst>
+              <p:ext uri="{D42A27DB-BD31-4B8C-83A1-F6EECF244321}">
+                <p14:modId xmlns:p14="http://schemas.microsoft.com/office/powerpoint/2010/main" val="258867846"/>
+              </p:ext>
+            </p:extLst>
+          </p:nvPr>
+        </p:nvGraphicFramePr>
+        <p:xfrm>
+          <a:off x="4198952" y="3438972"/>
+          <a:ext cx="5047476" cy="2568263"/>
+        </p:xfrm>
+        <a:graphic>
+          <a:graphicData uri="http://schemas.openxmlformats.org/drawingml/2006/chart">
+            <c:chart xmlns:c="http://schemas.openxmlformats.org/drawingml/2006/chart" xmlns:r="http://schemas.openxmlformats.org/officeDocument/2006/relationships" r:id="rId2"/>
+          </a:graphicData>
+        </a:graphic>
+      </p:graphicFrame>
+      <p:graphicFrame>
+        <p:nvGraphicFramePr>
+          <p:cNvPr id="9" name="Chart 8"/>
+          <p:cNvGraphicFramePr>
+            <a:graphicFrameLocks/>
+          </p:cNvGraphicFramePr>
+          <p:nvPr>
+            <p:extLst>
+              <p:ext uri="{D42A27DB-BD31-4B8C-83A1-F6EECF244321}">
+                <p14:modId xmlns:p14="http://schemas.microsoft.com/office/powerpoint/2010/main" val="1170035691"/>
+              </p:ext>
+            </p:extLst>
+          </p:nvPr>
+        </p:nvGraphicFramePr>
+        <p:xfrm>
+          <a:off x="-180528" y="3497693"/>
+          <a:ext cx="4464496" cy="2524043"/>
+        </p:xfrm>
+        <a:graphic>
+          <a:graphicData uri="http://schemas.openxmlformats.org/drawingml/2006/chart">
+            <c:chart xmlns:c="http://schemas.openxmlformats.org/drawingml/2006/chart" xmlns:r="http://schemas.openxmlformats.org/officeDocument/2006/relationships" r:id="rId3"/>
+          </a:graphicData>
+        </a:graphic>
+      </p:graphicFrame>
+      <p:sp>
+        <p:nvSpPr>
+          <p:cNvPr id="5" name="Rectangle 4"/>
+          <p:cNvSpPr/>
+          <p:nvPr/>
+        </p:nvSpPr>
+        <p:spPr>
+          <a:xfrm>
+            <a:off x="0" y="3496929"/>
+            <a:ext cx="4211960" cy="2452351"/>
+          </a:xfrm>
+          <a:prstGeom prst="rect">
+            <a:avLst/>
+          </a:prstGeom>
+          <a:noFill/>
+        </p:spPr>
+        <p:style>
+          <a:lnRef idx="2">
+            <a:schemeClr val="accent1">
+              <a:shade val="50000"/>
+            </a:schemeClr>
+          </a:lnRef>
+          <a:fillRef idx="1">
+            <a:schemeClr val="accent1"/>
+          </a:fillRef>
+          <a:effectRef idx="0">
+            <a:schemeClr val="accent1"/>
+          </a:effectRef>
+          <a:fontRef idx="minor">
+            <a:schemeClr val="lt1"/>
+          </a:fontRef>
+        </p:style>
+        <p:txBody>
+          <a:bodyPr rtlCol="0" anchor="ctr"/>
+          <a:lstStyle/>
+          <a:p>
+            <a:pPr algn="ctr"/>
+            <a:endParaRPr lang="en-US"/>
+          </a:p>
+        </p:txBody>
+      </p:sp>
+      <p:sp>
+        <p:nvSpPr>
+          <p:cNvPr id="13" name="Rectangle 12"/>
+          <p:cNvSpPr/>
+          <p:nvPr/>
+        </p:nvSpPr>
+        <p:spPr>
+          <a:xfrm>
+            <a:off x="4211960" y="3496929"/>
+            <a:ext cx="4932040" cy="2452351"/>
+          </a:xfrm>
+          <a:prstGeom prst="rect">
+            <a:avLst/>
+          </a:prstGeom>
+          <a:noFill/>
+        </p:spPr>
+        <p:style>
+          <a:lnRef idx="2">
+            <a:schemeClr val="accent1">
+              <a:shade val="50000"/>
+            </a:schemeClr>
+          </a:lnRef>
+          <a:fillRef idx="1">
+            <a:schemeClr val="accent1"/>
+          </a:fillRef>
+          <a:effectRef idx="0">
+            <a:schemeClr val="accent1"/>
+          </a:effectRef>
+          <a:fontRef idx="minor">
+            <a:schemeClr val="lt1"/>
+          </a:fontRef>
+        </p:style>
+        <p:txBody>
+          <a:bodyPr rtlCol="0" anchor="ctr"/>
+          <a:lstStyle/>
+          <a:p>
+            <a:pPr algn="ctr"/>
+            <a:endParaRPr lang="en-US"/>
+          </a:p>
+        </p:txBody>
+      </p:sp>
+    </p:spTree>
+    <p:extLst>
+      <p:ext uri="{BB962C8B-B14F-4D97-AF65-F5344CB8AC3E}">
+        <p14:creationId xmlns:p14="http://schemas.microsoft.com/office/powerpoint/2010/main" val="825652399"/>
+      </p:ext>
+    </p:extLst>
+  </p:cSld>
+  <p:clrMapOvr>
+    <a:masterClrMapping/>
+  </p:clrMapOvr>
+  <p:timing>
+    <p:tnLst>
+      <p:par>
+        <p:cTn id="1" dur="indefinite" restart="never" nodeType="tmRoot"/>
+      </p:par>
+    </p:tnLst>
+  </p:timing>
+</p:sld>
+</file>
+
+<file path=ppt/slides/slide11.xml><?xml version="1.0" encoding="utf-8"?>
+<p:sld xmlns:a="http://schemas.openxmlformats.org/drawingml/2006/main" xmlns:r="http://schemas.openxmlformats.org/officeDocument/2006/relationships" xmlns:p="http://schemas.openxmlformats.org/presentationml/2006/main">
+  <p:cSld>
+    <p:spTree>
+      <p:nvGrpSpPr>
+        <p:cNvPr id="1" name=""/>
+        <p:cNvGrpSpPr/>
+        <p:nvPr/>
+      </p:nvGrpSpPr>
+      <p:grpSpPr>
+        <a:xfrm>
+          <a:off x="0" y="0"/>
+          <a:ext cx="0" cy="0"/>
+          <a:chOff x="0" y="0"/>
+          <a:chExt cx="0" cy="0"/>
+        </a:xfrm>
+      </p:grpSpPr>
+      <p:sp>
+        <p:nvSpPr>
+          <p:cNvPr id="2" name="Title 1"/>
+          <p:cNvSpPr>
+            <a:spLocks noGrp="1"/>
+          </p:cNvSpPr>
+          <p:nvPr>
+            <p:ph type="title"/>
+          </p:nvPr>
+        </p:nvSpPr>
+        <p:spPr>
+          <a:xfrm>
+            <a:off x="457200" y="274638"/>
+            <a:ext cx="8686800" cy="1143000"/>
+          </a:xfrm>
+        </p:spPr>
+        <p:txBody>
+          <a:bodyPr/>
+          <a:lstStyle/>
+          <a:p>
+            <a:r>
+              <a:rPr lang="en-US" sz="2000" b="1" dirty="0" smtClean="0"/>
+              <a:t>Contributors</a:t>
+            </a:r>
+            <a:endParaRPr lang="en-US" sz="2000" b="1" dirty="0"/>
+          </a:p>
+        </p:txBody>
+      </p:sp>
+      <p:sp>
+        <p:nvSpPr>
+          <p:cNvPr id="3" name="Footer Placeholder 2"/>
+          <p:cNvSpPr>
+            <a:spLocks noGrp="1"/>
+          </p:cNvSpPr>
+          <p:nvPr>
+            <p:ph type="ftr" sz="quarter" idx="11"/>
+          </p:nvPr>
+        </p:nvSpPr>
+        <p:spPr/>
+        <p:txBody>
+          <a:bodyPr/>
+          <a:lstStyle/>
+          <a:p>
+            <a:r>
+              <a:rPr lang="en-US" altLang="zh-CN" dirty="0" smtClean="0"/>
+              <a:t>Hammood, Mustafa©2019</a:t>
+            </a:r>
+          </a:p>
+        </p:txBody>
+      </p:sp>
+      <p:sp>
+        <p:nvSpPr>
+          <p:cNvPr id="4" name="Slide Number Placeholder 3"/>
+          <p:cNvSpPr>
+            <a:spLocks noGrp="1"/>
+          </p:cNvSpPr>
+          <p:nvPr>
+            <p:ph type="sldNum" sz="quarter" idx="12"/>
+          </p:nvPr>
+        </p:nvSpPr>
+        <p:spPr/>
+        <p:txBody>
+          <a:bodyPr/>
+          <a:lstStyle/>
+          <a:p>
+            <a:fld id="{17BB8376-F12B-CB44-BE0C-DBE0A170CA7C}" type="slidenum">
+              <a:rPr lang="en-US" altLang="zh-CN" smtClean="0"/>
+              <a:pPr/>
+              <a:t>11</a:t>
             </a:fld>
             <a:endParaRPr lang="en-US" altLang="zh-CN"/>
           </a:p>
@@ -19322,7 +19645,7 @@
         <p:spPr>
           <a:xfrm>
             <a:off x="457200" y="857147"/>
-            <a:ext cx="8435280" cy="2862322"/>
+            <a:ext cx="8751290" cy="2862322"/>
           </a:xfrm>
           <a:prstGeom prst="rect">
             <a:avLst/>
@@ -19500,7 +19823,15 @@
                   <a:srgbClr val="002060"/>
                 </a:solidFill>
               </a:rPr>
-              <a:t>) means we have to sweep a large range to find where the contra-coupling forbidden band occurs. This is time and resource consuming.</a:t>
+              <a:t>) means we have to sweep a large range to find where the contra-coupling forbidden band occurs. This is time and resource consuming</a:t>
+            </a:r>
+            <a:r>
+              <a:rPr lang="en-US" dirty="0" smtClean="0">
+                <a:solidFill>
+                  <a:srgbClr val="002060"/>
+                </a:solidFill>
+              </a:rPr>
+              <a:t>. Below plot is generated from 20 points</a:t>
             </a:r>
             <a:endParaRPr lang="en-US" dirty="0">
               <a:solidFill>
@@ -19556,7 +19887,7 @@
         </p:blipFill>
         <p:spPr>
           <a:xfrm>
-            <a:off x="4583528" y="3429000"/>
+            <a:off x="4743575" y="3443986"/>
             <a:ext cx="4533650" cy="2592288"/>
           </a:xfrm>
           <a:prstGeom prst="rect">
@@ -20215,7 +20546,7 @@
         <p:spPr>
           <a:xfrm>
             <a:off x="457200" y="1182103"/>
-            <a:ext cx="8579296" cy="3693319"/>
+            <a:ext cx="8579296" cy="3970318"/>
           </a:xfrm>
           <a:prstGeom prst="rect">
             <a:avLst/>
@@ -20306,13 +20637,91 @@
               <a:buChar char="•"/>
             </a:pPr>
             <a:r>
+              <a:rPr lang="en-US" dirty="0">
+                <a:solidFill>
+                  <a:srgbClr val="002060"/>
+                </a:solidFill>
+              </a:rPr>
+              <a:t>Generates an S-parameter file (.</a:t>
+            </a:r>
+            <a:r>
+              <a:rPr lang="en-US" dirty="0" err="1">
+                <a:solidFill>
+                  <a:srgbClr val="002060"/>
+                </a:solidFill>
+              </a:rPr>
+              <a:t>dat</a:t>
+            </a:r>
+            <a:r>
+              <a:rPr lang="en-US" dirty="0">
+                <a:solidFill>
+                  <a:srgbClr val="002060"/>
+                </a:solidFill>
+              </a:rPr>
+              <a:t>) for circuit simulations</a:t>
+            </a:r>
+          </a:p>
+          <a:p>
+            <a:pPr marL="285750" indent="-285750">
+              <a:buFont typeface="Arial" panose="020B0604020202020204" pitchFamily="34" charset="0"/>
+              <a:buChar char="•"/>
+            </a:pPr>
+            <a:endParaRPr lang="en-US" dirty="0" smtClean="0">
+              <a:solidFill>
+                <a:srgbClr val="002060"/>
+              </a:solidFill>
+            </a:endParaRPr>
+          </a:p>
+          <a:p>
+            <a:pPr marL="285750" indent="-285750">
+              <a:buFont typeface="Arial" panose="020B0604020202020204" pitchFamily="34" charset="0"/>
+              <a:buChar char="•"/>
+            </a:pPr>
+            <a:r>
               <a:rPr lang="en-US" dirty="0" smtClean="0">
                 <a:solidFill>
                   <a:srgbClr val="002060"/>
                 </a:solidFill>
               </a:rPr>
-              <a:t>Dual polarizations: TE-TM</a:t>
-            </a:r>
+              <a:t>Dual </a:t>
+            </a:r>
+            <a:r>
+              <a:rPr lang="en-US" dirty="0" smtClean="0">
+                <a:solidFill>
+                  <a:srgbClr val="002060"/>
+                </a:solidFill>
+              </a:rPr>
+              <a:t>polarizations: </a:t>
+            </a:r>
+            <a:r>
+              <a:rPr lang="en-US" dirty="0" smtClean="0">
+                <a:solidFill>
+                  <a:srgbClr val="002060"/>
+                </a:solidFill>
+              </a:rPr>
+              <a:t>TE-TM, compact model includes </a:t>
+            </a:r>
+            <a:r>
+              <a:rPr lang="en-US" dirty="0" smtClean="0">
+                <a:solidFill>
+                  <a:srgbClr val="002060"/>
+                </a:solidFill>
+              </a:rPr>
+              <a:t>two-</a:t>
+            </a:r>
+            <a:r>
+              <a:rPr lang="en-US" dirty="0" smtClean="0">
+                <a:solidFill>
+                  <a:srgbClr val="002060"/>
+                </a:solidFill>
+              </a:rPr>
+              <a:t>modes support</a:t>
+            </a:r>
+            <a:endParaRPr lang="en-US" dirty="0" smtClean="0">
+              <a:solidFill>
+                <a:srgbClr val="002060"/>
+              </a:solidFill>
+            </a:endParaRPr>
           </a:p>
           <a:p>
             <a:pPr marL="285750" indent="-285750">
@@ -20336,8 +20745,45 @@
                   <a:srgbClr val="002060"/>
                 </a:solidFill>
               </a:rPr>
-              <a:t>New approach to find the bandgap and Kappa – reduce FDTD simulation time from more than 5 hours to an improved, less than 30 minutes</a:t>
-            </a:r>
+              <a:t>New approach to find the bandgap and Kappa – reduce FDTD simulation time from more than 5 hours to an improved, </a:t>
+            </a:r>
+            <a:r>
+              <a:rPr lang="en-US" dirty="0" smtClean="0">
+                <a:solidFill>
+                  <a:srgbClr val="002060"/>
+                </a:solidFill>
+              </a:rPr>
+              <a:t>to </a:t>
+            </a:r>
+            <a:r>
+              <a:rPr lang="en-US" dirty="0" smtClean="0">
+                <a:solidFill>
+                  <a:srgbClr val="002060"/>
+                </a:solidFill>
+              </a:rPr>
+              <a:t>less </a:t>
+            </a:r>
+            <a:r>
+              <a:rPr lang="en-US" dirty="0" smtClean="0">
+                <a:solidFill>
+                  <a:srgbClr val="002060"/>
+                </a:solidFill>
+              </a:rPr>
+              <a:t>than 30 </a:t>
+            </a:r>
+            <a:r>
+              <a:rPr lang="en-US" dirty="0" smtClean="0">
+                <a:solidFill>
+                  <a:srgbClr val="002060"/>
+                </a:solidFill>
+              </a:rPr>
+              <a:t>minutes. This was the simulation flow bottleneck.</a:t>
+            </a:r>
+            <a:endParaRPr lang="en-US" dirty="0" smtClean="0">
+              <a:solidFill>
+                <a:srgbClr val="002060"/>
+              </a:solidFill>
+            </a:endParaRPr>
           </a:p>
           <a:p>
             <a:pPr marL="285750" indent="-285750">
@@ -20365,51 +20811,6 @@
             </a:r>
           </a:p>
           <a:p>
-            <a:pPr marL="285750" indent="-285750">
-              <a:buFont typeface="Arial" panose="020B0604020202020204" pitchFamily="34" charset="0"/>
-              <a:buChar char="•"/>
-            </a:pPr>
-            <a:endParaRPr lang="en-US" dirty="0">
-              <a:solidFill>
-                <a:srgbClr val="002060"/>
-              </a:solidFill>
-            </a:endParaRPr>
-          </a:p>
-          <a:p>
-            <a:pPr marL="285750" indent="-285750">
-              <a:buFont typeface="Arial" panose="020B0604020202020204" pitchFamily="34" charset="0"/>
-              <a:buChar char="•"/>
-            </a:pPr>
-            <a:r>
-              <a:rPr lang="en-US" dirty="0" smtClean="0">
-                <a:solidFill>
-                  <a:srgbClr val="002060"/>
-                </a:solidFill>
-              </a:rPr>
-              <a:t>Generates an S-parameter file (.</a:t>
-            </a:r>
-            <a:r>
-              <a:rPr lang="en-US" dirty="0" err="1" smtClean="0">
-                <a:solidFill>
-                  <a:srgbClr val="002060"/>
-                </a:solidFill>
-              </a:rPr>
-              <a:t>dat</a:t>
-            </a:r>
-            <a:r>
-              <a:rPr lang="en-US" dirty="0" smtClean="0">
-                <a:solidFill>
-                  <a:srgbClr val="002060"/>
-                </a:solidFill>
-              </a:rPr>
-              <a:t>) for circuit simulations</a:t>
-            </a:r>
-          </a:p>
-          <a:p>
-            <a:pPr marL="285750" indent="-285750">
-              <a:buFont typeface="Arial" panose="020B0604020202020204" pitchFamily="34" charset="0"/>
-              <a:buChar char="•"/>
-            </a:pPr>
             <a:endParaRPr lang="en-US" dirty="0">
               <a:solidFill>
                 <a:srgbClr val="002060"/>
@@ -20496,9 +20897,13 @@
           <a:p>
             <a:r>
               <a:rPr lang="en-US" sz="2000" b="1" dirty="0" smtClean="0"/>
-              <a:t>Next to come…</a:t>
-            </a:r>
-            <a:endParaRPr lang="en-US" sz="2000" b="1" dirty="0"/>
+              <a:t>How to</a:t>
+            </a:r>
+            <a:r>
+              <a:rPr lang="en-US" sz="2000" dirty="0" smtClean="0"/>
+              <a:t>? Define physical parameters and simulation parameters</a:t>
+            </a:r>
+            <a:endParaRPr lang="en-US" sz="2000" dirty="0"/>
           </a:p>
         </p:txBody>
       </p:sp>
@@ -20548,145 +20953,40 @@
           </a:p>
         </p:txBody>
       </p:sp>
-      <p:sp>
-        <p:nvSpPr>
-          <p:cNvPr id="6" name="TextBox 5"/>
-          <p:cNvSpPr txBox="1"/>
+      <p:pic>
+        <p:nvPicPr>
+          <p:cNvPr id="5" name="Picture 4"/>
+          <p:cNvPicPr>
+            <a:picLocks noChangeAspect="1"/>
+          </p:cNvPicPr>
           <p:nvPr/>
-        </p:nvSpPr>
+        </p:nvPicPr>
+        <p:blipFill>
+          <a:blip r:embed="rId2"/>
+          <a:stretch>
+            <a:fillRect/>
+          </a:stretch>
+        </p:blipFill>
         <p:spPr>
           <a:xfrm>
-            <a:off x="457200" y="1182103"/>
-            <a:ext cx="8579296" cy="1123384"/>
+            <a:off x="6114684" y="1388277"/>
+            <a:ext cx="2941952" cy="3349495"/>
           </a:xfrm>
           <a:prstGeom prst="rect">
             <a:avLst/>
           </a:prstGeom>
-          <a:noFill/>
         </p:spPr>
-        <p:txBody>
-          <a:bodyPr wrap="square" rtlCol="0">
-            <a:spAutoFit/>
-          </a:bodyPr>
-          <a:lstStyle/>
-          <a:p>
-            <a:pPr marL="285750" indent="-285750">
-              <a:buFont typeface="Arial" panose="020B0604020202020204" pitchFamily="34" charset="0"/>
-              <a:buChar char="•"/>
-            </a:pPr>
-            <a:r>
-              <a:rPr lang="en-US" dirty="0" smtClean="0">
-                <a:solidFill>
-                  <a:srgbClr val="002060"/>
-                </a:solidFill>
-              </a:rPr>
-              <a:t>Parameterized sidewall angle</a:t>
-            </a:r>
-          </a:p>
-          <a:p>
-            <a:pPr marL="285750" indent="-285750">
-              <a:buFont typeface="Arial" panose="020B0604020202020204" pitchFamily="34" charset="0"/>
-              <a:buChar char="•"/>
-            </a:pPr>
-            <a:endParaRPr lang="en-US" dirty="0" smtClean="0">
-              <a:solidFill>
-                <a:srgbClr val="002060"/>
-              </a:solidFill>
-            </a:endParaRPr>
-          </a:p>
-          <a:p>
-            <a:pPr marL="285750" indent="-285750">
-              <a:buFont typeface="Arial" panose="020B0604020202020204" pitchFamily="34" charset="0"/>
-              <a:buChar char="•"/>
-            </a:pPr>
-            <a:r>
-              <a:rPr lang="en-US" dirty="0" smtClean="0">
-                <a:solidFill>
-                  <a:srgbClr val="002060"/>
-                </a:solidFill>
-              </a:rPr>
-              <a:t>Model sensitivity to process variations and corner analysis</a:t>
-            </a:r>
-            <a:endParaRPr lang="en-US" dirty="0">
-              <a:solidFill>
-                <a:srgbClr val="002060"/>
-              </a:solidFill>
-            </a:endParaRPr>
-          </a:p>
-          <a:p>
-            <a:pPr marL="742950" lvl="1" indent="-285750">
-              <a:buFont typeface="Arial" panose="020B0604020202020204" pitchFamily="34" charset="0"/>
-              <a:buChar char="•"/>
-            </a:pPr>
-            <a:r>
-              <a:rPr lang="en-US" sz="1300" dirty="0" smtClean="0">
-                <a:solidFill>
-                  <a:srgbClr val="002060"/>
-                </a:solidFill>
-              </a:rPr>
-              <a:t>Conclusion: bandwidth is somewhat stable, central wavelength not quite.</a:t>
-            </a:r>
-          </a:p>
-        </p:txBody>
-      </p:sp>
-      <p:graphicFrame>
-        <p:nvGraphicFramePr>
-          <p:cNvPr id="7" name="Chart 6"/>
-          <p:cNvGraphicFramePr>
-            <a:graphicFrameLocks/>
-          </p:cNvGraphicFramePr>
-          <p:nvPr>
-            <p:extLst>
-              <p:ext uri="{D42A27DB-BD31-4B8C-83A1-F6EECF244321}">
-                <p14:modId xmlns:p14="http://schemas.microsoft.com/office/powerpoint/2010/main" val="258867846"/>
-              </p:ext>
-            </p:extLst>
-          </p:nvPr>
-        </p:nvGraphicFramePr>
-        <p:xfrm>
-          <a:off x="4198952" y="3438972"/>
-          <a:ext cx="5047476" cy="2568263"/>
-        </p:xfrm>
-        <a:graphic>
-          <a:graphicData uri="http://schemas.openxmlformats.org/drawingml/2006/chart">
-            <c:chart xmlns:c="http://schemas.openxmlformats.org/drawingml/2006/chart" xmlns:r="http://schemas.openxmlformats.org/officeDocument/2006/relationships" r:id="rId2"/>
-          </a:graphicData>
-        </a:graphic>
-      </p:graphicFrame>
-      <p:graphicFrame>
-        <p:nvGraphicFramePr>
-          <p:cNvPr id="9" name="Chart 8"/>
-          <p:cNvGraphicFramePr>
-            <a:graphicFrameLocks/>
-          </p:cNvGraphicFramePr>
-          <p:nvPr>
-            <p:extLst>
-              <p:ext uri="{D42A27DB-BD31-4B8C-83A1-F6EECF244321}">
-                <p14:modId xmlns:p14="http://schemas.microsoft.com/office/powerpoint/2010/main" val="1170035691"/>
-              </p:ext>
-            </p:extLst>
-          </p:nvPr>
-        </p:nvGraphicFramePr>
-        <p:xfrm>
-          <a:off x="-180528" y="3497693"/>
-          <a:ext cx="4464496" cy="2524043"/>
-        </p:xfrm>
-        <a:graphic>
-          <a:graphicData uri="http://schemas.openxmlformats.org/drawingml/2006/chart">
-            <c:chart xmlns:c="http://schemas.openxmlformats.org/drawingml/2006/chart" xmlns:r="http://schemas.openxmlformats.org/officeDocument/2006/relationships" r:id="rId3"/>
-          </a:graphicData>
-        </a:graphic>
-      </p:graphicFrame>
-      <p:sp>
-        <p:nvSpPr>
-          <p:cNvPr id="5" name="Rectangle 4"/>
+      </p:pic>
+      <p:sp>
+        <p:nvSpPr>
+          <p:cNvPr id="7" name="Rectangle 6"/>
           <p:cNvSpPr/>
           <p:nvPr/>
         </p:nvSpPr>
         <p:spPr>
           <a:xfrm>
-            <a:off x="0" y="3496929"/>
-            <a:ext cx="4211960" cy="2452351"/>
+            <a:off x="6638652" y="4351293"/>
+            <a:ext cx="1533747" cy="386480"/>
           </a:xfrm>
           <a:prstGeom prst="rect">
             <a:avLst/>
@@ -20720,49 +21020,166 @@
       </p:sp>
       <p:sp>
         <p:nvSpPr>
-          <p:cNvPr id="13" name="Rectangle 12"/>
-          <p:cNvSpPr/>
+          <p:cNvPr id="8" name="TextBox 7"/>
+          <p:cNvSpPr txBox="1"/>
           <p:nvPr/>
         </p:nvSpPr>
         <p:spPr>
           <a:xfrm>
-            <a:off x="4211960" y="3496929"/>
-            <a:ext cx="4932040" cy="2452351"/>
+            <a:off x="8135608" y="4381504"/>
+            <a:ext cx="1121518" cy="369332"/>
           </a:xfrm>
           <a:prstGeom prst="rect">
             <a:avLst/>
           </a:prstGeom>
           <a:noFill/>
         </p:spPr>
-        <p:style>
-          <a:lnRef idx="2">
-            <a:schemeClr val="accent1">
-              <a:shade val="50000"/>
-            </a:schemeClr>
-          </a:lnRef>
-          <a:fillRef idx="1">
-            <a:schemeClr val="accent1"/>
-          </a:fillRef>
-          <a:effectRef idx="0">
-            <a:schemeClr val="accent1"/>
-          </a:effectRef>
-          <a:fontRef idx="minor">
-            <a:schemeClr val="lt1"/>
-          </a:fontRef>
-        </p:style>
-        <p:txBody>
-          <a:bodyPr rtlCol="0" anchor="ctr"/>
+        <p:txBody>
+          <a:bodyPr wrap="square" rtlCol="0">
+            <a:spAutoFit/>
+          </a:bodyPr>
           <a:lstStyle/>
           <a:p>
-            <a:pPr algn="ctr"/>
-            <a:endParaRPr lang="en-US"/>
-          </a:p>
-        </p:txBody>
-      </p:sp>
+            <a:r>
+              <a:rPr lang="en-US" dirty="0" smtClean="0"/>
+              <a:t>Optional</a:t>
+            </a:r>
+            <a:endParaRPr lang="en-US" dirty="0"/>
+          </a:p>
+        </p:txBody>
+      </p:sp>
+      <p:pic>
+        <p:nvPicPr>
+          <p:cNvPr id="9" name="Picture 8"/>
+          <p:cNvPicPr>
+            <a:picLocks noChangeAspect="1"/>
+          </p:cNvPicPr>
+          <p:nvPr/>
+        </p:nvPicPr>
+        <p:blipFill>
+          <a:blip r:embed="rId3"/>
+          <a:stretch>
+            <a:fillRect/>
+          </a:stretch>
+        </p:blipFill>
+        <p:spPr>
+          <a:xfrm>
+            <a:off x="6248400" y="4737772"/>
+            <a:ext cx="2808236" cy="1252158"/>
+          </a:xfrm>
+          <a:prstGeom prst="rect">
+            <a:avLst/>
+          </a:prstGeom>
+        </p:spPr>
+      </p:pic>
+      <p:sp>
+        <p:nvSpPr>
+          <p:cNvPr id="11" name="TextBox 10"/>
+          <p:cNvSpPr txBox="1"/>
+          <p:nvPr/>
+        </p:nvSpPr>
+        <p:spPr>
+          <a:xfrm>
+            <a:off x="457200" y="1182103"/>
+            <a:ext cx="5570120" cy="646331"/>
+          </a:xfrm>
+          <a:prstGeom prst="rect">
+            <a:avLst/>
+          </a:prstGeom>
+          <a:noFill/>
+        </p:spPr>
+        <p:txBody>
+          <a:bodyPr wrap="square" rtlCol="0">
+            <a:spAutoFit/>
+          </a:bodyPr>
+          <a:lstStyle/>
+          <a:p>
+            <a:pPr marL="285750" indent="-285750">
+              <a:buFont typeface="Arial" panose="020B0604020202020204" pitchFamily="34" charset="0"/>
+              <a:buChar char="•"/>
+            </a:pPr>
+            <a:r>
+              <a:rPr lang="en-US" dirty="0" smtClean="0">
+                <a:solidFill>
+                  <a:srgbClr val="002060"/>
+                </a:solidFill>
+              </a:rPr>
+              <a:t>Feed in the design parameters</a:t>
+            </a:r>
+          </a:p>
+          <a:p>
+            <a:pPr marL="742950" lvl="1" indent="-285750">
+              <a:buFont typeface="Arial" panose="020B0604020202020204" pitchFamily="34" charset="0"/>
+              <a:buChar char="•"/>
+            </a:pPr>
+            <a:r>
+              <a:rPr lang="en-US" dirty="0" smtClean="0">
+                <a:solidFill>
+                  <a:srgbClr val="002060"/>
+                </a:solidFill>
+              </a:rPr>
+              <a:t>Let the script run!</a:t>
+            </a:r>
+            <a:endParaRPr lang="en-US" dirty="0">
+              <a:solidFill>
+                <a:srgbClr val="002060"/>
+              </a:solidFill>
+            </a:endParaRPr>
+          </a:p>
+        </p:txBody>
+      </p:sp>
+      <p:pic>
+        <p:nvPicPr>
+          <p:cNvPr id="12" name="Picture 11"/>
+          <p:cNvPicPr>
+            <a:picLocks noChangeAspect="1"/>
+          </p:cNvPicPr>
+          <p:nvPr/>
+        </p:nvPicPr>
+        <p:blipFill>
+          <a:blip r:embed="rId4"/>
+          <a:stretch>
+            <a:fillRect/>
+          </a:stretch>
+        </p:blipFill>
+        <p:spPr>
+          <a:xfrm>
+            <a:off x="1815009" y="1751881"/>
+            <a:ext cx="3057700" cy="1968036"/>
+          </a:xfrm>
+          <a:prstGeom prst="rect">
+            <a:avLst/>
+          </a:prstGeom>
+        </p:spPr>
+      </p:pic>
+      <p:pic>
+        <p:nvPicPr>
+          <p:cNvPr id="14" name="Picture 13"/>
+          <p:cNvPicPr>
+            <a:picLocks noChangeAspect="1"/>
+          </p:cNvPicPr>
+          <p:nvPr/>
+        </p:nvPicPr>
+        <p:blipFill>
+          <a:blip r:embed="rId5"/>
+          <a:stretch>
+            <a:fillRect/>
+          </a:stretch>
+        </p:blipFill>
+        <p:spPr>
+          <a:xfrm>
+            <a:off x="1475656" y="3599308"/>
+            <a:ext cx="4140553" cy="2344906"/>
+          </a:xfrm>
+          <a:prstGeom prst="rect">
+            <a:avLst/>
+          </a:prstGeom>
+        </p:spPr>
+      </p:pic>
     </p:spTree>
     <p:extLst>
       <p:ext uri="{BB962C8B-B14F-4D97-AF65-F5344CB8AC3E}">
-        <p14:creationId xmlns:p14="http://schemas.microsoft.com/office/powerpoint/2010/main" val="825652399"/>
+        <p14:creationId xmlns:p14="http://schemas.microsoft.com/office/powerpoint/2010/main" val="1902652571"/>
       </p:ext>
     </p:extLst>
   </p:cSld>

</xml_diff>

<commit_message>
solvers: contraDC: added method to find kappa via EME analysis
</commit_message>
<xml_diff>
--- a/SiEPIC_Photonics_Package/solvers_simulators/contraDC/Documentation/contraDC_Simulator.pptx
+++ b/SiEPIC_Photonics_Package/solvers_simulators/contraDC/Documentation/contraDC_Simulator.pptx
@@ -7,10 +7,10 @@
     <p:sldMasterId id="2147484533" r:id="rId3"/>
   </p:sldMasterIdLst>
   <p:notesMasterIdLst>
-    <p:notesMasterId r:id="rId15"/>
+    <p:notesMasterId r:id="rId16"/>
   </p:notesMasterIdLst>
   <p:handoutMasterIdLst>
-    <p:handoutMasterId r:id="rId16"/>
+    <p:handoutMasterId r:id="rId17"/>
   </p:handoutMasterIdLst>
   <p:sldIdLst>
     <p:sldId id="426" r:id="rId4"/>
@@ -20,10 +20,11 @@
     <p:sldId id="452" r:id="rId8"/>
     <p:sldId id="453" r:id="rId9"/>
     <p:sldId id="454" r:id="rId10"/>
-    <p:sldId id="456" r:id="rId11"/>
-    <p:sldId id="458" r:id="rId12"/>
-    <p:sldId id="455" r:id="rId13"/>
-    <p:sldId id="457" r:id="rId14"/>
+    <p:sldId id="459" r:id="rId11"/>
+    <p:sldId id="456" r:id="rId12"/>
+    <p:sldId id="458" r:id="rId13"/>
+    <p:sldId id="455" r:id="rId14"/>
+    <p:sldId id="457" r:id="rId15"/>
   </p:sldIdLst>
   <p:sldSz cx="9144000" cy="6858000" type="screen4x3"/>
   <p:notesSz cx="6858000" cy="9144000"/>
@@ -227,9 +228,22 @@
               <a:t>height </a:t>
             </a:r>
             <a:r>
-              <a:rPr lang="en-US" dirty="0"/>
-              <a:t>variations</a:t>
-            </a:r>
+              <a:rPr lang="en-US" dirty="0" smtClean="0"/>
+              <a:t>variations </a:t>
+            </a:r>
+            <a:r>
+              <a:rPr lang="en-US" sz="1400" b="1" i="0" u="none" strike="noStrike" baseline="0" dirty="0" smtClean="0">
+                <a:effectLst/>
+              </a:rPr>
+              <a:t>(H)</a:t>
+            </a:r>
+            <a:r>
+              <a:rPr lang="en-US" sz="1400" b="0" i="0" u="none" strike="noStrike" baseline="0" dirty="0" smtClean="0">
+                <a:effectLst/>
+              </a:rPr>
+              <a:t> </a:t>
+            </a:r>
+            <a:endParaRPr lang="en-US" dirty="0"/>
           </a:p>
         </c:rich>
       </c:tx>
@@ -911,9 +925,22 @@
               <a:t>sidewall angle </a:t>
             </a:r>
             <a:r>
-              <a:rPr lang="en-US" dirty="0"/>
-              <a:t>variations</a:t>
-            </a:r>
+              <a:rPr lang="en-US" dirty="0" smtClean="0"/>
+              <a:t>variations (</a:t>
+            </a:r>
+            <a:r>
+              <a:rPr lang="el-GR" sz="1400" b="1" i="0" u="none" strike="noStrike" baseline="0" dirty="0" smtClean="0">
+                <a:effectLst/>
+              </a:rPr>
+              <a:t>θ</a:t>
+            </a:r>
+            <a:r>
+              <a:rPr lang="en-US" sz="1400" b="1" i="0" u="none" strike="noStrike" baseline="0" dirty="0" smtClean="0">
+                <a:effectLst/>
+              </a:rPr>
+              <a:t>)</a:t>
+            </a:r>
+            <a:endParaRPr lang="en-US" dirty="0"/>
           </a:p>
         </c:rich>
       </c:tx>
@@ -1325,8 +1352,25 @@
                       </a:schemeClr>
                     </a:solidFill>
                   </a:rPr>
-                  <a:t>Wavelength (nm)</a:t>
+                  <a:t>Wavelength (</a:t>
                 </a:r>
+                <a:r>
+                  <a:rPr lang="en-US" sz="1200" dirty="0" smtClean="0">
+                    <a:solidFill>
+                      <a:schemeClr val="accent1">
+                        <a:lumMod val="75000"/>
+                      </a:schemeClr>
+                    </a:solidFill>
+                  </a:rPr>
+                  <a:t>nm)</a:t>
+                </a:r>
+                <a:endParaRPr lang="en-US" sz="1200" dirty="0">
+                  <a:solidFill>
+                    <a:schemeClr val="accent1">
+                      <a:lumMod val="75000"/>
+                    </a:schemeClr>
+                  </a:solidFill>
+                </a:endParaRPr>
               </a:p>
             </c:rich>
           </c:tx>
@@ -17228,7 +17272,13 @@
               <a:rPr kumimoji="0" lang="en-US" altLang="zh-CN" sz="3200" b="1" dirty="0" smtClean="0">
                 <a:ea typeface="ＭＳ Ｐゴシック" charset="-128"/>
               </a:rPr>
-              <a:t>Modelling Contra-Directional Couplers</a:t>
+              <a:t>Optimizing The Contra-Directional Couplers Models</a:t>
+            </a:r>
+            <a:r>
+              <a:rPr kumimoji="0" lang="en-US" altLang="zh-CN" sz="3200" b="1" dirty="0" smtClean="0">
+                <a:ea typeface="ＭＳ Ｐゴシック" charset="-128"/>
+              </a:rPr>
+              <a:t/>
             </a:r>
             <a:br>
               <a:rPr kumimoji="0" lang="en-US" altLang="zh-CN" sz="3200" b="1" dirty="0" smtClean="0">
@@ -17462,7 +17512,18 @@
                 <a:ea typeface="Times New Roman" charset="0"/>
                 <a:cs typeface="Times New Roman" charset="0"/>
               </a:rPr>
-              <a:t>,</a:t>
+              <a:t>, </a:t>
+            </a:r>
+            <a:r>
+              <a:rPr kumimoji="0" lang="en-US" altLang="zh-CN" sz="2000" dirty="0" smtClean="0">
+                <a:solidFill>
+                  <a:schemeClr val="bg1"/>
+                </a:solidFill>
+                <a:latin typeface="+mj-lt"/>
+                <a:ea typeface="Times New Roman" charset="0"/>
+                <a:cs typeface="Times New Roman" charset="0"/>
+              </a:rPr>
+              <a:t>Ajay Mistry, Stephen Lin</a:t>
             </a:r>
             <a:endParaRPr kumimoji="0" lang="en-US" altLang="zh-CN" sz="1600" dirty="0" smtClean="0">
               <a:solidFill>
@@ -17547,9 +17608,13 @@
           <a:p>
             <a:r>
               <a:rPr lang="en-US" sz="2000" b="1" dirty="0" smtClean="0"/>
-              <a:t>Next to come…</a:t>
-            </a:r>
-            <a:endParaRPr lang="en-US" sz="2000" b="1" dirty="0"/>
+              <a:t>How to</a:t>
+            </a:r>
+            <a:r>
+              <a:rPr lang="en-US" sz="2000" dirty="0" smtClean="0"/>
+              <a:t>? Define physical parameters and simulation parameters</a:t>
+            </a:r>
+            <a:endParaRPr lang="en-US" sz="2000" dirty="0"/>
           </a:p>
         </p:txBody>
       </p:sp>
@@ -17599,145 +17664,40 @@
           </a:p>
         </p:txBody>
       </p:sp>
-      <p:sp>
-        <p:nvSpPr>
-          <p:cNvPr id="6" name="TextBox 5"/>
-          <p:cNvSpPr txBox="1"/>
+      <p:pic>
+        <p:nvPicPr>
+          <p:cNvPr id="5" name="Picture 4"/>
+          <p:cNvPicPr>
+            <a:picLocks noChangeAspect="1"/>
+          </p:cNvPicPr>
           <p:nvPr/>
-        </p:nvSpPr>
+        </p:nvPicPr>
+        <p:blipFill>
+          <a:blip r:embed="rId2"/>
+          <a:stretch>
+            <a:fillRect/>
+          </a:stretch>
+        </p:blipFill>
         <p:spPr>
           <a:xfrm>
-            <a:off x="457200" y="1182103"/>
-            <a:ext cx="8579296" cy="1123384"/>
+            <a:off x="6114684" y="1388277"/>
+            <a:ext cx="2941952" cy="3349495"/>
           </a:xfrm>
           <a:prstGeom prst="rect">
             <a:avLst/>
           </a:prstGeom>
-          <a:noFill/>
         </p:spPr>
-        <p:txBody>
-          <a:bodyPr wrap="square" rtlCol="0">
-            <a:spAutoFit/>
-          </a:bodyPr>
-          <a:lstStyle/>
-          <a:p>
-            <a:pPr marL="285750" indent="-285750">
-              <a:buFont typeface="Arial" panose="020B0604020202020204" pitchFamily="34" charset="0"/>
-              <a:buChar char="•"/>
-            </a:pPr>
-            <a:r>
-              <a:rPr lang="en-US" dirty="0" smtClean="0">
-                <a:solidFill>
-                  <a:srgbClr val="002060"/>
-                </a:solidFill>
-              </a:rPr>
-              <a:t>Parameterized sidewall angle</a:t>
-            </a:r>
-          </a:p>
-          <a:p>
-            <a:pPr marL="285750" indent="-285750">
-              <a:buFont typeface="Arial" panose="020B0604020202020204" pitchFamily="34" charset="0"/>
-              <a:buChar char="•"/>
-            </a:pPr>
-            <a:endParaRPr lang="en-US" dirty="0" smtClean="0">
-              <a:solidFill>
-                <a:srgbClr val="002060"/>
-              </a:solidFill>
-            </a:endParaRPr>
-          </a:p>
-          <a:p>
-            <a:pPr marL="285750" indent="-285750">
-              <a:buFont typeface="Arial" panose="020B0604020202020204" pitchFamily="34" charset="0"/>
-              <a:buChar char="•"/>
-            </a:pPr>
-            <a:r>
-              <a:rPr lang="en-US" dirty="0" smtClean="0">
-                <a:solidFill>
-                  <a:srgbClr val="002060"/>
-                </a:solidFill>
-              </a:rPr>
-              <a:t>Model sensitivity to process variations and corner analysis</a:t>
-            </a:r>
-            <a:endParaRPr lang="en-US" dirty="0">
-              <a:solidFill>
-                <a:srgbClr val="002060"/>
-              </a:solidFill>
-            </a:endParaRPr>
-          </a:p>
-          <a:p>
-            <a:pPr marL="742950" lvl="1" indent="-285750">
-              <a:buFont typeface="Arial" panose="020B0604020202020204" pitchFamily="34" charset="0"/>
-              <a:buChar char="•"/>
-            </a:pPr>
-            <a:r>
-              <a:rPr lang="en-US" sz="1300" dirty="0" smtClean="0">
-                <a:solidFill>
-                  <a:srgbClr val="002060"/>
-                </a:solidFill>
-              </a:rPr>
-              <a:t>Conclusion: bandwidth is somewhat stable, central wavelength not quite.</a:t>
-            </a:r>
-          </a:p>
-        </p:txBody>
-      </p:sp>
-      <p:graphicFrame>
-        <p:nvGraphicFramePr>
-          <p:cNvPr id="7" name="Chart 6"/>
-          <p:cNvGraphicFramePr>
-            <a:graphicFrameLocks/>
-          </p:cNvGraphicFramePr>
-          <p:nvPr>
-            <p:extLst>
-              <p:ext uri="{D42A27DB-BD31-4B8C-83A1-F6EECF244321}">
-                <p14:modId xmlns:p14="http://schemas.microsoft.com/office/powerpoint/2010/main" val="258867846"/>
-              </p:ext>
-            </p:extLst>
-          </p:nvPr>
-        </p:nvGraphicFramePr>
-        <p:xfrm>
-          <a:off x="4198952" y="3438972"/>
-          <a:ext cx="5047476" cy="2568263"/>
-        </p:xfrm>
-        <a:graphic>
-          <a:graphicData uri="http://schemas.openxmlformats.org/drawingml/2006/chart">
-            <c:chart xmlns:c="http://schemas.openxmlformats.org/drawingml/2006/chart" xmlns:r="http://schemas.openxmlformats.org/officeDocument/2006/relationships" r:id="rId2"/>
-          </a:graphicData>
-        </a:graphic>
-      </p:graphicFrame>
-      <p:graphicFrame>
-        <p:nvGraphicFramePr>
-          <p:cNvPr id="9" name="Chart 8"/>
-          <p:cNvGraphicFramePr>
-            <a:graphicFrameLocks/>
-          </p:cNvGraphicFramePr>
-          <p:nvPr>
-            <p:extLst>
-              <p:ext uri="{D42A27DB-BD31-4B8C-83A1-F6EECF244321}">
-                <p14:modId xmlns:p14="http://schemas.microsoft.com/office/powerpoint/2010/main" val="1170035691"/>
-              </p:ext>
-            </p:extLst>
-          </p:nvPr>
-        </p:nvGraphicFramePr>
-        <p:xfrm>
-          <a:off x="-180528" y="3497693"/>
-          <a:ext cx="4464496" cy="2524043"/>
-        </p:xfrm>
-        <a:graphic>
-          <a:graphicData uri="http://schemas.openxmlformats.org/drawingml/2006/chart">
-            <c:chart xmlns:c="http://schemas.openxmlformats.org/drawingml/2006/chart" xmlns:r="http://schemas.openxmlformats.org/officeDocument/2006/relationships" r:id="rId3"/>
-          </a:graphicData>
-        </a:graphic>
-      </p:graphicFrame>
-      <p:sp>
-        <p:nvSpPr>
-          <p:cNvPr id="5" name="Rectangle 4"/>
+      </p:pic>
+      <p:sp>
+        <p:nvSpPr>
+          <p:cNvPr id="7" name="Rectangle 6"/>
           <p:cNvSpPr/>
           <p:nvPr/>
         </p:nvSpPr>
         <p:spPr>
           <a:xfrm>
-            <a:off x="0" y="3496929"/>
-            <a:ext cx="4211960" cy="2452351"/>
+            <a:off x="6638652" y="4351293"/>
+            <a:ext cx="1533747" cy="386480"/>
           </a:xfrm>
           <a:prstGeom prst="rect">
             <a:avLst/>
@@ -17771,49 +17731,166 @@
       </p:sp>
       <p:sp>
         <p:nvSpPr>
-          <p:cNvPr id="13" name="Rectangle 12"/>
-          <p:cNvSpPr/>
+          <p:cNvPr id="8" name="TextBox 7"/>
+          <p:cNvSpPr txBox="1"/>
           <p:nvPr/>
         </p:nvSpPr>
         <p:spPr>
           <a:xfrm>
-            <a:off x="4211960" y="3496929"/>
-            <a:ext cx="4932040" cy="2452351"/>
+            <a:off x="8135608" y="4381504"/>
+            <a:ext cx="1121518" cy="369332"/>
           </a:xfrm>
           <a:prstGeom prst="rect">
             <a:avLst/>
           </a:prstGeom>
           <a:noFill/>
         </p:spPr>
-        <p:style>
-          <a:lnRef idx="2">
-            <a:schemeClr val="accent1">
-              <a:shade val="50000"/>
-            </a:schemeClr>
-          </a:lnRef>
-          <a:fillRef idx="1">
-            <a:schemeClr val="accent1"/>
-          </a:fillRef>
-          <a:effectRef idx="0">
-            <a:schemeClr val="accent1"/>
-          </a:effectRef>
-          <a:fontRef idx="minor">
-            <a:schemeClr val="lt1"/>
-          </a:fontRef>
-        </p:style>
-        <p:txBody>
-          <a:bodyPr rtlCol="0" anchor="ctr"/>
+        <p:txBody>
+          <a:bodyPr wrap="square" rtlCol="0">
+            <a:spAutoFit/>
+          </a:bodyPr>
           <a:lstStyle/>
           <a:p>
-            <a:pPr algn="ctr"/>
-            <a:endParaRPr lang="en-US"/>
-          </a:p>
-        </p:txBody>
-      </p:sp>
+            <a:r>
+              <a:rPr lang="en-US" dirty="0" smtClean="0"/>
+              <a:t>Optional</a:t>
+            </a:r>
+            <a:endParaRPr lang="en-US" dirty="0"/>
+          </a:p>
+        </p:txBody>
+      </p:sp>
+      <p:pic>
+        <p:nvPicPr>
+          <p:cNvPr id="9" name="Picture 8"/>
+          <p:cNvPicPr>
+            <a:picLocks noChangeAspect="1"/>
+          </p:cNvPicPr>
+          <p:nvPr/>
+        </p:nvPicPr>
+        <p:blipFill>
+          <a:blip r:embed="rId3"/>
+          <a:stretch>
+            <a:fillRect/>
+          </a:stretch>
+        </p:blipFill>
+        <p:spPr>
+          <a:xfrm>
+            <a:off x="6248400" y="4737772"/>
+            <a:ext cx="2808236" cy="1252158"/>
+          </a:xfrm>
+          <a:prstGeom prst="rect">
+            <a:avLst/>
+          </a:prstGeom>
+        </p:spPr>
+      </p:pic>
+      <p:sp>
+        <p:nvSpPr>
+          <p:cNvPr id="11" name="TextBox 10"/>
+          <p:cNvSpPr txBox="1"/>
+          <p:nvPr/>
+        </p:nvSpPr>
+        <p:spPr>
+          <a:xfrm>
+            <a:off x="457200" y="1182103"/>
+            <a:ext cx="5570120" cy="646331"/>
+          </a:xfrm>
+          <a:prstGeom prst="rect">
+            <a:avLst/>
+          </a:prstGeom>
+          <a:noFill/>
+        </p:spPr>
+        <p:txBody>
+          <a:bodyPr wrap="square" rtlCol="0">
+            <a:spAutoFit/>
+          </a:bodyPr>
+          <a:lstStyle/>
+          <a:p>
+            <a:pPr marL="285750" indent="-285750">
+              <a:buFont typeface="Arial" panose="020B0604020202020204" pitchFamily="34" charset="0"/>
+              <a:buChar char="•"/>
+            </a:pPr>
+            <a:r>
+              <a:rPr lang="en-US" dirty="0" smtClean="0">
+                <a:solidFill>
+                  <a:srgbClr val="002060"/>
+                </a:solidFill>
+              </a:rPr>
+              <a:t>Feed in the design parameters</a:t>
+            </a:r>
+          </a:p>
+          <a:p>
+            <a:pPr marL="742950" lvl="1" indent="-285750">
+              <a:buFont typeface="Arial" panose="020B0604020202020204" pitchFamily="34" charset="0"/>
+              <a:buChar char="•"/>
+            </a:pPr>
+            <a:r>
+              <a:rPr lang="en-US" dirty="0" smtClean="0">
+                <a:solidFill>
+                  <a:srgbClr val="002060"/>
+                </a:solidFill>
+              </a:rPr>
+              <a:t>Let the script run!</a:t>
+            </a:r>
+            <a:endParaRPr lang="en-US" dirty="0">
+              <a:solidFill>
+                <a:srgbClr val="002060"/>
+              </a:solidFill>
+            </a:endParaRPr>
+          </a:p>
+        </p:txBody>
+      </p:sp>
+      <p:pic>
+        <p:nvPicPr>
+          <p:cNvPr id="12" name="Picture 11"/>
+          <p:cNvPicPr>
+            <a:picLocks noChangeAspect="1"/>
+          </p:cNvPicPr>
+          <p:nvPr/>
+        </p:nvPicPr>
+        <p:blipFill>
+          <a:blip r:embed="rId4"/>
+          <a:stretch>
+            <a:fillRect/>
+          </a:stretch>
+        </p:blipFill>
+        <p:spPr>
+          <a:xfrm>
+            <a:off x="1815009" y="1751881"/>
+            <a:ext cx="3057700" cy="1968036"/>
+          </a:xfrm>
+          <a:prstGeom prst="rect">
+            <a:avLst/>
+          </a:prstGeom>
+        </p:spPr>
+      </p:pic>
+      <p:pic>
+        <p:nvPicPr>
+          <p:cNvPr id="14" name="Picture 13"/>
+          <p:cNvPicPr>
+            <a:picLocks noChangeAspect="1"/>
+          </p:cNvPicPr>
+          <p:nvPr/>
+        </p:nvPicPr>
+        <p:blipFill>
+          <a:blip r:embed="rId5"/>
+          <a:stretch>
+            <a:fillRect/>
+          </a:stretch>
+        </p:blipFill>
+        <p:spPr>
+          <a:xfrm>
+            <a:off x="1475656" y="3599308"/>
+            <a:ext cx="4140553" cy="2344906"/>
+          </a:xfrm>
+          <a:prstGeom prst="rect">
+            <a:avLst/>
+          </a:prstGeom>
+        </p:spPr>
+      </p:pic>
     </p:spTree>
     <p:extLst>
       <p:ext uri="{BB962C8B-B14F-4D97-AF65-F5344CB8AC3E}">
-        <p14:creationId xmlns:p14="http://schemas.microsoft.com/office/powerpoint/2010/main" val="825652399"/>
+        <p14:creationId xmlns:p14="http://schemas.microsoft.com/office/powerpoint/2010/main" val="1902652571"/>
       </p:ext>
     </p:extLst>
   </p:cSld>
@@ -17869,7 +17946,7 @@
           <a:p>
             <a:r>
               <a:rPr lang="en-US" sz="2000" b="1" dirty="0" smtClean="0"/>
-              <a:t>Contributors</a:t>
+              <a:t>Further improvements can be done on…</a:t>
             </a:r>
             <a:endParaRPr lang="en-US" sz="2000" b="1" dirty="0"/>
           </a:p>
@@ -17916,6 +17993,478 @@
               <a:rPr lang="en-US" altLang="zh-CN" smtClean="0"/>
               <a:pPr/>
               <a:t>11</a:t>
+            </a:fld>
+            <a:endParaRPr lang="en-US" altLang="zh-CN"/>
+          </a:p>
+        </p:txBody>
+      </p:sp>
+      <p:sp>
+        <p:nvSpPr>
+          <p:cNvPr id="6" name="TextBox 5"/>
+          <p:cNvSpPr txBox="1"/>
+          <p:nvPr/>
+        </p:nvSpPr>
+        <p:spPr>
+          <a:xfrm>
+            <a:off x="457200" y="1182103"/>
+            <a:ext cx="8579296" cy="1523494"/>
+          </a:xfrm>
+          <a:prstGeom prst="rect">
+            <a:avLst/>
+          </a:prstGeom>
+          <a:noFill/>
+        </p:spPr>
+        <p:txBody>
+          <a:bodyPr wrap="square" rtlCol="0">
+            <a:spAutoFit/>
+          </a:bodyPr>
+          <a:lstStyle/>
+          <a:p>
+            <a:pPr marL="285750" indent="-285750">
+              <a:buFont typeface="Arial" panose="020B0604020202020204" pitchFamily="34" charset="0"/>
+              <a:buChar char="•"/>
+            </a:pPr>
+            <a:r>
+              <a:rPr lang="en-US" dirty="0" smtClean="0">
+                <a:solidFill>
+                  <a:srgbClr val="002060"/>
+                </a:solidFill>
+              </a:rPr>
+              <a:t>Parameterized sidewall angle</a:t>
+            </a:r>
+          </a:p>
+          <a:p>
+            <a:pPr marL="285750" indent="-285750">
+              <a:buFont typeface="Arial" panose="020B0604020202020204" pitchFamily="34" charset="0"/>
+              <a:buChar char="•"/>
+            </a:pPr>
+            <a:endParaRPr lang="en-US" dirty="0" smtClean="0">
+              <a:solidFill>
+                <a:srgbClr val="002060"/>
+              </a:solidFill>
+            </a:endParaRPr>
+          </a:p>
+          <a:p>
+            <a:pPr marL="285750" indent="-285750">
+              <a:buFont typeface="Arial" panose="020B0604020202020204" pitchFamily="34" charset="0"/>
+              <a:buChar char="•"/>
+            </a:pPr>
+            <a:r>
+              <a:rPr lang="en-US" dirty="0" smtClean="0">
+                <a:solidFill>
+                  <a:srgbClr val="002060"/>
+                </a:solidFill>
+              </a:rPr>
+              <a:t>Model sensitivity to process variations and corner analysis</a:t>
+            </a:r>
+            <a:endParaRPr lang="en-US" dirty="0">
+              <a:solidFill>
+                <a:srgbClr val="002060"/>
+              </a:solidFill>
+            </a:endParaRPr>
+          </a:p>
+          <a:p>
+            <a:pPr marL="742950" lvl="1" indent="-285750">
+              <a:buFont typeface="Arial" panose="020B0604020202020204" pitchFamily="34" charset="0"/>
+              <a:buChar char="•"/>
+            </a:pPr>
+            <a:r>
+              <a:rPr lang="en-US" sz="1300" dirty="0" smtClean="0">
+                <a:solidFill>
+                  <a:srgbClr val="002060"/>
+                </a:solidFill>
+              </a:rPr>
+              <a:t>Conclusion: bandwidth is somewhat stable, central wavelength not quite</a:t>
+            </a:r>
+            <a:r>
+              <a:rPr lang="en-US" sz="1300" dirty="0" smtClean="0">
+                <a:solidFill>
+                  <a:srgbClr val="002060"/>
+                </a:solidFill>
+              </a:rPr>
+              <a:t>.</a:t>
+            </a:r>
+          </a:p>
+          <a:p>
+            <a:pPr marL="742950" lvl="1" indent="-285750">
+              <a:buFont typeface="Arial" panose="020B0604020202020204" pitchFamily="34" charset="0"/>
+              <a:buChar char="•"/>
+            </a:pPr>
+            <a:endParaRPr lang="en-US" sz="1300" dirty="0">
+              <a:solidFill>
+                <a:srgbClr val="002060"/>
+              </a:solidFill>
+            </a:endParaRPr>
+          </a:p>
+          <a:p>
+            <a:pPr marL="285750" indent="-285750">
+              <a:buFont typeface="Arial" panose="020B0604020202020204" pitchFamily="34" charset="0"/>
+              <a:buChar char="•"/>
+            </a:pPr>
+            <a:r>
+              <a:rPr lang="en-US" sz="1300" b="1" dirty="0" smtClean="0">
+                <a:solidFill>
+                  <a:srgbClr val="002060"/>
+                </a:solidFill>
+              </a:rPr>
+              <a:t>Segmented kappa: </a:t>
+            </a:r>
+            <a:r>
+              <a:rPr lang="en-US" sz="1300" dirty="0" smtClean="0">
+                <a:solidFill>
+                  <a:srgbClr val="002060"/>
+                </a:solidFill>
+              </a:rPr>
+              <a:t>Wavelength-dependent coupling coefficient</a:t>
+            </a:r>
+            <a:endParaRPr lang="en-US" sz="1300" dirty="0" smtClean="0">
+              <a:solidFill>
+                <a:srgbClr val="002060"/>
+              </a:solidFill>
+            </a:endParaRPr>
+          </a:p>
+        </p:txBody>
+      </p:sp>
+      <p:graphicFrame>
+        <p:nvGraphicFramePr>
+          <p:cNvPr id="7" name="Chart 6"/>
+          <p:cNvGraphicFramePr>
+            <a:graphicFrameLocks/>
+          </p:cNvGraphicFramePr>
+          <p:nvPr>
+            <p:extLst>
+              <p:ext uri="{D42A27DB-BD31-4B8C-83A1-F6EECF244321}">
+                <p14:modId xmlns:p14="http://schemas.microsoft.com/office/powerpoint/2010/main" val="3862127267"/>
+              </p:ext>
+            </p:extLst>
+          </p:nvPr>
+        </p:nvGraphicFramePr>
+        <p:xfrm>
+          <a:off x="4198952" y="3438972"/>
+          <a:ext cx="5047476" cy="2568263"/>
+        </p:xfrm>
+        <a:graphic>
+          <a:graphicData uri="http://schemas.openxmlformats.org/drawingml/2006/chart">
+            <c:chart xmlns:c="http://schemas.openxmlformats.org/drawingml/2006/chart" xmlns:r="http://schemas.openxmlformats.org/officeDocument/2006/relationships" r:id="rId2"/>
+          </a:graphicData>
+        </a:graphic>
+      </p:graphicFrame>
+      <p:graphicFrame>
+        <p:nvGraphicFramePr>
+          <p:cNvPr id="9" name="Chart 8"/>
+          <p:cNvGraphicFramePr>
+            <a:graphicFrameLocks/>
+          </p:cNvGraphicFramePr>
+          <p:nvPr>
+            <p:extLst>
+              <p:ext uri="{D42A27DB-BD31-4B8C-83A1-F6EECF244321}">
+                <p14:modId xmlns:p14="http://schemas.microsoft.com/office/powerpoint/2010/main" val="2293984574"/>
+              </p:ext>
+            </p:extLst>
+          </p:nvPr>
+        </p:nvGraphicFramePr>
+        <p:xfrm>
+          <a:off x="-180528" y="3497693"/>
+          <a:ext cx="4464496" cy="2524043"/>
+        </p:xfrm>
+        <a:graphic>
+          <a:graphicData uri="http://schemas.openxmlformats.org/drawingml/2006/chart">
+            <c:chart xmlns:c="http://schemas.openxmlformats.org/drawingml/2006/chart" xmlns:r="http://schemas.openxmlformats.org/officeDocument/2006/relationships" r:id="rId3"/>
+          </a:graphicData>
+        </a:graphic>
+      </p:graphicFrame>
+      <p:sp>
+        <p:nvSpPr>
+          <p:cNvPr id="5" name="Rectangle 4"/>
+          <p:cNvSpPr/>
+          <p:nvPr/>
+        </p:nvSpPr>
+        <p:spPr>
+          <a:xfrm>
+            <a:off x="0" y="3496929"/>
+            <a:ext cx="4211960" cy="2452351"/>
+          </a:xfrm>
+          <a:prstGeom prst="rect">
+            <a:avLst/>
+          </a:prstGeom>
+          <a:noFill/>
+        </p:spPr>
+        <p:style>
+          <a:lnRef idx="2">
+            <a:schemeClr val="accent1">
+              <a:shade val="50000"/>
+            </a:schemeClr>
+          </a:lnRef>
+          <a:fillRef idx="1">
+            <a:schemeClr val="accent1"/>
+          </a:fillRef>
+          <a:effectRef idx="0">
+            <a:schemeClr val="accent1"/>
+          </a:effectRef>
+          <a:fontRef idx="minor">
+            <a:schemeClr val="lt1"/>
+          </a:fontRef>
+        </p:style>
+        <p:txBody>
+          <a:bodyPr rtlCol="0" anchor="ctr"/>
+          <a:lstStyle/>
+          <a:p>
+            <a:pPr algn="ctr"/>
+            <a:endParaRPr lang="en-US"/>
+          </a:p>
+        </p:txBody>
+      </p:sp>
+      <p:sp>
+        <p:nvSpPr>
+          <p:cNvPr id="13" name="Rectangle 12"/>
+          <p:cNvSpPr/>
+          <p:nvPr/>
+        </p:nvSpPr>
+        <p:spPr>
+          <a:xfrm>
+            <a:off x="4211960" y="3496929"/>
+            <a:ext cx="4932040" cy="2452351"/>
+          </a:xfrm>
+          <a:prstGeom prst="rect">
+            <a:avLst/>
+          </a:prstGeom>
+          <a:noFill/>
+        </p:spPr>
+        <p:style>
+          <a:lnRef idx="2">
+            <a:schemeClr val="accent1">
+              <a:shade val="50000"/>
+            </a:schemeClr>
+          </a:lnRef>
+          <a:fillRef idx="1">
+            <a:schemeClr val="accent1"/>
+          </a:fillRef>
+          <a:effectRef idx="0">
+            <a:schemeClr val="accent1"/>
+          </a:effectRef>
+          <a:fontRef idx="minor">
+            <a:schemeClr val="lt1"/>
+          </a:fontRef>
+        </p:style>
+        <p:txBody>
+          <a:bodyPr rtlCol="0" anchor="ctr"/>
+          <a:lstStyle/>
+          <a:p>
+            <a:pPr algn="ctr"/>
+            <a:endParaRPr lang="en-US"/>
+          </a:p>
+        </p:txBody>
+      </p:sp>
+      <p:sp>
+        <p:nvSpPr>
+          <p:cNvPr id="8" name="TextBox 7"/>
+          <p:cNvSpPr txBox="1"/>
+          <p:nvPr/>
+        </p:nvSpPr>
+        <p:spPr>
+          <a:xfrm>
+            <a:off x="503548" y="3104126"/>
+            <a:ext cx="3204864" cy="369332"/>
+          </a:xfrm>
+          <a:prstGeom prst="rect">
+            <a:avLst/>
+          </a:prstGeom>
+          <a:noFill/>
+        </p:spPr>
+        <p:txBody>
+          <a:bodyPr wrap="square" rtlCol="0">
+            <a:spAutoFit/>
+          </a:bodyPr>
+          <a:lstStyle/>
+          <a:p>
+            <a:r>
+              <a:rPr lang="en-US" b="1" dirty="0"/>
+              <a:t>𝛿(</a:t>
+            </a:r>
+            <a:r>
+              <a:rPr lang="el-GR" b="1" dirty="0"/>
+              <a:t>λ</a:t>
+            </a:r>
+            <a:r>
+              <a:rPr lang="en-US" sz="1100" b="1" dirty="0"/>
+              <a:t>0</a:t>
+            </a:r>
+            <a:r>
+              <a:rPr lang="en-US" b="1" dirty="0"/>
+              <a:t>)/ 𝛿</a:t>
+            </a:r>
+            <a:r>
+              <a:rPr lang="en-US" b="1" dirty="0" smtClean="0"/>
+              <a:t>(</a:t>
+            </a:r>
+            <a:r>
+              <a:rPr lang="el-GR" b="1" dirty="0"/>
+              <a:t>θ</a:t>
+            </a:r>
+            <a:r>
+              <a:rPr lang="en-US" b="1" dirty="0" smtClean="0"/>
+              <a:t>)</a:t>
+            </a:r>
+            <a:r>
+              <a:rPr lang="en-US" dirty="0" smtClean="0"/>
+              <a:t> = 0.63 nm/degree</a:t>
+            </a:r>
+            <a:endParaRPr lang="en-US" dirty="0"/>
+          </a:p>
+        </p:txBody>
+      </p:sp>
+      <p:sp>
+        <p:nvSpPr>
+          <p:cNvPr id="11" name="TextBox 10"/>
+          <p:cNvSpPr txBox="1"/>
+          <p:nvPr/>
+        </p:nvSpPr>
+        <p:spPr>
+          <a:xfrm>
+            <a:off x="5235537" y="3098619"/>
+            <a:ext cx="2884886" cy="369332"/>
+          </a:xfrm>
+          <a:prstGeom prst="rect">
+            <a:avLst/>
+          </a:prstGeom>
+          <a:noFill/>
+        </p:spPr>
+        <p:txBody>
+          <a:bodyPr wrap="square" rtlCol="0">
+            <a:spAutoFit/>
+          </a:bodyPr>
+          <a:lstStyle/>
+          <a:p>
+            <a:r>
+              <a:rPr lang="en-US" b="1" dirty="0" smtClean="0"/>
+              <a:t>𝛿(</a:t>
+            </a:r>
+            <a:r>
+              <a:rPr lang="el-GR" b="1" dirty="0" smtClean="0"/>
+              <a:t>λ</a:t>
+            </a:r>
+            <a:r>
+              <a:rPr lang="en-US" sz="1100" b="1" dirty="0" smtClean="0"/>
+              <a:t>0</a:t>
+            </a:r>
+            <a:r>
+              <a:rPr lang="en-US" b="1" dirty="0" smtClean="0"/>
+              <a:t>)/ 𝛿(H)</a:t>
+            </a:r>
+            <a:r>
+              <a:rPr lang="en-US" dirty="0" smtClean="0"/>
+              <a:t> = 0.7 nm/nm</a:t>
+            </a:r>
+            <a:endParaRPr lang="en-US" dirty="0"/>
+          </a:p>
+        </p:txBody>
+      </p:sp>
+    </p:spTree>
+    <p:extLst>
+      <p:ext uri="{BB962C8B-B14F-4D97-AF65-F5344CB8AC3E}">
+        <p14:creationId xmlns:p14="http://schemas.microsoft.com/office/powerpoint/2010/main" val="825652399"/>
+      </p:ext>
+    </p:extLst>
+  </p:cSld>
+  <p:clrMapOvr>
+    <a:masterClrMapping/>
+  </p:clrMapOvr>
+  <p:timing>
+    <p:tnLst>
+      <p:par>
+        <p:cTn id="1" dur="indefinite" restart="never" nodeType="tmRoot"/>
+      </p:par>
+    </p:tnLst>
+  </p:timing>
+</p:sld>
+</file>
+
+<file path=ppt/slides/slide12.xml><?xml version="1.0" encoding="utf-8"?>
+<p:sld xmlns:a="http://schemas.openxmlformats.org/drawingml/2006/main" xmlns:r="http://schemas.openxmlformats.org/officeDocument/2006/relationships" xmlns:p="http://schemas.openxmlformats.org/presentationml/2006/main">
+  <p:cSld>
+    <p:spTree>
+      <p:nvGrpSpPr>
+        <p:cNvPr id="1" name=""/>
+        <p:cNvGrpSpPr/>
+        <p:nvPr/>
+      </p:nvGrpSpPr>
+      <p:grpSpPr>
+        <a:xfrm>
+          <a:off x="0" y="0"/>
+          <a:ext cx="0" cy="0"/>
+          <a:chOff x="0" y="0"/>
+          <a:chExt cx="0" cy="0"/>
+        </a:xfrm>
+      </p:grpSpPr>
+      <p:sp>
+        <p:nvSpPr>
+          <p:cNvPr id="2" name="Title 1"/>
+          <p:cNvSpPr>
+            <a:spLocks noGrp="1"/>
+          </p:cNvSpPr>
+          <p:nvPr>
+            <p:ph type="title"/>
+          </p:nvPr>
+        </p:nvSpPr>
+        <p:spPr>
+          <a:xfrm>
+            <a:off x="457200" y="274638"/>
+            <a:ext cx="8686800" cy="1143000"/>
+          </a:xfrm>
+        </p:spPr>
+        <p:txBody>
+          <a:bodyPr/>
+          <a:lstStyle/>
+          <a:p>
+            <a:r>
+              <a:rPr lang="en-US" sz="2000" b="1" dirty="0" smtClean="0"/>
+              <a:t>Contributors</a:t>
+            </a:r>
+            <a:endParaRPr lang="en-US" sz="2000" b="1" dirty="0"/>
+          </a:p>
+        </p:txBody>
+      </p:sp>
+      <p:sp>
+        <p:nvSpPr>
+          <p:cNvPr id="3" name="Footer Placeholder 2"/>
+          <p:cNvSpPr>
+            <a:spLocks noGrp="1"/>
+          </p:cNvSpPr>
+          <p:nvPr>
+            <p:ph type="ftr" sz="quarter" idx="11"/>
+          </p:nvPr>
+        </p:nvSpPr>
+        <p:spPr/>
+        <p:txBody>
+          <a:bodyPr/>
+          <a:lstStyle/>
+          <a:p>
+            <a:r>
+              <a:rPr lang="en-US" altLang="zh-CN" dirty="0" smtClean="0"/>
+              <a:t>Hammood, Mustafa©2019</a:t>
+            </a:r>
+          </a:p>
+        </p:txBody>
+      </p:sp>
+      <p:sp>
+        <p:nvSpPr>
+          <p:cNvPr id="4" name="Slide Number Placeholder 3"/>
+          <p:cNvSpPr>
+            <a:spLocks noGrp="1"/>
+          </p:cNvSpPr>
+          <p:nvPr>
+            <p:ph type="sldNum" sz="quarter" idx="12"/>
+          </p:nvPr>
+        </p:nvSpPr>
+        <p:spPr/>
+        <p:txBody>
+          <a:bodyPr/>
+          <a:lstStyle/>
+          <a:p>
+            <a:fld id="{17BB8376-F12B-CB44-BE0C-DBE0A170CA7C}" type="slidenum">
+              <a:rPr lang="en-US" altLang="zh-CN" smtClean="0"/>
+              <a:pPr/>
+              <a:t>12</a:t>
             </a:fld>
             <a:endParaRPr lang="en-US" altLang="zh-CN"/>
           </a:p>
@@ -20140,7 +20689,7 @@
           <p:nvPr>
             <p:extLst>
               <p:ext uri="{D42A27DB-BD31-4B8C-83A1-F6EECF244321}">
-                <p14:modId xmlns:p14="http://schemas.microsoft.com/office/powerpoint/2010/main" val="178869556"/>
+                <p14:modId xmlns:p14="http://schemas.microsoft.com/office/powerpoint/2010/main" val="3928785014"/>
               </p:ext>
             </p:extLst>
           </p:nvPr>
@@ -20302,7 +20851,7 @@
                       <a:pPr rtl="0"/>
                       <a:r>
                         <a:rPr lang="en-US" sz="1400" dirty="0" smtClean="0"/>
-                        <a:t>0.4795</a:t>
+                        <a:t>0.4794</a:t>
                       </a:r>
                       <a:endParaRPr lang="en-US" sz="1400" dirty="0"/>
                     </a:p>
@@ -20317,7 +20866,7 @@
                       <a:pPr rtl="0"/>
                       <a:r>
                         <a:rPr lang="en-US" sz="1400" dirty="0" smtClean="0"/>
-                        <a:t>6.02</a:t>
+                        <a:t>5.88</a:t>
                       </a:r>
                       <a:endParaRPr lang="en-US" sz="1400" dirty="0"/>
                     </a:p>
@@ -20416,7 +20965,7 @@
                   <a:srgbClr val="002060"/>
                 </a:solidFill>
               </a:rPr>
-              <a:t>10%</a:t>
+              <a:t>&lt;10%</a:t>
             </a:r>
             <a:endParaRPr lang="en-US" sz="1500" b="1" dirty="0">
               <a:solidFill>
@@ -20484,8 +21033,16 @@
           <a:lstStyle/>
           <a:p>
             <a:r>
-              <a:rPr lang="en-US" sz="2000" b="1" smtClean="0"/>
-              <a:t>What’s new?</a:t>
+              <a:rPr lang="en-US" sz="2000" b="1" dirty="0"/>
+              <a:t>How to </a:t>
+            </a:r>
+            <a:r>
+              <a:rPr lang="en-US" sz="2000" b="1" dirty="0" smtClean="0"/>
+              <a:t>find Kappa? </a:t>
+            </a:r>
+            <a:r>
+              <a:rPr lang="en-US" sz="2000" b="1" dirty="0" smtClean="0"/>
+              <a:t>Even faster? MODE EME Simulation</a:t>
             </a:r>
             <a:endParaRPr lang="en-US" sz="2000" b="1" dirty="0"/>
           </a:p>
@@ -20546,7 +21103,7 @@
         <p:spPr>
           <a:xfrm>
             <a:off x="457200" y="1182103"/>
-            <a:ext cx="8579296" cy="3970318"/>
+            <a:ext cx="8579296" cy="1200329"/>
           </a:xfrm>
           <a:prstGeom prst="rect">
             <a:avLst/>
@@ -20569,55 +21126,7 @@
                   <a:srgbClr val="002060"/>
                 </a:solidFill>
               </a:rPr>
-              <a:t>Fully automated flow </a:t>
-            </a:r>
-            <a:r>
-              <a:rPr lang="en-US" dirty="0">
-                <a:solidFill>
-                  <a:srgbClr val="002060"/>
-                </a:solidFill>
-              </a:rPr>
-              <a:t>i</a:t>
-            </a:r>
-            <a:r>
-              <a:rPr lang="en-US" dirty="0" smtClean="0">
-                <a:solidFill>
-                  <a:srgbClr val="002060"/>
-                </a:solidFill>
-              </a:rPr>
-              <a:t>n Python – no need for a MATLAB engine for coupled-mode theory or the setup of any 3</a:t>
-            </a:r>
-            <a:r>
-              <a:rPr lang="en-US" baseline="30000" dirty="0" smtClean="0">
-                <a:solidFill>
-                  <a:srgbClr val="002060"/>
-                </a:solidFill>
-              </a:rPr>
-              <a:t>rd</a:t>
-            </a:r>
-            <a:r>
-              <a:rPr lang="en-US" dirty="0" smtClean="0">
-                <a:solidFill>
-                  <a:srgbClr val="002060"/>
-                </a:solidFill>
-              </a:rPr>
-              <a:t> party tools (other than </a:t>
-            </a:r>
-            <a:r>
-              <a:rPr lang="en-US" dirty="0" err="1" smtClean="0">
-                <a:solidFill>
-                  <a:srgbClr val="002060"/>
-                </a:solidFill>
-              </a:rPr>
-              <a:t>Lumerical</a:t>
-            </a:r>
-            <a:r>
-              <a:rPr lang="en-US" dirty="0" smtClean="0">
-                <a:solidFill>
-                  <a:srgbClr val="002060"/>
-                </a:solidFill>
-              </a:rPr>
-              <a:t>)</a:t>
+              <a:t>Simulate a single periodic contra-DC cell in EME</a:t>
             </a:r>
           </a:p>
           <a:p>
@@ -20625,11 +21134,14 @@
               <a:buFont typeface="Arial" panose="020B0604020202020204" pitchFamily="34" charset="0"/>
               <a:buChar char="•"/>
             </a:pPr>
-            <a:endParaRPr lang="en-US" dirty="0" smtClean="0">
-              <a:solidFill>
-                <a:srgbClr val="002060"/>
-              </a:solidFill>
-            </a:endParaRPr>
+            <a:r>
+              <a:rPr lang="en-US" dirty="0" smtClean="0">
+                <a:solidFill>
+                  <a:srgbClr val="002060"/>
+                </a:solidFill>
+              </a:rPr>
+              <a:t>Generate the uniform profile response</a:t>
+            </a:r>
           </a:p>
           <a:p>
             <a:pPr marL="285750" indent="-285750">
@@ -20637,28 +21149,12 @@
               <a:buChar char="•"/>
             </a:pPr>
             <a:r>
-              <a:rPr lang="en-US" dirty="0">
+              <a:rPr lang="en-US" dirty="0" smtClean="0">
                 <a:solidFill>
                   <a:srgbClr val="002060"/>
                 </a:solidFill>
               </a:rPr>
-              <a:t>Generates an S-parameter file (.</a:t>
-            </a:r>
-            <a:r>
-              <a:rPr lang="en-US" dirty="0" err="1">
-                <a:solidFill>
-                  <a:srgbClr val="002060"/>
-                </a:solidFill>
-              </a:rPr>
-              <a:t>dat</a:t>
-            </a:r>
-            <a:r>
-              <a:rPr lang="en-US" dirty="0">
-                <a:solidFill>
-                  <a:srgbClr val="002060"/>
-                </a:solidFill>
-              </a:rPr>
-              <a:t>) for circuit simulations</a:t>
+              <a:t>Extract kappa from the response using the nulls method</a:t>
             </a:r>
           </a:p>
           <a:p>
@@ -20666,24 +21162,13 @@
               <a:buFont typeface="Arial" panose="020B0604020202020204" pitchFamily="34" charset="0"/>
               <a:buChar char="•"/>
             </a:pPr>
-            <a:endParaRPr lang="en-US" dirty="0" smtClean="0">
-              <a:solidFill>
-                <a:srgbClr val="002060"/>
-              </a:solidFill>
-            </a:endParaRPr>
-          </a:p>
-          <a:p>
-            <a:pPr marL="285750" indent="-285750">
-              <a:buFont typeface="Arial" panose="020B0604020202020204" pitchFamily="34" charset="0"/>
-              <a:buChar char="•"/>
-            </a:pPr>
             <a:r>
               <a:rPr lang="en-US" dirty="0" smtClean="0">
                 <a:solidFill>
                   <a:srgbClr val="002060"/>
                 </a:solidFill>
               </a:rPr>
-              <a:t>Dual </a:t>
+              <a:t>Feed the kappa int</a:t>
             </a:r>
             <a:r>
               <a:rPr lang="en-US" dirty="0" smtClean="0">
@@ -20691,7 +21176,15 @@
                   <a:srgbClr val="002060"/>
                 </a:solidFill>
               </a:rPr>
-              <a:t>polarizations: </a:t>
+              <a:t>o coupled-mode theory, transfer matrix </a:t>
+            </a:r>
+            <a:r>
+              <a:rPr lang="en-US" dirty="0" err="1" smtClean="0">
+                <a:solidFill>
+                  <a:srgbClr val="002060"/>
+                </a:solidFill>
+              </a:rPr>
+              <a:t>apodized</a:t>
             </a:r>
             <a:r>
               <a:rPr lang="en-US" dirty="0" smtClean="0">
@@ -20699,149 +21192,68 @@
                   <a:srgbClr val="002060"/>
                 </a:solidFill>
               </a:rPr>
-              <a:t>TE-TM, compact model includes </a:t>
-            </a:r>
-            <a:r>
-              <a:rPr lang="en-US" dirty="0" smtClean="0">
-                <a:solidFill>
-                  <a:srgbClr val="002060"/>
-                </a:solidFill>
-              </a:rPr>
-              <a:t>two-</a:t>
-            </a:r>
-            <a:r>
-              <a:rPr lang="en-US" dirty="0" smtClean="0">
-                <a:solidFill>
-                  <a:srgbClr val="002060"/>
-                </a:solidFill>
-              </a:rPr>
-              <a:t>modes support</a:t>
-            </a:r>
-            <a:endParaRPr lang="en-US" dirty="0" smtClean="0">
-              <a:solidFill>
-                <a:srgbClr val="002060"/>
-              </a:solidFill>
-            </a:endParaRPr>
-          </a:p>
-          <a:p>
-            <a:pPr marL="285750" indent="-285750">
-              <a:buFont typeface="Arial" panose="020B0604020202020204" pitchFamily="34" charset="0"/>
-              <a:buChar char="•"/>
-            </a:pPr>
+              <a:t> model</a:t>
+            </a:r>
             <a:endParaRPr lang="en-US" dirty="0">
               <a:solidFill>
                 <a:srgbClr val="002060"/>
               </a:solidFill>
             </a:endParaRPr>
           </a:p>
-          <a:p>
-            <a:pPr marL="285750" indent="-285750">
-              <a:buFont typeface="Arial" panose="020B0604020202020204" pitchFamily="34" charset="0"/>
-              <a:buChar char="•"/>
-            </a:pPr>
-            <a:r>
-              <a:rPr lang="en-US" dirty="0" smtClean="0">
-                <a:solidFill>
-                  <a:srgbClr val="002060"/>
-                </a:solidFill>
-              </a:rPr>
-              <a:t>New approach to find the bandgap and Kappa – reduce FDTD simulation time from more than 5 hours to an improved, </a:t>
-            </a:r>
-            <a:r>
-              <a:rPr lang="en-US" dirty="0" smtClean="0">
-                <a:solidFill>
-                  <a:srgbClr val="002060"/>
-                </a:solidFill>
-              </a:rPr>
-              <a:t>to </a:t>
-            </a:r>
-            <a:r>
-              <a:rPr lang="en-US" dirty="0" smtClean="0">
-                <a:solidFill>
-                  <a:srgbClr val="002060"/>
-                </a:solidFill>
-              </a:rPr>
-              <a:t>less </a:t>
-            </a:r>
-            <a:r>
-              <a:rPr lang="en-US" dirty="0" smtClean="0">
-                <a:solidFill>
-                  <a:srgbClr val="002060"/>
-                </a:solidFill>
-              </a:rPr>
-              <a:t>than 30 </a:t>
-            </a:r>
-            <a:r>
-              <a:rPr lang="en-US" dirty="0" smtClean="0">
-                <a:solidFill>
-                  <a:srgbClr val="002060"/>
-                </a:solidFill>
-              </a:rPr>
-              <a:t>minutes. This was the simulation flow bottleneck.</a:t>
-            </a:r>
-            <a:endParaRPr lang="en-US" dirty="0" smtClean="0">
-              <a:solidFill>
-                <a:srgbClr val="002060"/>
-              </a:solidFill>
-            </a:endParaRPr>
-          </a:p>
-          <a:p>
-            <a:pPr marL="285750" indent="-285750">
-              <a:buFont typeface="Arial" panose="020B0604020202020204" pitchFamily="34" charset="0"/>
-              <a:buChar char="•"/>
-            </a:pPr>
-            <a:endParaRPr lang="en-US" dirty="0">
-              <a:solidFill>
-                <a:srgbClr val="002060"/>
-              </a:solidFill>
-            </a:endParaRPr>
-          </a:p>
-          <a:p>
-            <a:pPr marL="285750" indent="-285750">
-              <a:buFont typeface="Arial" panose="020B0604020202020204" pitchFamily="34" charset="0"/>
-              <a:buChar char="•"/>
-            </a:pPr>
-            <a:r>
-              <a:rPr lang="en-US" dirty="0" smtClean="0">
-                <a:solidFill>
-                  <a:srgbClr val="002060"/>
-                </a:solidFill>
-              </a:rPr>
-              <a:t>Accurately predicts and simulates the waveguide’s self-reflection</a:t>
-            </a:r>
-          </a:p>
-          <a:p>
-            <a:endParaRPr lang="en-US" dirty="0">
-              <a:solidFill>
-                <a:srgbClr val="002060"/>
-              </a:solidFill>
-            </a:endParaRPr>
-          </a:p>
-          <a:p>
-            <a:pPr marL="285750" indent="-285750">
-              <a:buFont typeface="Arial" panose="020B0604020202020204" pitchFamily="34" charset="0"/>
-              <a:buChar char="•"/>
-            </a:pPr>
-            <a:r>
-              <a:rPr lang="en-US" dirty="0" smtClean="0">
-                <a:solidFill>
-                  <a:srgbClr val="002060"/>
-                </a:solidFill>
-              </a:rPr>
-              <a:t>Higher level of abstraction</a:t>
-            </a:r>
-            <a:endParaRPr lang="en-US" dirty="0">
-              <a:solidFill>
-                <a:srgbClr val="002060"/>
-              </a:solidFill>
-            </a:endParaRPr>
-          </a:p>
-        </p:txBody>
-      </p:sp>
+        </p:txBody>
+      </p:sp>
+      <p:pic>
+        <p:nvPicPr>
+          <p:cNvPr id="7" name="Picture 6"/>
+          <p:cNvPicPr>
+            <a:picLocks noChangeAspect="1"/>
+          </p:cNvPicPr>
+          <p:nvPr/>
+        </p:nvPicPr>
+        <p:blipFill>
+          <a:blip r:embed="rId2"/>
+          <a:stretch>
+            <a:fillRect/>
+          </a:stretch>
+        </p:blipFill>
+        <p:spPr>
+          <a:xfrm>
+            <a:off x="107504" y="3712170"/>
+            <a:ext cx="1752363" cy="1728192"/>
+          </a:xfrm>
+          <a:prstGeom prst="rect">
+            <a:avLst/>
+          </a:prstGeom>
+        </p:spPr>
+      </p:pic>
+      <p:pic>
+        <p:nvPicPr>
+          <p:cNvPr id="11" name="Picture 10"/>
+          <p:cNvPicPr>
+            <a:picLocks noChangeAspect="1"/>
+          </p:cNvPicPr>
+          <p:nvPr/>
+        </p:nvPicPr>
+        <p:blipFill>
+          <a:blip r:embed="rId3"/>
+          <a:stretch>
+            <a:fillRect/>
+          </a:stretch>
+        </p:blipFill>
+        <p:spPr>
+          <a:xfrm>
+            <a:off x="2372355" y="3356992"/>
+            <a:ext cx="4638045" cy="2584500"/>
+          </a:xfrm>
+          <a:prstGeom prst="rect">
+            <a:avLst/>
+          </a:prstGeom>
+        </p:spPr>
+      </p:pic>
     </p:spTree>
     <p:extLst>
       <p:ext uri="{BB962C8B-B14F-4D97-AF65-F5344CB8AC3E}">
-        <p14:creationId xmlns:p14="http://schemas.microsoft.com/office/powerpoint/2010/main" val="3948140843"/>
+        <p14:creationId xmlns:p14="http://schemas.microsoft.com/office/powerpoint/2010/main" val="2982080755"/>
       </p:ext>
     </p:extLst>
   </p:cSld>
@@ -20896,14 +21308,10 @@
           <a:lstStyle/>
           <a:p>
             <a:r>
-              <a:rPr lang="en-US" sz="2000" b="1" dirty="0" smtClean="0"/>
-              <a:t>How to</a:t>
-            </a:r>
-            <a:r>
-              <a:rPr lang="en-US" sz="2000" dirty="0" smtClean="0"/>
-              <a:t>? Define physical parameters and simulation parameters</a:t>
-            </a:r>
-            <a:endParaRPr lang="en-US" sz="2000" dirty="0"/>
+              <a:rPr lang="en-US" sz="2000" b="1" smtClean="0"/>
+              <a:t>What’s new?</a:t>
+            </a:r>
+            <a:endParaRPr lang="en-US" sz="2000" b="1" dirty="0"/>
           </a:p>
         </p:txBody>
       </p:sp>
@@ -20953,147 +21361,28 @@
           </a:p>
         </p:txBody>
       </p:sp>
-      <p:pic>
-        <p:nvPicPr>
-          <p:cNvPr id="5" name="Picture 4"/>
-          <p:cNvPicPr>
-            <a:picLocks noChangeAspect="1"/>
-          </p:cNvPicPr>
+      <p:sp>
+        <p:nvSpPr>
+          <p:cNvPr id="6" name="TextBox 5"/>
+          <p:cNvSpPr txBox="1"/>
           <p:nvPr/>
-        </p:nvPicPr>
-        <p:blipFill>
-          <a:blip r:embed="rId2"/>
-          <a:stretch>
-            <a:fillRect/>
-          </a:stretch>
-        </p:blipFill>
+        </p:nvSpPr>
         <p:spPr>
           <a:xfrm>
-            <a:off x="6114684" y="1388277"/>
-            <a:ext cx="2941952" cy="3349495"/>
-          </a:xfrm>
-          <a:prstGeom prst="rect">
-            <a:avLst/>
-          </a:prstGeom>
-        </p:spPr>
-      </p:pic>
-      <p:sp>
-        <p:nvSpPr>
-          <p:cNvPr id="7" name="Rectangle 6"/>
-          <p:cNvSpPr/>
-          <p:nvPr/>
-        </p:nvSpPr>
-        <p:spPr>
-          <a:xfrm>
-            <a:off x="6638652" y="4351293"/>
-            <a:ext cx="1533747" cy="386480"/>
+            <a:off x="457200" y="1182103"/>
+            <a:ext cx="8579296" cy="3970318"/>
           </a:xfrm>
           <a:prstGeom prst="rect">
             <a:avLst/>
           </a:prstGeom>
           <a:noFill/>
         </p:spPr>
-        <p:style>
-          <a:lnRef idx="2">
-            <a:schemeClr val="accent1">
-              <a:shade val="50000"/>
-            </a:schemeClr>
-          </a:lnRef>
-          <a:fillRef idx="1">
-            <a:schemeClr val="accent1"/>
-          </a:fillRef>
-          <a:effectRef idx="0">
-            <a:schemeClr val="accent1"/>
-          </a:effectRef>
-          <a:fontRef idx="minor">
-            <a:schemeClr val="lt1"/>
-          </a:fontRef>
-        </p:style>
-        <p:txBody>
-          <a:bodyPr rtlCol="0" anchor="ctr"/>
-          <a:lstStyle/>
-          <a:p>
-            <a:pPr algn="ctr"/>
-            <a:endParaRPr lang="en-US"/>
-          </a:p>
-        </p:txBody>
-      </p:sp>
-      <p:sp>
-        <p:nvSpPr>
-          <p:cNvPr id="8" name="TextBox 7"/>
-          <p:cNvSpPr txBox="1"/>
-          <p:nvPr/>
-        </p:nvSpPr>
-        <p:spPr>
-          <a:xfrm>
-            <a:off x="8135608" y="4381504"/>
-            <a:ext cx="1121518" cy="369332"/>
-          </a:xfrm>
-          <a:prstGeom prst="rect">
-            <a:avLst/>
-          </a:prstGeom>
-          <a:noFill/>
-        </p:spPr>
         <p:txBody>
           <a:bodyPr wrap="square" rtlCol="0">
             <a:spAutoFit/>
           </a:bodyPr>
           <a:lstStyle/>
           <a:p>
-            <a:r>
-              <a:rPr lang="en-US" dirty="0" smtClean="0"/>
-              <a:t>Optional</a:t>
-            </a:r>
-            <a:endParaRPr lang="en-US" dirty="0"/>
-          </a:p>
-        </p:txBody>
-      </p:sp>
-      <p:pic>
-        <p:nvPicPr>
-          <p:cNvPr id="9" name="Picture 8"/>
-          <p:cNvPicPr>
-            <a:picLocks noChangeAspect="1"/>
-          </p:cNvPicPr>
-          <p:nvPr/>
-        </p:nvPicPr>
-        <p:blipFill>
-          <a:blip r:embed="rId3"/>
-          <a:stretch>
-            <a:fillRect/>
-          </a:stretch>
-        </p:blipFill>
-        <p:spPr>
-          <a:xfrm>
-            <a:off x="6248400" y="4737772"/>
-            <a:ext cx="2808236" cy="1252158"/>
-          </a:xfrm>
-          <a:prstGeom prst="rect">
-            <a:avLst/>
-          </a:prstGeom>
-        </p:spPr>
-      </p:pic>
-      <p:sp>
-        <p:nvSpPr>
-          <p:cNvPr id="11" name="TextBox 10"/>
-          <p:cNvSpPr txBox="1"/>
-          <p:nvPr/>
-        </p:nvSpPr>
-        <p:spPr>
-          <a:xfrm>
-            <a:off x="457200" y="1182103"/>
-            <a:ext cx="5570120" cy="646331"/>
-          </a:xfrm>
-          <a:prstGeom prst="rect">
-            <a:avLst/>
-          </a:prstGeom>
-          <a:noFill/>
-        </p:spPr>
-        <p:txBody>
-          <a:bodyPr wrap="square" rtlCol="0">
-            <a:spAutoFit/>
-          </a:bodyPr>
-          <a:lstStyle/>
-          <a:p>
             <a:pPr marL="285750" indent="-285750">
               <a:buFont typeface="Arial" panose="020B0604020202020204" pitchFamily="34" charset="0"/>
               <a:buChar char="•"/>
@@ -21104,82 +21393,287 @@
                   <a:srgbClr val="002060"/>
                 </a:solidFill>
               </a:rPr>
-              <a:t>Feed in the design parameters</a:t>
-            </a:r>
-          </a:p>
-          <a:p>
-            <a:pPr marL="742950" lvl="1" indent="-285750">
+              <a:t>Fully automated flow </a:t>
+            </a:r>
+            <a:r>
+              <a:rPr lang="en-US" dirty="0">
+                <a:solidFill>
+                  <a:srgbClr val="002060"/>
+                </a:solidFill>
+              </a:rPr>
+              <a:t>i</a:t>
+            </a:r>
+            <a:r>
+              <a:rPr lang="en-US" dirty="0" smtClean="0">
+                <a:solidFill>
+                  <a:srgbClr val="002060"/>
+                </a:solidFill>
+              </a:rPr>
+              <a:t>n Python – no need for a MATLAB engine for coupled-mode theory or the setup of any 3</a:t>
+            </a:r>
+            <a:r>
+              <a:rPr lang="en-US" baseline="30000" dirty="0" smtClean="0">
+                <a:solidFill>
+                  <a:srgbClr val="002060"/>
+                </a:solidFill>
+              </a:rPr>
+              <a:t>rd</a:t>
+            </a:r>
+            <a:r>
+              <a:rPr lang="en-US" dirty="0" smtClean="0">
+                <a:solidFill>
+                  <a:srgbClr val="002060"/>
+                </a:solidFill>
+              </a:rPr>
+              <a:t> party tools (other than </a:t>
+            </a:r>
+            <a:r>
+              <a:rPr lang="en-US" dirty="0" err="1" smtClean="0">
+                <a:solidFill>
+                  <a:srgbClr val="002060"/>
+                </a:solidFill>
+              </a:rPr>
+              <a:t>Lumerical</a:t>
+            </a:r>
+            <a:r>
+              <a:rPr lang="en-US" dirty="0" smtClean="0">
+                <a:solidFill>
+                  <a:srgbClr val="002060"/>
+                </a:solidFill>
+              </a:rPr>
+              <a:t>)</a:t>
+            </a:r>
+          </a:p>
+          <a:p>
+            <a:pPr marL="285750" indent="-285750">
               <a:buFont typeface="Arial" panose="020B0604020202020204" pitchFamily="34" charset="0"/>
               <a:buChar char="•"/>
             </a:pPr>
+            <a:endParaRPr lang="en-US" dirty="0" smtClean="0">
+              <a:solidFill>
+                <a:srgbClr val="002060"/>
+              </a:solidFill>
+            </a:endParaRPr>
+          </a:p>
+          <a:p>
+            <a:pPr marL="285750" indent="-285750">
+              <a:buFont typeface="Arial" panose="020B0604020202020204" pitchFamily="34" charset="0"/>
+              <a:buChar char="•"/>
+            </a:pPr>
+            <a:r>
+              <a:rPr lang="en-US" dirty="0">
+                <a:solidFill>
+                  <a:srgbClr val="002060"/>
+                </a:solidFill>
+              </a:rPr>
+              <a:t>Generates an S-parameter file (.</a:t>
+            </a:r>
+            <a:r>
+              <a:rPr lang="en-US" dirty="0" err="1">
+                <a:solidFill>
+                  <a:srgbClr val="002060"/>
+                </a:solidFill>
+              </a:rPr>
+              <a:t>dat</a:t>
+            </a:r>
+            <a:r>
+              <a:rPr lang="en-US" dirty="0">
+                <a:solidFill>
+                  <a:srgbClr val="002060"/>
+                </a:solidFill>
+              </a:rPr>
+              <a:t>) for circuit simulations</a:t>
+            </a:r>
+          </a:p>
+          <a:p>
+            <a:pPr marL="285750" indent="-285750">
+              <a:buFont typeface="Arial" panose="020B0604020202020204" pitchFamily="34" charset="0"/>
+              <a:buChar char="•"/>
+            </a:pPr>
+            <a:endParaRPr lang="en-US" dirty="0" smtClean="0">
+              <a:solidFill>
+                <a:srgbClr val="002060"/>
+              </a:solidFill>
+            </a:endParaRPr>
+          </a:p>
+          <a:p>
+            <a:pPr marL="285750" indent="-285750">
+              <a:buFont typeface="Arial" panose="020B0604020202020204" pitchFamily="34" charset="0"/>
+              <a:buChar char="•"/>
+            </a:pPr>
             <a:r>
               <a:rPr lang="en-US" dirty="0" smtClean="0">
                 <a:solidFill>
                   <a:srgbClr val="002060"/>
                 </a:solidFill>
               </a:rPr>
-              <a:t>Let the script run!</a:t>
-            </a:r>
+              <a:t>Dual </a:t>
+            </a:r>
+            <a:r>
+              <a:rPr lang="en-US" dirty="0" smtClean="0">
+                <a:solidFill>
+                  <a:srgbClr val="002060"/>
+                </a:solidFill>
+              </a:rPr>
+              <a:t>polarizations: </a:t>
+            </a:r>
+            <a:r>
+              <a:rPr lang="en-US" dirty="0" smtClean="0">
+                <a:solidFill>
+                  <a:srgbClr val="002060"/>
+                </a:solidFill>
+              </a:rPr>
+              <a:t>TE-TM, compact model includes </a:t>
+            </a:r>
+            <a:r>
+              <a:rPr lang="en-US" dirty="0" smtClean="0">
+                <a:solidFill>
+                  <a:srgbClr val="002060"/>
+                </a:solidFill>
+              </a:rPr>
+              <a:t>two-</a:t>
+            </a:r>
+            <a:r>
+              <a:rPr lang="en-US" dirty="0" smtClean="0">
+                <a:solidFill>
+                  <a:srgbClr val="002060"/>
+                </a:solidFill>
+              </a:rPr>
+              <a:t>modes support</a:t>
+            </a:r>
+            <a:endParaRPr lang="en-US" dirty="0" smtClean="0">
+              <a:solidFill>
+                <a:srgbClr val="002060"/>
+              </a:solidFill>
+            </a:endParaRPr>
+          </a:p>
+          <a:p>
+            <a:pPr marL="285750" indent="-285750">
+              <a:buFont typeface="Arial" panose="020B0604020202020204" pitchFamily="34" charset="0"/>
+              <a:buChar char="•"/>
+            </a:pPr>
             <a:endParaRPr lang="en-US" dirty="0">
               <a:solidFill>
                 <a:srgbClr val="002060"/>
               </a:solidFill>
             </a:endParaRPr>
           </a:p>
-        </p:txBody>
-      </p:sp>
-      <p:pic>
-        <p:nvPicPr>
-          <p:cNvPr id="12" name="Picture 11"/>
-          <p:cNvPicPr>
-            <a:picLocks noChangeAspect="1"/>
-          </p:cNvPicPr>
-          <p:nvPr/>
-        </p:nvPicPr>
-        <p:blipFill>
-          <a:blip r:embed="rId4"/>
-          <a:stretch>
-            <a:fillRect/>
-          </a:stretch>
-        </p:blipFill>
-        <p:spPr>
-          <a:xfrm>
-            <a:off x="1815009" y="1751881"/>
-            <a:ext cx="3057700" cy="1968036"/>
-          </a:xfrm>
-          <a:prstGeom prst="rect">
-            <a:avLst/>
-          </a:prstGeom>
-        </p:spPr>
-      </p:pic>
-      <p:pic>
-        <p:nvPicPr>
-          <p:cNvPr id="14" name="Picture 13"/>
-          <p:cNvPicPr>
-            <a:picLocks noChangeAspect="1"/>
-          </p:cNvPicPr>
-          <p:nvPr/>
-        </p:nvPicPr>
-        <p:blipFill>
-          <a:blip r:embed="rId5"/>
-          <a:stretch>
-            <a:fillRect/>
-          </a:stretch>
-        </p:blipFill>
-        <p:spPr>
-          <a:xfrm>
-            <a:off x="1475656" y="3599308"/>
-            <a:ext cx="4140553" cy="2344906"/>
-          </a:xfrm>
-          <a:prstGeom prst="rect">
-            <a:avLst/>
-          </a:prstGeom>
-        </p:spPr>
-      </p:pic>
+          <a:p>
+            <a:pPr marL="285750" indent="-285750">
+              <a:buFont typeface="Arial" panose="020B0604020202020204" pitchFamily="34" charset="0"/>
+              <a:buChar char="•"/>
+            </a:pPr>
+            <a:r>
+              <a:rPr lang="en-US" dirty="0" smtClean="0">
+                <a:solidFill>
+                  <a:srgbClr val="002060"/>
+                </a:solidFill>
+              </a:rPr>
+              <a:t>Two new approaches </a:t>
+            </a:r>
+            <a:r>
+              <a:rPr lang="en-US" dirty="0" smtClean="0">
+                <a:solidFill>
+                  <a:srgbClr val="002060"/>
+                </a:solidFill>
+              </a:rPr>
+              <a:t>to find the bandgap and Kappa – reduce FDTD simulation time from more than 5 hours to an improved, </a:t>
+            </a:r>
+            <a:r>
+              <a:rPr lang="en-US" dirty="0" smtClean="0">
+                <a:solidFill>
+                  <a:srgbClr val="002060"/>
+                </a:solidFill>
+              </a:rPr>
+              <a:t>to </a:t>
+            </a:r>
+            <a:r>
+              <a:rPr lang="en-US" dirty="0" smtClean="0">
+                <a:solidFill>
+                  <a:srgbClr val="002060"/>
+                </a:solidFill>
+              </a:rPr>
+              <a:t>less </a:t>
+            </a:r>
+            <a:r>
+              <a:rPr lang="en-US" dirty="0" smtClean="0">
+                <a:solidFill>
+                  <a:srgbClr val="002060"/>
+                </a:solidFill>
+              </a:rPr>
+              <a:t>than </a:t>
+            </a:r>
+            <a:r>
+              <a:rPr lang="en-US" dirty="0" smtClean="0">
+                <a:solidFill>
+                  <a:srgbClr val="002060"/>
+                </a:solidFill>
+              </a:rPr>
+              <a:t>a minutes. This was the simulation flow bottleneck.</a:t>
+            </a:r>
+            <a:endParaRPr lang="en-US" dirty="0" smtClean="0">
+              <a:solidFill>
+                <a:srgbClr val="002060"/>
+              </a:solidFill>
+            </a:endParaRPr>
+          </a:p>
+          <a:p>
+            <a:pPr marL="285750" indent="-285750">
+              <a:buFont typeface="Arial" panose="020B0604020202020204" pitchFamily="34" charset="0"/>
+              <a:buChar char="•"/>
+            </a:pPr>
+            <a:endParaRPr lang="en-US" dirty="0">
+              <a:solidFill>
+                <a:srgbClr val="002060"/>
+              </a:solidFill>
+            </a:endParaRPr>
+          </a:p>
+          <a:p>
+            <a:pPr marL="285750" indent="-285750">
+              <a:buFont typeface="Arial" panose="020B0604020202020204" pitchFamily="34" charset="0"/>
+              <a:buChar char="•"/>
+            </a:pPr>
+            <a:r>
+              <a:rPr lang="en-US" dirty="0" smtClean="0">
+                <a:solidFill>
+                  <a:srgbClr val="002060"/>
+                </a:solidFill>
+              </a:rPr>
+              <a:t>Accurately predicts and simulates the waveguide’s self-reflection</a:t>
+            </a:r>
+          </a:p>
+          <a:p>
+            <a:endParaRPr lang="en-US" dirty="0">
+              <a:solidFill>
+                <a:srgbClr val="002060"/>
+              </a:solidFill>
+            </a:endParaRPr>
+          </a:p>
+          <a:p>
+            <a:pPr marL="285750" indent="-285750">
+              <a:buFont typeface="Arial" panose="020B0604020202020204" pitchFamily="34" charset="0"/>
+              <a:buChar char="•"/>
+            </a:pPr>
+            <a:r>
+              <a:rPr lang="en-US" dirty="0" smtClean="0">
+                <a:solidFill>
+                  <a:srgbClr val="002060"/>
+                </a:solidFill>
+              </a:rPr>
+              <a:t>Higher level of abstraction</a:t>
+            </a:r>
+            <a:endParaRPr lang="en-US" dirty="0">
+              <a:solidFill>
+                <a:srgbClr val="002060"/>
+              </a:solidFill>
+            </a:endParaRPr>
+          </a:p>
+        </p:txBody>
+      </p:sp>
     </p:spTree>
     <p:extLst>
       <p:ext uri="{BB962C8B-B14F-4D97-AF65-F5344CB8AC3E}">
-        <p14:creationId xmlns:p14="http://schemas.microsoft.com/office/powerpoint/2010/main" val="1902652571"/>
+        <p14:creationId xmlns:p14="http://schemas.microsoft.com/office/powerpoint/2010/main" val="3948140843"/>
       </p:ext>
     </p:extLst>
   </p:cSld>

</xml_diff>

<commit_message>
solvers: contraDC: clean up
</commit_message>
<xml_diff>
--- a/SiEPIC_Photonics_Package/solvers_simulators/contraDC/Documentation/contraDC_Simulator.pptx
+++ b/SiEPIC_Photonics_Package/solvers_simulators/contraDC/Documentation/contraDC_Simulator.pptx
@@ -17504,7 +17504,7 @@
               <a:t>Hammood</a:t>
             </a:r>
             <a:r>
-              <a:rPr kumimoji="0" lang="en-US" altLang="zh-CN" sz="2800" b="1" dirty="0" smtClean="0">
+              <a:rPr kumimoji="0" lang="en-US" altLang="zh-CN" sz="2800" b="1" smtClean="0">
                 <a:solidFill>
                   <a:schemeClr val="bg1"/>
                 </a:solidFill>
@@ -17512,8 +17512,10 @@
                 <a:ea typeface="Times New Roman" charset="0"/>
                 <a:cs typeface="Times New Roman" charset="0"/>
               </a:rPr>
-              <a:t>, </a:t>
-            </a:r>
+              <a:t>,</a:t>
+            </a:r>
+          </a:p>
+          <a:p>
             <a:r>
               <a:rPr kumimoji="0" lang="en-US" altLang="zh-CN" sz="2000" dirty="0" smtClean="0">
                 <a:solidFill>
@@ -17523,18 +17525,8 @@
                 <a:ea typeface="Times New Roman" charset="0"/>
                 <a:cs typeface="Times New Roman" charset="0"/>
               </a:rPr>
-              <a:t>Ajay Mistry, Stephen Lin</a:t>
-            </a:r>
-            <a:endParaRPr kumimoji="0" lang="en-US" altLang="zh-CN" sz="1600" dirty="0" smtClean="0">
-              <a:solidFill>
-                <a:schemeClr val="bg1"/>
-              </a:solidFill>
-              <a:latin typeface="+mj-lt"/>
-              <a:ea typeface="Times New Roman" charset="0"/>
-              <a:cs typeface="Times New Roman" charset="0"/>
-            </a:endParaRPr>
-          </a:p>
-          <a:p>
+              <a:t>The </a:t>
+            </a:r>
             <a:r>
               <a:rPr kumimoji="0" lang="en-US" altLang="zh-CN" sz="2000" dirty="0" smtClean="0">
                 <a:solidFill>
@@ -17544,7 +17536,7 @@
                 <a:ea typeface="Times New Roman" charset="0"/>
                 <a:cs typeface="Times New Roman" charset="0"/>
               </a:rPr>
-              <a:t>The University of British Columbia</a:t>
+              <a:t>University of British Columbia</a:t>
             </a:r>
           </a:p>
         </p:txBody>

</xml_diff>

<commit_message>
solvers: contraDC: fix contraDC EME bandwidth extraction
based on bounds method
</commit_message>
<xml_diff>
--- a/SiEPIC_Photonics_Package/solvers_simulators/contraDC/Documentation/contraDC_Simulator.pptx
+++ b/SiEPIC_Photonics_Package/solvers_simulators/contraDC/Documentation/contraDC_Simulator.pptx
@@ -225,11 +225,7 @@
             </a:r>
             <a:r>
               <a:rPr lang="en-US" dirty="0" smtClean="0"/>
-              <a:t>height </a:t>
-            </a:r>
-            <a:r>
-              <a:rPr lang="en-US" dirty="0" smtClean="0"/>
-              <a:t>variations </a:t>
+              <a:t>height variations </a:t>
             </a:r>
             <a:r>
               <a:rPr lang="en-US" sz="1400" b="1" i="0" u="none" strike="noStrike" baseline="0" dirty="0" smtClean="0">
@@ -922,11 +918,7 @@
             </a:r>
             <a:r>
               <a:rPr lang="en-US" dirty="0" smtClean="0"/>
-              <a:t>sidewall angle </a:t>
-            </a:r>
-            <a:r>
-              <a:rPr lang="en-US" dirty="0" smtClean="0"/>
-              <a:t>variations (</a:t>
+              <a:t>sidewall angle variations (</a:t>
             </a:r>
             <a:r>
               <a:rPr lang="el-GR" sz="1400" b="1" i="0" u="none" strike="noStrike" baseline="0" dirty="0" smtClean="0">
@@ -2817,7 +2809,7 @@
             <a:fld id="{16215AEE-C922-4944-98A7-22910184AC8A}" type="datetimeFigureOut">
               <a:rPr lang="en-US" altLang="zh-CN"/>
               <a:pPr/>
-              <a:t>3/26/2019</a:t>
+              <a:t>3/28/2019</a:t>
             </a:fld>
             <a:endParaRPr lang="en-US" altLang="zh-CN"/>
           </a:p>
@@ -3021,7 +3013,7 @@
             <a:fld id="{CA038EEF-2DAF-6B44-A6B5-C268C3465D47}" type="datetimeFigureOut">
               <a:rPr lang="en-CA" altLang="zh-CN"/>
               <a:pPr/>
-              <a:t>2019-03-26</a:t>
+              <a:t>2019-03-28</a:t>
             </a:fld>
             <a:endParaRPr lang="en-CA" altLang="zh-CN"/>
           </a:p>
@@ -3386,10 +3378,10 @@
           </a:ln>
           <a:extLst>
             <a:ext uri="{FAA26D3D-D897-4be2-8F04-BA451C77F1D7}">
-              <ma14:placeholderFlag xmlns="" xmlns:ma14="http://schemas.microsoft.com/office/mac/drawingml/2011/main" val="1"/>
+              <ma14:placeholderFlag xmlns:ma14="http://schemas.microsoft.com/office/mac/drawingml/2011/main" xmlns="" val="1"/>
             </a:ext>
             <a:ext uri="{909E8E84-426E-40dd-AFC4-6F175D3DCCD1}">
-              <a14:hiddenFill xmlns:a14="http://schemas.microsoft.com/office/drawing/2010/main" xmlns="">
+              <a14:hiddenFill xmlns="" xmlns:a14="http://schemas.microsoft.com/office/drawing/2010/main">
                 <a:solidFill>
                   <a:srgbClr val="FFFFFF"/>
                 </a:solidFill>
@@ -3412,17 +3404,17 @@
           <a:noFill/>
           <a:extLst>
             <a:ext uri="{FAA26D3D-D897-4be2-8F04-BA451C77F1D7}">
-              <ma14:placeholderFlag xmlns="" xmlns:ma14="http://schemas.microsoft.com/office/mac/drawingml/2011/main" val="1"/>
+              <ma14:placeholderFlag xmlns:ma14="http://schemas.microsoft.com/office/mac/drawingml/2011/main" xmlns="" val="1"/>
             </a:ext>
             <a:ext uri="{909E8E84-426E-40dd-AFC4-6F175D3DCCD1}">
-              <a14:hiddenFill xmlns:a14="http://schemas.microsoft.com/office/drawing/2010/main" xmlns="">
+              <a14:hiddenFill xmlns="" xmlns:a14="http://schemas.microsoft.com/office/drawing/2010/main">
                 <a:solidFill>
                   <a:srgbClr val="FFFFFF"/>
                 </a:solidFill>
               </a14:hiddenFill>
             </a:ext>
             <a:ext uri="{91240B29-F687-4f45-9708-019B960494DF}">
-              <a14:hiddenLine xmlns:a14="http://schemas.microsoft.com/office/drawing/2010/main" xmlns="" w="9525">
+              <a14:hiddenLine xmlns="" xmlns:a14="http://schemas.microsoft.com/office/drawing/2010/main" w="9525">
                 <a:solidFill>
                   <a:srgbClr val="000000"/>
                 </a:solidFill>
@@ -3462,14 +3454,14 @@
           <a:noFill/>
           <a:extLst>
             <a:ext uri="{909E8E84-426E-40dd-AFC4-6F175D3DCCD1}">
-              <a14:hiddenFill xmlns:a14="http://schemas.microsoft.com/office/drawing/2010/main" xmlns="">
+              <a14:hiddenFill xmlns="" xmlns:a14="http://schemas.microsoft.com/office/drawing/2010/main">
                 <a:solidFill>
                   <a:srgbClr val="FFFFFF"/>
                 </a:solidFill>
               </a14:hiddenFill>
             </a:ext>
             <a:ext uri="{91240B29-F687-4f45-9708-019B960494DF}">
-              <a14:hiddenLine xmlns:a14="http://schemas.microsoft.com/office/drawing/2010/main" xmlns="" w="9525">
+              <a14:hiddenLine xmlns="" xmlns:a14="http://schemas.microsoft.com/office/drawing/2010/main" w="9525">
                 <a:solidFill>
                   <a:srgbClr val="000000"/>
                 </a:solidFill>
@@ -3802,7 +3794,7 @@
             <a:fld id="{2C31E0B7-D99D-9840-9AA4-AFE996601F1A}" type="datetime1">
               <a:rPr lang="en-US" altLang="zh-CN"/>
               <a:pPr/>
-              <a:t>3/26/2019</a:t>
+              <a:t>3/28/2019</a:t>
             </a:fld>
             <a:endParaRPr lang="en-US" altLang="zh-CN"/>
           </a:p>
@@ -3989,7 +3981,7 @@
             <a:fld id="{8CD81206-CB00-054A-A73E-85C388CF01BA}" type="datetime1">
               <a:rPr lang="en-US" altLang="zh-CN"/>
               <a:pPr/>
-              <a:t>3/26/2019</a:t>
+              <a:t>3/28/2019</a:t>
             </a:fld>
             <a:endParaRPr lang="en-US" altLang="zh-CN"/>
           </a:p>
@@ -4186,7 +4178,7 @@
             <a:fld id="{763C9DB7-BA8E-3248-A482-551635BAD7C2}" type="datetime1">
               <a:rPr lang="en-US" altLang="zh-CN"/>
               <a:pPr/>
-              <a:t>3/26/2019</a:t>
+              <a:t>3/28/2019</a:t>
             </a:fld>
             <a:endParaRPr lang="en-US" altLang="zh-CN"/>
           </a:p>
@@ -4321,7 +4313,7 @@
             <a:fld id="{E076C303-4390-464C-B7E9-6F5306EF3170}" type="datetime1">
               <a:rPr lang="en-US" altLang="zh-CN"/>
               <a:pPr/>
-              <a:t>3/26/2019</a:t>
+              <a:t>3/28/2019</a:t>
             </a:fld>
             <a:endParaRPr lang="en-US" altLang="zh-CN"/>
           </a:p>
@@ -4460,7 +4452,7 @@
             <a:fld id="{5CA8F940-8C0D-5F40-9547-CE421C3644DF}" type="datetime1">
               <a:rPr lang="en-US" altLang="zh-CN" smtClean="0"/>
               <a:pPr/>
-              <a:t>3/26/2019</a:t>
+              <a:t>3/28/2019</a:t>
             </a:fld>
             <a:endParaRPr lang="en-US" altLang="zh-CN"/>
           </a:p>
@@ -4560,14 +4552,14 @@
           </a:ln>
           <a:extLst>
             <a:ext uri="{909E8E84-426E-40dd-AFC4-6F175D3DCCD1}">
-              <a14:hiddenFill xmlns="" xmlns:a14="http://schemas.microsoft.com/office/drawing/2010/main">
+              <a14:hiddenFill xmlns:a14="http://schemas.microsoft.com/office/drawing/2010/main" xmlns="">
                 <a:solidFill>
                   <a:srgbClr val="FFFFFF"/>
                 </a:solidFill>
               </a14:hiddenFill>
             </a:ext>
             <a:ext uri="{91240B29-F687-4f45-9708-019B960494DF}">
-              <a14:hiddenLine xmlns="" xmlns:a14="http://schemas.microsoft.com/office/drawing/2010/main" w="9525">
+              <a14:hiddenLine xmlns:a14="http://schemas.microsoft.com/office/drawing/2010/main" xmlns="" w="9525">
                 <a:solidFill>
                   <a:srgbClr val="000000"/>
                 </a:solidFill>
@@ -4821,14 +4813,14 @@
             </a:ln>
             <a:extLst>
               <a:ext uri="{909E8E84-426E-40dd-AFC4-6F175D3DCCD1}">
-                <a14:hiddenFill xmlns="" xmlns:a14="http://schemas.microsoft.com/office/drawing/2010/main">
+                <a14:hiddenFill xmlns:a14="http://schemas.microsoft.com/office/drawing/2010/main" xmlns="">
                   <a:solidFill>
                     <a:srgbClr val="FFFFFF"/>
                   </a:solidFill>
                 </a14:hiddenFill>
               </a:ext>
               <a:ext uri="{91240B29-F687-4f45-9708-019B960494DF}">
-                <a14:hiddenLine xmlns="" xmlns:a14="http://schemas.microsoft.com/office/drawing/2010/main" w="9525">
+                <a14:hiddenLine xmlns:a14="http://schemas.microsoft.com/office/drawing/2010/main" xmlns="" w="9525">
                   <a:solidFill>
                     <a:srgbClr val="000000"/>
                   </a:solidFill>
@@ -5071,14 +5063,14 @@
           </a:ln>
           <a:extLst>
             <a:ext uri="{909E8E84-426E-40dd-AFC4-6F175D3DCCD1}">
-              <a14:hiddenFill xmlns:a14="http://schemas.microsoft.com/office/drawing/2010/main" xmlns="">
+              <a14:hiddenFill xmlns="" xmlns:a14="http://schemas.microsoft.com/office/drawing/2010/main">
                 <a:solidFill>
                   <a:srgbClr val="FFFFFF"/>
                 </a:solidFill>
               </a14:hiddenFill>
             </a:ext>
             <a:ext uri="{91240B29-F687-4f45-9708-019B960494DF}">
-              <a14:hiddenLine xmlns:a14="http://schemas.microsoft.com/office/drawing/2010/main" xmlns="" w="9525">
+              <a14:hiddenLine xmlns="" xmlns:a14="http://schemas.microsoft.com/office/drawing/2010/main" w="9525">
                 <a:solidFill>
                   <a:srgbClr val="000000"/>
                 </a:solidFill>
@@ -5297,14 +5289,14 @@
             </a:ln>
             <a:extLst>
               <a:ext uri="{909E8E84-426E-40dd-AFC4-6F175D3DCCD1}">
-                <a14:hiddenFill xmlns:a14="http://schemas.microsoft.com/office/drawing/2010/main" xmlns="">
+                <a14:hiddenFill xmlns="" xmlns:a14="http://schemas.microsoft.com/office/drawing/2010/main">
                   <a:solidFill>
                     <a:srgbClr val="FFFFFF"/>
                   </a:solidFill>
                 </a14:hiddenFill>
               </a:ext>
               <a:ext uri="{91240B29-F687-4f45-9708-019B960494DF}">
-                <a14:hiddenLine xmlns:a14="http://schemas.microsoft.com/office/drawing/2010/main" xmlns="" w="9525">
+                <a14:hiddenLine xmlns="" xmlns:a14="http://schemas.microsoft.com/office/drawing/2010/main" w="9525">
                   <a:solidFill>
                     <a:srgbClr val="000000"/>
                   </a:solidFill>
@@ -5661,7 +5653,7 @@
             <a:fld id="{93BCDC2B-E37E-7845-AABF-FC5B18D3CD04}" type="datetime1">
               <a:rPr lang="en-US" altLang="zh-CN" smtClean="0"/>
               <a:pPr/>
-              <a:t>3/26/2019</a:t>
+              <a:t>3/28/2019</a:t>
             </a:fld>
             <a:endParaRPr lang="en-US" altLang="zh-CN"/>
           </a:p>
@@ -5761,14 +5753,14 @@
           </a:ln>
           <a:extLst>
             <a:ext uri="{909E8E84-426E-40dd-AFC4-6F175D3DCCD1}">
-              <a14:hiddenFill xmlns="" xmlns:a14="http://schemas.microsoft.com/office/drawing/2010/main">
+              <a14:hiddenFill xmlns:a14="http://schemas.microsoft.com/office/drawing/2010/main" xmlns="">
                 <a:solidFill>
                   <a:srgbClr val="FFFFFF"/>
                 </a:solidFill>
               </a14:hiddenFill>
             </a:ext>
             <a:ext uri="{91240B29-F687-4f45-9708-019B960494DF}">
-              <a14:hiddenLine xmlns="" xmlns:a14="http://schemas.microsoft.com/office/drawing/2010/main" w="9525">
+              <a14:hiddenLine xmlns:a14="http://schemas.microsoft.com/office/drawing/2010/main" xmlns="" w="9525">
                 <a:solidFill>
                   <a:srgbClr val="000000"/>
                 </a:solidFill>
@@ -5987,14 +5979,14 @@
             </a:ln>
             <a:extLst>
               <a:ext uri="{909E8E84-426E-40dd-AFC4-6F175D3DCCD1}">
-                <a14:hiddenFill xmlns="" xmlns:a14="http://schemas.microsoft.com/office/drawing/2010/main">
+                <a14:hiddenFill xmlns:a14="http://schemas.microsoft.com/office/drawing/2010/main" xmlns="">
                   <a:solidFill>
                     <a:srgbClr val="FFFFFF"/>
                   </a:solidFill>
                 </a14:hiddenFill>
               </a:ext>
               <a:ext uri="{91240B29-F687-4f45-9708-019B960494DF}">
-                <a14:hiddenLine xmlns="" xmlns:a14="http://schemas.microsoft.com/office/drawing/2010/main" w="9525">
+                <a14:hiddenLine xmlns:a14="http://schemas.microsoft.com/office/drawing/2010/main" xmlns="" w="9525">
                   <a:solidFill>
                     <a:srgbClr val="000000"/>
                   </a:solidFill>
@@ -6237,14 +6229,14 @@
           </a:ln>
           <a:extLst>
             <a:ext uri="{909E8E84-426E-40dd-AFC4-6F175D3DCCD1}">
-              <a14:hiddenFill xmlns:a14="http://schemas.microsoft.com/office/drawing/2010/main" xmlns="">
+              <a14:hiddenFill xmlns="" xmlns:a14="http://schemas.microsoft.com/office/drawing/2010/main">
                 <a:solidFill>
                   <a:srgbClr val="FFFFFF"/>
                 </a:solidFill>
               </a14:hiddenFill>
             </a:ext>
             <a:ext uri="{91240B29-F687-4f45-9708-019B960494DF}">
-              <a14:hiddenLine xmlns:a14="http://schemas.microsoft.com/office/drawing/2010/main" xmlns="" w="9525">
+              <a14:hiddenLine xmlns="" xmlns:a14="http://schemas.microsoft.com/office/drawing/2010/main" w="9525">
                 <a:solidFill>
                   <a:srgbClr val="000000"/>
                 </a:solidFill>
@@ -6498,14 +6490,14 @@
             </a:ln>
             <a:extLst>
               <a:ext uri="{909E8E84-426E-40dd-AFC4-6F175D3DCCD1}">
-                <a14:hiddenFill xmlns:a14="http://schemas.microsoft.com/office/drawing/2010/main" xmlns="">
+                <a14:hiddenFill xmlns="" xmlns:a14="http://schemas.microsoft.com/office/drawing/2010/main">
                   <a:solidFill>
                     <a:srgbClr val="FFFFFF"/>
                   </a:solidFill>
                 </a14:hiddenFill>
               </a:ext>
               <a:ext uri="{91240B29-F687-4f45-9708-019B960494DF}">
-                <a14:hiddenLine xmlns:a14="http://schemas.microsoft.com/office/drawing/2010/main" xmlns="" w="9525">
+                <a14:hiddenLine xmlns="" xmlns:a14="http://schemas.microsoft.com/office/drawing/2010/main" w="9525">
                   <a:solidFill>
                     <a:srgbClr val="000000"/>
                   </a:solidFill>
@@ -6732,7 +6724,7 @@
             <a:fld id="{5CA8F940-8C0D-5F40-9547-CE421C3644DF}" type="datetime1">
               <a:rPr lang="en-US" altLang="zh-CN" smtClean="0"/>
               <a:pPr/>
-              <a:t>3/26/2019</a:t>
+              <a:t>3/28/2019</a:t>
             </a:fld>
             <a:endParaRPr lang="en-US" altLang="zh-CN"/>
           </a:p>
@@ -6832,14 +6824,14 @@
           </a:ln>
           <a:extLst>
             <a:ext uri="{909E8E84-426E-40dd-AFC4-6F175D3DCCD1}">
-              <a14:hiddenFill xmlns="" xmlns:a14="http://schemas.microsoft.com/office/drawing/2010/main">
+              <a14:hiddenFill xmlns:a14="http://schemas.microsoft.com/office/drawing/2010/main" xmlns="">
                 <a:solidFill>
                   <a:srgbClr val="FFFFFF"/>
                 </a:solidFill>
               </a14:hiddenFill>
             </a:ext>
             <a:ext uri="{91240B29-F687-4f45-9708-019B960494DF}">
-              <a14:hiddenLine xmlns="" xmlns:a14="http://schemas.microsoft.com/office/drawing/2010/main" w="9525">
+              <a14:hiddenLine xmlns:a14="http://schemas.microsoft.com/office/drawing/2010/main" xmlns="" w="9525">
                 <a:solidFill>
                   <a:srgbClr val="000000"/>
                 </a:solidFill>
@@ -7093,14 +7085,14 @@
             </a:ln>
             <a:extLst>
               <a:ext uri="{909E8E84-426E-40dd-AFC4-6F175D3DCCD1}">
-                <a14:hiddenFill xmlns="" xmlns:a14="http://schemas.microsoft.com/office/drawing/2010/main">
+                <a14:hiddenFill xmlns:a14="http://schemas.microsoft.com/office/drawing/2010/main" xmlns="">
                   <a:solidFill>
                     <a:srgbClr val="FFFFFF"/>
                   </a:solidFill>
                 </a14:hiddenFill>
               </a:ext>
               <a:ext uri="{91240B29-F687-4f45-9708-019B960494DF}">
-                <a14:hiddenLine xmlns="" xmlns:a14="http://schemas.microsoft.com/office/drawing/2010/main" w="9525">
+                <a14:hiddenLine xmlns:a14="http://schemas.microsoft.com/office/drawing/2010/main" xmlns="" w="9525">
                   <a:solidFill>
                     <a:srgbClr val="000000"/>
                   </a:solidFill>
@@ -7343,14 +7335,14 @@
           </a:ln>
           <a:extLst>
             <a:ext uri="{909E8E84-426E-40dd-AFC4-6F175D3DCCD1}">
-              <a14:hiddenFill xmlns:a14="http://schemas.microsoft.com/office/drawing/2010/main" xmlns="">
+              <a14:hiddenFill xmlns="" xmlns:a14="http://schemas.microsoft.com/office/drawing/2010/main">
                 <a:solidFill>
                   <a:srgbClr val="FFFFFF"/>
                 </a:solidFill>
               </a14:hiddenFill>
             </a:ext>
             <a:ext uri="{91240B29-F687-4f45-9708-019B960494DF}">
-              <a14:hiddenLine xmlns:a14="http://schemas.microsoft.com/office/drawing/2010/main" xmlns="" w="9525">
+              <a14:hiddenLine xmlns="" xmlns:a14="http://schemas.microsoft.com/office/drawing/2010/main" w="9525">
                 <a:solidFill>
                   <a:srgbClr val="000000"/>
                 </a:solidFill>
@@ -7734,14 +7726,14 @@
             </a:ln>
             <a:extLst>
               <a:ext uri="{909E8E84-426E-40dd-AFC4-6F175D3DCCD1}">
-                <a14:hiddenFill xmlns:a14="http://schemas.microsoft.com/office/drawing/2010/main" xmlns="">
+                <a14:hiddenFill xmlns="" xmlns:a14="http://schemas.microsoft.com/office/drawing/2010/main">
                   <a:solidFill>
                     <a:srgbClr val="FFFFFF"/>
                   </a:solidFill>
                 </a14:hiddenFill>
               </a:ext>
               <a:ext uri="{91240B29-F687-4f45-9708-019B960494DF}">
-                <a14:hiddenLine xmlns:a14="http://schemas.microsoft.com/office/drawing/2010/main" xmlns="" w="9525">
+                <a14:hiddenLine xmlns="" xmlns:a14="http://schemas.microsoft.com/office/drawing/2010/main" w="9525">
                   <a:solidFill>
                     <a:srgbClr val="000000"/>
                   </a:solidFill>
@@ -7780,7 +7772,7 @@
             <a:fld id="{DD399CBA-90F1-8740-8ACB-6A73FE316139}" type="datetime1">
               <a:rPr lang="en-US" altLang="zh-CN" smtClean="0"/>
               <a:pPr/>
-              <a:t>3/26/2019</a:t>
+              <a:t>3/28/2019</a:t>
             </a:fld>
             <a:endParaRPr lang="en-US" altLang="zh-CN"/>
           </a:p>
@@ -7880,14 +7872,14 @@
           </a:ln>
           <a:extLst>
             <a:ext uri="{909E8E84-426E-40dd-AFC4-6F175D3DCCD1}">
-              <a14:hiddenFill xmlns="" xmlns:a14="http://schemas.microsoft.com/office/drawing/2010/main">
+              <a14:hiddenFill xmlns:a14="http://schemas.microsoft.com/office/drawing/2010/main" xmlns="">
                 <a:solidFill>
                   <a:srgbClr val="FFFFFF"/>
                 </a:solidFill>
               </a14:hiddenFill>
             </a:ext>
             <a:ext uri="{91240B29-F687-4f45-9708-019B960494DF}">
-              <a14:hiddenLine xmlns="" xmlns:a14="http://schemas.microsoft.com/office/drawing/2010/main" w="9525">
+              <a14:hiddenLine xmlns:a14="http://schemas.microsoft.com/office/drawing/2010/main" xmlns="" w="9525">
                 <a:solidFill>
                   <a:srgbClr val="000000"/>
                 </a:solidFill>
@@ -8271,14 +8263,14 @@
             </a:ln>
             <a:extLst>
               <a:ext uri="{909E8E84-426E-40dd-AFC4-6F175D3DCCD1}">
-                <a14:hiddenFill xmlns="" xmlns:a14="http://schemas.microsoft.com/office/drawing/2010/main">
+                <a14:hiddenFill xmlns:a14="http://schemas.microsoft.com/office/drawing/2010/main" xmlns="">
                   <a:solidFill>
                     <a:srgbClr val="FFFFFF"/>
                   </a:solidFill>
                 </a14:hiddenFill>
               </a:ext>
               <a:ext uri="{91240B29-F687-4f45-9708-019B960494DF}">
-                <a14:hiddenLine xmlns="" xmlns:a14="http://schemas.microsoft.com/office/drawing/2010/main" w="9525">
+                <a14:hiddenLine xmlns:a14="http://schemas.microsoft.com/office/drawing/2010/main" xmlns="" w="9525">
                   <a:solidFill>
                     <a:srgbClr val="000000"/>
                   </a:solidFill>
@@ -8356,14 +8348,14 @@
           </a:ln>
           <a:extLst>
             <a:ext uri="{909E8E84-426E-40dd-AFC4-6F175D3DCCD1}">
-              <a14:hiddenFill xmlns="" xmlns:a14="http://schemas.microsoft.com/office/drawing/2010/main">
+              <a14:hiddenFill xmlns:a14="http://schemas.microsoft.com/office/drawing/2010/main" xmlns="">
                 <a:solidFill>
                   <a:srgbClr val="FFFFFF"/>
                 </a:solidFill>
               </a14:hiddenFill>
             </a:ext>
             <a:ext uri="{91240B29-F687-4f45-9708-019B960494DF}">
-              <a14:hiddenLine xmlns="" xmlns:a14="http://schemas.microsoft.com/office/drawing/2010/main" w="9525">
+              <a14:hiddenLine xmlns:a14="http://schemas.microsoft.com/office/drawing/2010/main" xmlns="" w="9525">
                 <a:solidFill>
                   <a:srgbClr val="000000"/>
                 </a:solidFill>
@@ -8582,14 +8574,14 @@
             </a:ln>
             <a:extLst>
               <a:ext uri="{909E8E84-426E-40dd-AFC4-6F175D3DCCD1}">
-                <a14:hiddenFill xmlns="" xmlns:a14="http://schemas.microsoft.com/office/drawing/2010/main">
+                <a14:hiddenFill xmlns:a14="http://schemas.microsoft.com/office/drawing/2010/main" xmlns="">
                   <a:solidFill>
                     <a:srgbClr val="FFFFFF"/>
                   </a:solidFill>
                 </a14:hiddenFill>
               </a:ext>
               <a:ext uri="{91240B29-F687-4f45-9708-019B960494DF}">
-                <a14:hiddenLine xmlns="" xmlns:a14="http://schemas.microsoft.com/office/drawing/2010/main" w="9525">
+                <a14:hiddenLine xmlns:a14="http://schemas.microsoft.com/office/drawing/2010/main" xmlns="" w="9525">
                   <a:solidFill>
                     <a:srgbClr val="000000"/>
                   </a:solidFill>
@@ -8946,7 +8938,7 @@
             <a:fld id="{93BCDC2B-E37E-7845-AABF-FC5B18D3CD04}" type="datetime1">
               <a:rPr lang="en-US" altLang="zh-CN"/>
               <a:pPr/>
-              <a:t>3/26/2019</a:t>
+              <a:t>3/28/2019</a:t>
             </a:fld>
             <a:endParaRPr lang="en-US" altLang="zh-CN"/>
           </a:p>
@@ -9075,14 +9067,14 @@
           </a:ln>
           <a:extLst>
             <a:ext uri="{909E8E84-426E-40dd-AFC4-6F175D3DCCD1}">
-              <a14:hiddenFill xmlns="" xmlns:a14="http://schemas.microsoft.com/office/drawing/2010/main">
+              <a14:hiddenFill xmlns:a14="http://schemas.microsoft.com/office/drawing/2010/main" xmlns="">
                 <a:solidFill>
                   <a:srgbClr val="FFFFFF"/>
                 </a:solidFill>
               </a14:hiddenFill>
             </a:ext>
             <a:ext uri="{91240B29-F687-4f45-9708-019B960494DF}">
-              <a14:hiddenLine xmlns="" xmlns:a14="http://schemas.microsoft.com/office/drawing/2010/main" w="9525">
+              <a14:hiddenLine xmlns:a14="http://schemas.microsoft.com/office/drawing/2010/main" xmlns="" w="9525">
                 <a:solidFill>
                   <a:srgbClr val="000000"/>
                 </a:solidFill>
@@ -9336,14 +9328,14 @@
             </a:ln>
             <a:extLst>
               <a:ext uri="{909E8E84-426E-40dd-AFC4-6F175D3DCCD1}">
-                <a14:hiddenFill xmlns="" xmlns:a14="http://schemas.microsoft.com/office/drawing/2010/main">
+                <a14:hiddenFill xmlns:a14="http://schemas.microsoft.com/office/drawing/2010/main" xmlns="">
                   <a:solidFill>
                     <a:srgbClr val="FFFFFF"/>
                   </a:solidFill>
                 </a14:hiddenFill>
               </a:ext>
               <a:ext uri="{91240B29-F687-4f45-9708-019B960494DF}">
-                <a14:hiddenLine xmlns="" xmlns:a14="http://schemas.microsoft.com/office/drawing/2010/main" w="9525">
+                <a14:hiddenLine xmlns:a14="http://schemas.microsoft.com/office/drawing/2010/main" xmlns="" w="9525">
                   <a:solidFill>
                     <a:srgbClr val="000000"/>
                   </a:solidFill>
@@ -9570,7 +9562,7 @@
             <a:fld id="{5CA8F940-8C0D-5F40-9547-CE421C3644DF}" type="datetime1">
               <a:rPr lang="en-US" altLang="zh-CN"/>
               <a:pPr/>
-              <a:t>3/26/2019</a:t>
+              <a:t>3/28/2019</a:t>
             </a:fld>
             <a:endParaRPr lang="en-US" altLang="zh-CN"/>
           </a:p>
@@ -9699,14 +9691,14 @@
           </a:ln>
           <a:extLst>
             <a:ext uri="{909E8E84-426E-40dd-AFC4-6F175D3DCCD1}">
-              <a14:hiddenFill xmlns="" xmlns:a14="http://schemas.microsoft.com/office/drawing/2010/main">
+              <a14:hiddenFill xmlns:a14="http://schemas.microsoft.com/office/drawing/2010/main" xmlns="">
                 <a:solidFill>
                   <a:srgbClr val="FFFFFF"/>
                 </a:solidFill>
               </a14:hiddenFill>
             </a:ext>
             <a:ext uri="{91240B29-F687-4f45-9708-019B960494DF}">
-              <a14:hiddenLine xmlns="" xmlns:a14="http://schemas.microsoft.com/office/drawing/2010/main" w="9525">
+              <a14:hiddenLine xmlns:a14="http://schemas.microsoft.com/office/drawing/2010/main" xmlns="" w="9525">
                 <a:solidFill>
                   <a:srgbClr val="000000"/>
                 </a:solidFill>
@@ -10090,14 +10082,14 @@
             </a:ln>
             <a:extLst>
               <a:ext uri="{909E8E84-426E-40dd-AFC4-6F175D3DCCD1}">
-                <a14:hiddenFill xmlns="" xmlns:a14="http://schemas.microsoft.com/office/drawing/2010/main">
+                <a14:hiddenFill xmlns:a14="http://schemas.microsoft.com/office/drawing/2010/main" xmlns="">
                   <a:solidFill>
                     <a:srgbClr val="FFFFFF"/>
                   </a:solidFill>
                 </a14:hiddenFill>
               </a:ext>
               <a:ext uri="{91240B29-F687-4f45-9708-019B960494DF}">
-                <a14:hiddenLine xmlns="" xmlns:a14="http://schemas.microsoft.com/office/drawing/2010/main" w="9525">
+                <a14:hiddenLine xmlns:a14="http://schemas.microsoft.com/office/drawing/2010/main" xmlns="" w="9525">
                   <a:solidFill>
                     <a:srgbClr val="000000"/>
                   </a:solidFill>
@@ -10136,7 +10128,7 @@
             <a:fld id="{DD399CBA-90F1-8740-8ACB-6A73FE316139}" type="datetime1">
               <a:rPr lang="en-US" altLang="zh-CN"/>
               <a:pPr/>
-              <a:t>3/26/2019</a:t>
+              <a:t>3/28/2019</a:t>
             </a:fld>
             <a:endParaRPr lang="en-US" altLang="zh-CN"/>
           </a:p>
@@ -10327,7 +10319,7 @@
             <a:fld id="{E65CEB06-13C5-8042-B7D9-86F62FC68B21}" type="datetime1">
               <a:rPr lang="en-US" altLang="zh-CN"/>
               <a:pPr/>
-              <a:t>3/26/2019</a:t>
+              <a:t>3/28/2019</a:t>
             </a:fld>
             <a:endParaRPr lang="en-US" altLang="zh-CN"/>
           </a:p>
@@ -10586,7 +10578,7 @@
             <a:fld id="{2C31E0B7-D99D-9840-9AA4-AFE996601F1A}" type="datetime1">
               <a:rPr lang="en-US" altLang="zh-CN"/>
               <a:pPr/>
-              <a:t>3/26/2019</a:t>
+              <a:t>3/28/2019</a:t>
             </a:fld>
             <a:endParaRPr lang="en-US" altLang="zh-CN"/>
           </a:p>
@@ -10773,7 +10765,7 @@
             <a:fld id="{E65CEB06-13C5-8042-B7D9-86F62FC68B21}" type="datetime1">
               <a:rPr lang="en-US" altLang="zh-CN"/>
               <a:pPr/>
-              <a:t>3/26/2019</a:t>
+              <a:t>3/28/2019</a:t>
             </a:fld>
             <a:endParaRPr lang="en-US" altLang="zh-CN"/>
           </a:p>
@@ -11036,7 +11028,7 @@
             <a:fld id="{385F2447-58C6-0F4D-AFAC-D240FBEAC3D4}" type="datetime1">
               <a:rPr lang="en-US" altLang="zh-CN"/>
               <a:pPr/>
-              <a:t>3/26/2019</a:t>
+              <a:t>3/28/2019</a:t>
             </a:fld>
             <a:endParaRPr lang="en-US" altLang="zh-CN"/>
           </a:p>
@@ -11341,7 +11333,7 @@
             <a:fld id="{E90B6505-6397-EF47-ACB9-9C7F9DC228F7}" type="datetime1">
               <a:rPr lang="en-US" altLang="zh-CN"/>
               <a:pPr/>
-              <a:t>3/26/2019</a:t>
+              <a:t>3/28/2019</a:t>
             </a:fld>
             <a:endParaRPr lang="en-US" altLang="zh-CN"/>
           </a:p>
@@ -11780,7 +11772,7 @@
             <a:fld id="{7DA9DDF0-8E9D-F747-A826-0A16262FD38B}" type="datetime1">
               <a:rPr lang="en-US" altLang="zh-CN"/>
               <a:pPr/>
-              <a:t>3/26/2019</a:t>
+              <a:t>3/28/2019</a:t>
             </a:fld>
             <a:endParaRPr lang="en-US" altLang="zh-CN"/>
           </a:p>
@@ -11915,7 +11907,7 @@
             <a:fld id="{3C451A12-666D-2B4A-9912-EC4A679D5D15}" type="datetime1">
               <a:rPr lang="en-US" altLang="zh-CN"/>
               <a:pPr/>
-              <a:t>3/26/2019</a:t>
+              <a:t>3/28/2019</a:t>
             </a:fld>
             <a:endParaRPr lang="en-US" altLang="zh-CN"/>
           </a:p>
@@ -12027,7 +12019,7 @@
             <a:fld id="{E38B5506-74D3-1544-BC99-3AF1A8C1C66D}" type="datetime1">
               <a:rPr lang="en-US" altLang="zh-CN"/>
               <a:pPr/>
-              <a:t>3/26/2019</a:t>
+              <a:t>3/28/2019</a:t>
             </a:fld>
             <a:endParaRPr lang="en-US" altLang="zh-CN"/>
           </a:p>
@@ -12321,7 +12313,7 @@
             <a:fld id="{E54C1426-CCF5-AF49-BEFF-95069A0371A2}" type="datetime1">
               <a:rPr lang="en-US" altLang="zh-CN"/>
               <a:pPr/>
-              <a:t>3/26/2019</a:t>
+              <a:t>3/28/2019</a:t>
             </a:fld>
             <a:endParaRPr lang="en-US" altLang="zh-CN"/>
           </a:p>
@@ -12597,7 +12589,7 @@
             <a:fld id="{F5DD3FC9-CD0F-8D4D-89C4-5B675B0D57BB}" type="datetime1">
               <a:rPr lang="en-US" altLang="zh-CN"/>
               <a:pPr/>
-              <a:t>3/26/2019</a:t>
+              <a:t>3/28/2019</a:t>
             </a:fld>
             <a:endParaRPr lang="en-US" altLang="zh-CN"/>
           </a:p>
@@ -12784,7 +12776,7 @@
             <a:fld id="{8CD81206-CB00-054A-A73E-85C388CF01BA}" type="datetime1">
               <a:rPr lang="en-US" altLang="zh-CN"/>
               <a:pPr/>
-              <a:t>3/26/2019</a:t>
+              <a:t>3/28/2019</a:t>
             </a:fld>
             <a:endParaRPr lang="en-US" altLang="zh-CN"/>
           </a:p>
@@ -13047,7 +13039,7 @@
             <a:fld id="{385F2447-58C6-0F4D-AFAC-D240FBEAC3D4}" type="datetime1">
               <a:rPr lang="en-US" altLang="zh-CN"/>
               <a:pPr/>
-              <a:t>3/26/2019</a:t>
+              <a:t>3/28/2019</a:t>
             </a:fld>
             <a:endParaRPr lang="en-US" altLang="zh-CN"/>
           </a:p>
@@ -13244,7 +13236,7 @@
             <a:fld id="{763C9DB7-BA8E-3248-A482-551635BAD7C2}" type="datetime1">
               <a:rPr lang="en-US" altLang="zh-CN"/>
               <a:pPr/>
-              <a:t>3/26/2019</a:t>
+              <a:t>3/28/2019</a:t>
             </a:fld>
             <a:endParaRPr lang="en-US" altLang="zh-CN"/>
           </a:p>
@@ -13379,7 +13371,7 @@
             <a:fld id="{E076C303-4390-464C-B7E9-6F5306EF3170}" type="datetime1">
               <a:rPr lang="en-US" altLang="zh-CN"/>
               <a:pPr/>
-              <a:t>3/26/2019</a:t>
+              <a:t>3/28/2019</a:t>
             </a:fld>
             <a:endParaRPr lang="en-US" altLang="zh-CN"/>
           </a:p>
@@ -13684,7 +13676,7 @@
             <a:fld id="{E90B6505-6397-EF47-ACB9-9C7F9DC228F7}" type="datetime1">
               <a:rPr lang="en-US" altLang="zh-CN"/>
               <a:pPr/>
-              <a:t>3/26/2019</a:t>
+              <a:t>3/28/2019</a:t>
             </a:fld>
             <a:endParaRPr lang="en-US" altLang="zh-CN"/>
           </a:p>
@@ -14123,7 +14115,7 @@
             <a:fld id="{7DA9DDF0-8E9D-F747-A826-0A16262FD38B}" type="datetime1">
               <a:rPr lang="en-US" altLang="zh-CN"/>
               <a:pPr/>
-              <a:t>3/26/2019</a:t>
+              <a:t>3/28/2019</a:t>
             </a:fld>
             <a:endParaRPr lang="en-US" altLang="zh-CN"/>
           </a:p>
@@ -14258,7 +14250,7 @@
             <a:fld id="{3C451A12-666D-2B4A-9912-EC4A679D5D15}" type="datetime1">
               <a:rPr lang="en-US" altLang="zh-CN"/>
               <a:pPr/>
-              <a:t>3/26/2019</a:t>
+              <a:t>3/28/2019</a:t>
             </a:fld>
             <a:endParaRPr lang="en-US" altLang="zh-CN"/>
           </a:p>
@@ -14370,7 +14362,7 @@
             <a:fld id="{E38B5506-74D3-1544-BC99-3AF1A8C1C66D}" type="datetime1">
               <a:rPr lang="en-US" altLang="zh-CN"/>
               <a:pPr/>
-              <a:t>3/26/2019</a:t>
+              <a:t>3/28/2019</a:t>
             </a:fld>
             <a:endParaRPr lang="en-US" altLang="zh-CN"/>
           </a:p>
@@ -14664,7 +14656,7 @@
             <a:fld id="{E54C1426-CCF5-AF49-BEFF-95069A0371A2}" type="datetime1">
               <a:rPr lang="en-US" altLang="zh-CN"/>
               <a:pPr/>
-              <a:t>3/26/2019</a:t>
+              <a:t>3/28/2019</a:t>
             </a:fld>
             <a:endParaRPr lang="en-US" altLang="zh-CN"/>
           </a:p>
@@ -14937,7 +14929,7 @@
             <a:fld id="{F5DD3FC9-CD0F-8D4D-89C4-5B675B0D57BB}" type="datetime1">
               <a:rPr lang="en-US" altLang="zh-CN"/>
               <a:pPr/>
-              <a:t>3/26/2019</a:t>
+              <a:t>3/28/2019</a:t>
             </a:fld>
             <a:endParaRPr lang="en-US" altLang="zh-CN"/>
           </a:p>
@@ -15059,17 +15051,17 @@
           </a:ln>
           <a:extLst>
             <a:ext uri="{FAA26D3D-D897-4be2-8F04-BA451C77F1D7}">
-              <ma14:placeholderFlag xmlns="" xmlns:ma14="http://schemas.microsoft.com/office/mac/drawingml/2011/main" val="1"/>
+              <ma14:placeholderFlag xmlns:ma14="http://schemas.microsoft.com/office/mac/drawingml/2011/main" xmlns="" val="1"/>
             </a:ext>
             <a:ext uri="{909E8E84-426E-40dd-AFC4-6F175D3DCCD1}">
-              <a14:hiddenFill xmlns="" xmlns:a14="http://schemas.microsoft.com/office/drawing/2010/main">
+              <a14:hiddenFill xmlns:a14="http://schemas.microsoft.com/office/drawing/2010/main" xmlns="">
                 <a:solidFill>
                   <a:srgbClr val="FFFFFF"/>
                 </a:solidFill>
               </a14:hiddenFill>
             </a:ext>
             <a:ext uri="{91240B29-F687-4f45-9708-019B960494DF}">
-              <a14:hiddenLine xmlns="" xmlns:a14="http://schemas.microsoft.com/office/drawing/2010/main" w="9525">
+              <a14:hiddenLine xmlns:a14="http://schemas.microsoft.com/office/drawing/2010/main" xmlns="" w="9525">
                 <a:solidFill>
                   <a:srgbClr val="000000"/>
                 </a:solidFill>
@@ -15120,17 +15112,17 @@
           </a:ln>
           <a:extLst>
             <a:ext uri="{FAA26D3D-D897-4be2-8F04-BA451C77F1D7}">
-              <ma14:placeholderFlag xmlns="" xmlns:ma14="http://schemas.microsoft.com/office/mac/drawingml/2011/main" val="1"/>
+              <ma14:placeholderFlag xmlns:ma14="http://schemas.microsoft.com/office/mac/drawingml/2011/main" xmlns="" val="1"/>
             </a:ext>
             <a:ext uri="{909E8E84-426E-40dd-AFC4-6F175D3DCCD1}">
-              <a14:hiddenFill xmlns="" xmlns:a14="http://schemas.microsoft.com/office/drawing/2010/main">
+              <a14:hiddenFill xmlns:a14="http://schemas.microsoft.com/office/drawing/2010/main" xmlns="">
                 <a:solidFill>
                   <a:srgbClr val="FFFFFF"/>
                 </a:solidFill>
               </a14:hiddenFill>
             </a:ext>
             <a:ext uri="{91240B29-F687-4f45-9708-019B960494DF}">
-              <a14:hiddenLine xmlns="" xmlns:a14="http://schemas.microsoft.com/office/drawing/2010/main" w="9525">
+              <a14:hiddenLine xmlns:a14="http://schemas.microsoft.com/office/drawing/2010/main" xmlns="" w="9525">
                 <a:solidFill>
                   <a:srgbClr val="000000"/>
                 </a:solidFill>
@@ -15224,7 +15216,7 @@
             <a:fld id="{DF89C5E0-80CB-C842-991E-0650A17D1E84}" type="datetime1">
               <a:rPr lang="en-US" altLang="zh-CN"/>
               <a:pPr/>
-              <a:t>3/26/2019</a:t>
+              <a:t>3/28/2019</a:t>
             </a:fld>
             <a:endParaRPr lang="en-US" altLang="zh-CN"/>
           </a:p>
@@ -15777,17 +15769,17 @@
           </a:ln>
           <a:extLst>
             <a:ext uri="{FAA26D3D-D897-4be2-8F04-BA451C77F1D7}">
-              <ma14:placeholderFlag xmlns:ma14="http://schemas.microsoft.com/office/mac/drawingml/2011/main" xmlns="" val="1"/>
+              <ma14:placeholderFlag xmlns="" xmlns:ma14="http://schemas.microsoft.com/office/mac/drawingml/2011/main" val="1"/>
             </a:ext>
             <a:ext uri="{909E8E84-426E-40dd-AFC4-6F175D3DCCD1}">
-              <a14:hiddenFill xmlns:a14="http://schemas.microsoft.com/office/drawing/2010/main" xmlns="">
+              <a14:hiddenFill xmlns="" xmlns:a14="http://schemas.microsoft.com/office/drawing/2010/main">
                 <a:solidFill>
                   <a:srgbClr val="FFFFFF"/>
                 </a:solidFill>
               </a14:hiddenFill>
             </a:ext>
             <a:ext uri="{91240B29-F687-4f45-9708-019B960494DF}">
-              <a14:hiddenLine xmlns:a14="http://schemas.microsoft.com/office/drawing/2010/main" xmlns="" w="9525">
+              <a14:hiddenLine xmlns="" xmlns:a14="http://schemas.microsoft.com/office/drawing/2010/main" w="9525">
                 <a:solidFill>
                   <a:srgbClr val="000000"/>
                 </a:solidFill>
@@ -15839,17 +15831,17 @@
           </a:ln>
           <a:extLst>
             <a:ext uri="{FAA26D3D-D897-4be2-8F04-BA451C77F1D7}">
-              <ma14:placeholderFlag xmlns:ma14="http://schemas.microsoft.com/office/mac/drawingml/2011/main" xmlns="" val="1"/>
+              <ma14:placeholderFlag xmlns="" xmlns:ma14="http://schemas.microsoft.com/office/mac/drawingml/2011/main" val="1"/>
             </a:ext>
             <a:ext uri="{909E8E84-426E-40dd-AFC4-6F175D3DCCD1}">
-              <a14:hiddenFill xmlns:a14="http://schemas.microsoft.com/office/drawing/2010/main" xmlns="">
+              <a14:hiddenFill xmlns="" xmlns:a14="http://schemas.microsoft.com/office/drawing/2010/main">
                 <a:solidFill>
                   <a:srgbClr val="FFFFFF"/>
                 </a:solidFill>
               </a14:hiddenFill>
             </a:ext>
             <a:ext uri="{91240B29-F687-4f45-9708-019B960494DF}">
-              <a14:hiddenLine xmlns:a14="http://schemas.microsoft.com/office/drawing/2010/main" xmlns="" w="9525">
+              <a14:hiddenLine xmlns="" xmlns:a14="http://schemas.microsoft.com/office/drawing/2010/main" w="9525">
                 <a:solidFill>
                   <a:srgbClr val="000000"/>
                 </a:solidFill>
@@ -15943,7 +15935,7 @@
             <a:fld id="{A47398D4-8B5A-BE43-B588-3D17D5B3482C}" type="datetime1">
               <a:rPr lang="en-US" altLang="zh-CN" smtClean="0"/>
               <a:pPr/>
-              <a:t>3/26/2019</a:t>
+              <a:t>3/28/2019</a:t>
             </a:fld>
             <a:endParaRPr lang="en-US" altLang="zh-CN"/>
           </a:p>
@@ -16492,17 +16484,17 @@
           </a:ln>
           <a:extLst>
             <a:ext uri="{FAA26D3D-D897-4be2-8F04-BA451C77F1D7}">
-              <ma14:placeholderFlag xmlns:ma14="http://schemas.microsoft.com/office/mac/drawingml/2011/main" xmlns="" val="1"/>
+              <ma14:placeholderFlag xmlns="" xmlns:ma14="http://schemas.microsoft.com/office/mac/drawingml/2011/main" val="1"/>
             </a:ext>
             <a:ext uri="{909E8E84-426E-40dd-AFC4-6F175D3DCCD1}">
-              <a14:hiddenFill xmlns:a14="http://schemas.microsoft.com/office/drawing/2010/main" xmlns="">
+              <a14:hiddenFill xmlns="" xmlns:a14="http://schemas.microsoft.com/office/drawing/2010/main">
                 <a:solidFill>
                   <a:srgbClr val="FFFFFF"/>
                 </a:solidFill>
               </a14:hiddenFill>
             </a:ext>
             <a:ext uri="{91240B29-F687-4f45-9708-019B960494DF}">
-              <a14:hiddenLine xmlns:a14="http://schemas.microsoft.com/office/drawing/2010/main" xmlns="" w="9525">
+              <a14:hiddenLine xmlns="" xmlns:a14="http://schemas.microsoft.com/office/drawing/2010/main" w="9525">
                 <a:solidFill>
                   <a:srgbClr val="000000"/>
                 </a:solidFill>
@@ -16554,17 +16546,17 @@
           </a:ln>
           <a:extLst>
             <a:ext uri="{FAA26D3D-D897-4be2-8F04-BA451C77F1D7}">
-              <ma14:placeholderFlag xmlns:ma14="http://schemas.microsoft.com/office/mac/drawingml/2011/main" xmlns="" val="1"/>
+              <ma14:placeholderFlag xmlns="" xmlns:ma14="http://schemas.microsoft.com/office/mac/drawingml/2011/main" val="1"/>
             </a:ext>
             <a:ext uri="{909E8E84-426E-40dd-AFC4-6F175D3DCCD1}">
-              <a14:hiddenFill xmlns:a14="http://schemas.microsoft.com/office/drawing/2010/main" xmlns="">
+              <a14:hiddenFill xmlns="" xmlns:a14="http://schemas.microsoft.com/office/drawing/2010/main">
                 <a:solidFill>
                   <a:srgbClr val="FFFFFF"/>
                 </a:solidFill>
               </a14:hiddenFill>
             </a:ext>
             <a:ext uri="{91240B29-F687-4f45-9708-019B960494DF}">
-              <a14:hiddenLine xmlns:a14="http://schemas.microsoft.com/office/drawing/2010/main" xmlns="" w="9525">
+              <a14:hiddenLine xmlns="" xmlns:a14="http://schemas.microsoft.com/office/drawing/2010/main" w="9525">
                 <a:solidFill>
                   <a:srgbClr val="000000"/>
                 </a:solidFill>
@@ -16659,7 +16651,7 @@
             <a:fld id="{DF89C5E0-80CB-C842-991E-0650A17D1E84}" type="datetime1">
               <a:rPr lang="en-US" altLang="zh-CN"/>
               <a:pPr/>
-              <a:t>3/26/2019</a:t>
+              <a:t>3/28/2019</a:t>
             </a:fld>
             <a:endParaRPr lang="en-US" altLang="zh-CN"/>
           </a:p>
@@ -17228,14 +17220,14 @@
           </a:ln>
           <a:extLst>
             <a:ext uri="{909E8E84-426E-40dd-AFC4-6F175D3DCCD1}">
-              <a14:hiddenFill xmlns:a14="http://schemas.microsoft.com/office/drawing/2010/main" xmlns="">
+              <a14:hiddenFill xmlns="" xmlns:a14="http://schemas.microsoft.com/office/drawing/2010/main">
                 <a:solidFill>
                   <a:srgbClr val="FFFFFF"/>
                 </a:solidFill>
               </a14:hiddenFill>
             </a:ext>
             <a:ext uri="{91240B29-F687-4f45-9708-019B960494DF}">
-              <a14:hiddenLine xmlns:a14="http://schemas.microsoft.com/office/drawing/2010/main" xmlns="" w="9525">
+              <a14:hiddenLine xmlns="" xmlns:a14="http://schemas.microsoft.com/office/drawing/2010/main" w="9525">
                 <a:solidFill>
                   <a:srgbClr val="000000"/>
                 </a:solidFill>
@@ -17273,12 +17265,6 @@
                 <a:ea typeface="ＭＳ Ｐゴシック" charset="-128"/>
               </a:rPr>
               <a:t>Optimizing The Contra-Directional Couplers Models</a:t>
-            </a:r>
-            <a:r>
-              <a:rPr kumimoji="0" lang="en-US" altLang="zh-CN" sz="3200" b="1" dirty="0" smtClean="0">
-                <a:ea typeface="ＭＳ Ｐゴシック" charset="-128"/>
-              </a:rPr>
-              <a:t/>
             </a:r>
             <a:br>
               <a:rPr kumimoji="0" lang="en-US" altLang="zh-CN" sz="3200" b="1" dirty="0" smtClean="0">
@@ -17351,14 +17337,14 @@
           </a:ln>
           <a:extLst>
             <a:ext uri="{909E8E84-426E-40dd-AFC4-6F175D3DCCD1}">
-              <a14:hiddenFill xmlns:a14="http://schemas.microsoft.com/office/drawing/2010/main" xmlns="">
+              <a14:hiddenFill xmlns="" xmlns:a14="http://schemas.microsoft.com/office/drawing/2010/main">
                 <a:solidFill>
                   <a:srgbClr val="FFFFFF"/>
                 </a:solidFill>
               </a14:hiddenFill>
             </a:ext>
             <a:ext uri="{91240B29-F687-4f45-9708-019B960494DF}">
-              <a14:hiddenLine xmlns:a14="http://schemas.microsoft.com/office/drawing/2010/main" xmlns="" w="9525">
+              <a14:hiddenLine xmlns="" xmlns:a14="http://schemas.microsoft.com/office/drawing/2010/main" w="9525">
                 <a:solidFill>
                   <a:srgbClr val="000000"/>
                 </a:solidFill>
@@ -17525,18 +17511,7 @@
                 <a:ea typeface="Times New Roman" charset="0"/>
                 <a:cs typeface="Times New Roman" charset="0"/>
               </a:rPr>
-              <a:t>The </a:t>
-            </a:r>
-            <a:r>
-              <a:rPr kumimoji="0" lang="en-US" altLang="zh-CN" sz="2000" dirty="0" smtClean="0">
-                <a:solidFill>
-                  <a:schemeClr val="bg1"/>
-                </a:solidFill>
-                <a:latin typeface="+mj-lt"/>
-                <a:ea typeface="Times New Roman" charset="0"/>
-                <a:cs typeface="Times New Roman" charset="0"/>
-              </a:rPr>
-              <a:t>University of British Columbia</a:t>
+              <a:t>The University of British Columbia</a:t>
             </a:r>
           </a:p>
         </p:txBody>
@@ -18066,15 +18041,7 @@
                   <a:srgbClr val="002060"/>
                 </a:solidFill>
               </a:rPr>
-              <a:t>Conclusion: bandwidth is somewhat stable, central wavelength not quite</a:t>
-            </a:r>
-            <a:r>
-              <a:rPr lang="en-US" sz="1300" dirty="0" smtClean="0">
-                <a:solidFill>
-                  <a:srgbClr val="002060"/>
-                </a:solidFill>
-              </a:rPr>
-              <a:t>.</a:t>
+              <a:t>Conclusion: bandwidth is somewhat stable, central wavelength not quite.</a:t>
             </a:r>
           </a:p>
           <a:p>
@@ -18109,11 +18076,6 @@
               </a:rPr>
               <a:t>Wavelength-dependent coupling coefficient</a:t>
             </a:r>
-            <a:endParaRPr lang="en-US" sz="1300" dirty="0" smtClean="0">
-              <a:solidFill>
-                <a:srgbClr val="002060"/>
-              </a:solidFill>
-            </a:endParaRPr>
           </a:p>
         </p:txBody>
       </p:sp>
@@ -18508,48 +18470,20 @@
               <a:buChar char="•"/>
             </a:pPr>
             <a:r>
-              <a:rPr lang="en-US" sz="1300" dirty="0" smtClean="0">
+              <a:rPr lang="en-US" sz="1300" dirty="0">
                 <a:solidFill>
                   <a:srgbClr val="002060"/>
                 </a:solidFill>
               </a:rPr>
-              <a:t>Jonathan St-Yves</a:t>
-            </a:r>
-          </a:p>
-          <a:p>
-            <a:pPr marL="285750" indent="-285750">
-              <a:buFont typeface="Arial" panose="020B0604020202020204" pitchFamily="34" charset="0"/>
-              <a:buChar char="•"/>
-            </a:pPr>
-            <a:r>
-              <a:rPr lang="en-US" sz="1300" dirty="0" smtClean="0">
+              <a:t>Mustafa </a:t>
+            </a:r>
+            <a:r>
+              <a:rPr lang="en-US" sz="1300" dirty="0" err="1" smtClean="0">
                 <a:solidFill>
                   <a:srgbClr val="002060"/>
                 </a:solidFill>
               </a:rPr>
-              <a:t>Simon Belanger</a:t>
-            </a:r>
-          </a:p>
-          <a:p>
-            <a:pPr marL="285750" indent="-285750">
-              <a:buFont typeface="Arial" panose="020B0604020202020204" pitchFamily="34" charset="0"/>
-              <a:buChar char="•"/>
-            </a:pPr>
-            <a:r>
-              <a:rPr lang="en-US" sz="1300" dirty="0" smtClean="0">
-                <a:solidFill>
-                  <a:srgbClr val="002060"/>
-                </a:solidFill>
-              </a:rPr>
-              <a:t>Dominique </a:t>
-            </a:r>
-            <a:r>
-              <a:rPr lang="en-US" sz="1300" dirty="0" err="1" smtClean="0">
-                <a:solidFill>
-                  <a:srgbClr val="002060"/>
-                </a:solidFill>
-              </a:rPr>
-              <a:t>Charron</a:t>
+              <a:t>Hammood</a:t>
             </a:r>
             <a:endParaRPr lang="en-US" sz="1300" dirty="0" smtClean="0">
               <a:solidFill>
@@ -18568,7 +18502,15 @@
                   <a:srgbClr val="002060"/>
                 </a:solidFill>
               </a:rPr>
-              <a:t>Han Yun</a:t>
+              <a:t>Jonathan </a:t>
+            </a:r>
+            <a:r>
+              <a:rPr lang="en-US" sz="1300" dirty="0" smtClean="0">
+                <a:solidFill>
+                  <a:srgbClr val="002060"/>
+                </a:solidFill>
+              </a:rPr>
+              <a:t>St-Yves</a:t>
             </a:r>
           </a:p>
           <a:p>
@@ -18582,7 +18524,7 @@
                   <a:srgbClr val="002060"/>
                 </a:solidFill>
               </a:rPr>
-              <a:t>Xu Wang</a:t>
+              <a:t>Simon Belanger</a:t>
             </a:r>
           </a:p>
           <a:p>
@@ -18596,7 +18538,7 @@
                   <a:srgbClr val="002060"/>
                 </a:solidFill>
               </a:rPr>
-              <a:t>Mustafa </a:t>
+              <a:t>Dominique </a:t>
             </a:r>
             <a:r>
               <a:rPr lang="en-US" sz="1300" dirty="0" err="1" smtClean="0">
@@ -18604,7 +18546,7 @@
                   <a:srgbClr val="002060"/>
                 </a:solidFill>
               </a:rPr>
-              <a:t>Hammood</a:t>
+              <a:t>Charron</a:t>
             </a:r>
             <a:endParaRPr lang="en-US" sz="1300" dirty="0" smtClean="0">
               <a:solidFill>
@@ -18623,7 +18565,43 @@
                   <a:srgbClr val="002060"/>
                 </a:solidFill>
               </a:rPr>
-              <a:t>Ajay Mistry</a:t>
+              <a:t>Han Yun</a:t>
+            </a:r>
+          </a:p>
+          <a:p>
+            <a:pPr marL="285750" indent="-285750">
+              <a:buFont typeface="Arial" panose="020B0604020202020204" pitchFamily="34" charset="0"/>
+              <a:buChar char="•"/>
+            </a:pPr>
+            <a:r>
+              <a:rPr lang="en-US" sz="1300" dirty="0" smtClean="0">
+                <a:solidFill>
+                  <a:srgbClr val="002060"/>
+                </a:solidFill>
+              </a:rPr>
+              <a:t>Xu Wang</a:t>
+            </a:r>
+          </a:p>
+          <a:p>
+            <a:pPr marL="285750" indent="-285750">
+              <a:buFont typeface="Arial" panose="020B0604020202020204" pitchFamily="34" charset="0"/>
+              <a:buChar char="•"/>
+            </a:pPr>
+            <a:r>
+              <a:rPr lang="en-US" sz="1300" dirty="0" smtClean="0">
+                <a:solidFill>
+                  <a:srgbClr val="002060"/>
+                </a:solidFill>
+              </a:rPr>
+              <a:t>Ajay </a:t>
+            </a:r>
+            <a:r>
+              <a:rPr lang="en-US" sz="1300" dirty="0" smtClean="0">
+                <a:solidFill>
+                  <a:srgbClr val="002060"/>
+                </a:solidFill>
+              </a:rPr>
+              <a:t>Mistry</a:t>
             </a:r>
           </a:p>
           <a:p>
@@ -20364,15 +20342,7 @@
                   <a:srgbClr val="002060"/>
                 </a:solidFill>
               </a:rPr>
-              <a:t>) means we have to sweep a large range to find where the contra-coupling forbidden band occurs. This is time and resource consuming</a:t>
-            </a:r>
-            <a:r>
-              <a:rPr lang="en-US" dirty="0" smtClean="0">
-                <a:solidFill>
-                  <a:srgbClr val="002060"/>
-                </a:solidFill>
-              </a:rPr>
-              <a:t>. Below plot is generated from 20 points</a:t>
+              <a:t>) means we have to sweep a large range to find where the contra-coupling forbidden band occurs. This is time and resource consuming. Below plot is generated from 20 points</a:t>
             </a:r>
             <a:endParaRPr lang="en-US" dirty="0">
               <a:solidFill>
@@ -20949,15 +20919,7 @@
                   <a:srgbClr val="002060"/>
                 </a:solidFill>
               </a:rPr>
-              <a:t> </a:t>
-            </a:r>
-            <a:r>
-              <a:rPr lang="en-US" sz="1500" b="1" dirty="0" smtClean="0">
-                <a:solidFill>
-                  <a:srgbClr val="002060"/>
-                </a:solidFill>
-              </a:rPr>
-              <a:t>&lt;10%</a:t>
+              <a:t> &lt;10%</a:t>
             </a:r>
             <a:endParaRPr lang="en-US" sz="1500" b="1" dirty="0">
               <a:solidFill>
@@ -21030,11 +20992,7 @@
             </a:r>
             <a:r>
               <a:rPr lang="en-US" sz="2000" b="1" dirty="0" smtClean="0"/>
-              <a:t>find Kappa? </a:t>
-            </a:r>
-            <a:r>
-              <a:rPr lang="en-US" sz="2000" b="1" dirty="0" smtClean="0"/>
-              <a:t>Even faster? MODE EME Simulation</a:t>
+              <a:t>find Kappa? Even faster? MODE EME Simulation</a:t>
             </a:r>
             <a:endParaRPr lang="en-US" sz="2000" b="1" dirty="0"/>
           </a:p>
@@ -21160,15 +21118,7 @@
                   <a:srgbClr val="002060"/>
                 </a:solidFill>
               </a:rPr>
-              <a:t>Feed the kappa int</a:t>
-            </a:r>
-            <a:r>
-              <a:rPr lang="en-US" dirty="0" smtClean="0">
-                <a:solidFill>
-                  <a:srgbClr val="002060"/>
-                </a:solidFill>
-              </a:rPr>
-              <a:t>o coupled-mode theory, transfer matrix </a:t>
+              <a:t>Feed the kappa into coupled-mode theory, transfer matrix </a:t>
             </a:r>
             <a:r>
               <a:rPr lang="en-US" dirty="0" err="1" smtClean="0">
@@ -21499,45 +21449,8 @@
                   <a:srgbClr val="002060"/>
                 </a:solidFill>
               </a:rPr>
-              <a:t>Dual </a:t>
-            </a:r>
-            <a:r>
-              <a:rPr lang="en-US" dirty="0" smtClean="0">
-                <a:solidFill>
-                  <a:srgbClr val="002060"/>
-                </a:solidFill>
-              </a:rPr>
-              <a:t>polarizations: </a:t>
-            </a:r>
-            <a:r>
-              <a:rPr lang="en-US" dirty="0" smtClean="0">
-                <a:solidFill>
-                  <a:srgbClr val="002060"/>
-                </a:solidFill>
-              </a:rPr>
-              <a:t>TE-TM, compact model includes </a:t>
-            </a:r>
-            <a:r>
-              <a:rPr lang="en-US" dirty="0" smtClean="0">
-                <a:solidFill>
-                  <a:srgbClr val="002060"/>
-                </a:solidFill>
-              </a:rPr>
-              <a:t>two-</a:t>
-            </a:r>
-            <a:r>
-              <a:rPr lang="en-US" dirty="0" smtClean="0">
-                <a:solidFill>
-                  <a:srgbClr val="002060"/>
-                </a:solidFill>
-              </a:rPr>
-              <a:t>modes support</a:t>
-            </a:r>
-            <a:endParaRPr lang="en-US" dirty="0" smtClean="0">
-              <a:solidFill>
-                <a:srgbClr val="002060"/>
-              </a:solidFill>
-            </a:endParaRPr>
+              <a:t>Dual polarizations: TE-TM, compact model includes two-modes support</a:t>
+            </a:r>
           </a:p>
           <a:p>
             <a:pPr marL="285750" indent="-285750">
@@ -21561,53 +21474,8 @@
                   <a:srgbClr val="002060"/>
                 </a:solidFill>
               </a:rPr>
-              <a:t>Two new approaches </a:t>
-            </a:r>
-            <a:r>
-              <a:rPr lang="en-US" dirty="0" smtClean="0">
-                <a:solidFill>
-                  <a:srgbClr val="002060"/>
-                </a:solidFill>
-              </a:rPr>
-              <a:t>to find the bandgap and Kappa – reduce FDTD simulation time from more than 5 hours to an improved, </a:t>
-            </a:r>
-            <a:r>
-              <a:rPr lang="en-US" dirty="0" smtClean="0">
-                <a:solidFill>
-                  <a:srgbClr val="002060"/>
-                </a:solidFill>
-              </a:rPr>
-              <a:t>to </a:t>
-            </a:r>
-            <a:r>
-              <a:rPr lang="en-US" dirty="0" smtClean="0">
-                <a:solidFill>
-                  <a:srgbClr val="002060"/>
-                </a:solidFill>
-              </a:rPr>
-              <a:t>less </a:t>
-            </a:r>
-            <a:r>
-              <a:rPr lang="en-US" dirty="0" smtClean="0">
-                <a:solidFill>
-                  <a:srgbClr val="002060"/>
-                </a:solidFill>
-              </a:rPr>
-              <a:t>than </a:t>
-            </a:r>
-            <a:r>
-              <a:rPr lang="en-US" dirty="0" smtClean="0">
-                <a:solidFill>
-                  <a:srgbClr val="002060"/>
-                </a:solidFill>
-              </a:rPr>
-              <a:t>a minutes. This was the simulation flow bottleneck.</a:t>
-            </a:r>
-            <a:endParaRPr lang="en-US" dirty="0" smtClean="0">
-              <a:solidFill>
-                <a:srgbClr val="002060"/>
-              </a:solidFill>
-            </a:endParaRPr>
+              <a:t>Two new approaches to find the bandgap and Kappa – reduce FDTD simulation time from more than 5 hours to an improved, to less than a minutes. This was the simulation flow bottleneck.</a:t>
+            </a:r>
           </a:p>
           <a:p>
             <a:pPr marL="285750" indent="-285750">

</xml_diff>

<commit_message>
solvers: contraDC: added bandwidth analysis
</commit_message>
<xml_diff>
--- a/SiEPIC_Photonics_Package/solvers_simulators/contraDC/Documentation/contraDC_Simulator.pptx
+++ b/SiEPIC_Photonics_Package/solvers_simulators/contraDC/Documentation/contraDC_Simulator.pptx
@@ -20,8 +20,8 @@
     <p:sldId id="452" r:id="rId8"/>
     <p:sldId id="453" r:id="rId9"/>
     <p:sldId id="454" r:id="rId10"/>
-    <p:sldId id="459" r:id="rId11"/>
-    <p:sldId id="456" r:id="rId12"/>
+    <p:sldId id="456" r:id="rId11"/>
+    <p:sldId id="459" r:id="rId12"/>
     <p:sldId id="458" r:id="rId13"/>
     <p:sldId id="455" r:id="rId14"/>
     <p:sldId id="457" r:id="rId15"/>
@@ -18313,6 +18313,54 @@
           </a:p>
         </p:txBody>
       </p:sp>
+      <p:pic>
+        <p:nvPicPr>
+          <p:cNvPr id="10" name="Picture 9"/>
+          <p:cNvPicPr>
+            <a:picLocks noChangeAspect="1"/>
+          </p:cNvPicPr>
+          <p:nvPr/>
+        </p:nvPicPr>
+        <p:blipFill>
+          <a:blip r:embed="rId4"/>
+          <a:stretch>
+            <a:fillRect/>
+          </a:stretch>
+        </p:blipFill>
+        <p:spPr>
+          <a:xfrm>
+            <a:off x="7111352" y="2112813"/>
+            <a:ext cx="1978896" cy="812298"/>
+          </a:xfrm>
+          <a:prstGeom prst="rect">
+            <a:avLst/>
+          </a:prstGeom>
+        </p:spPr>
+      </p:pic>
+      <p:pic>
+        <p:nvPicPr>
+          <p:cNvPr id="12" name="Picture 11"/>
+          <p:cNvPicPr>
+            <a:picLocks noChangeAspect="1"/>
+          </p:cNvPicPr>
+          <p:nvPr/>
+        </p:nvPicPr>
+        <p:blipFill>
+          <a:blip r:embed="rId5"/>
+          <a:stretch>
+            <a:fillRect/>
+          </a:stretch>
+        </p:blipFill>
+        <p:spPr>
+          <a:xfrm>
+            <a:off x="7111352" y="1139026"/>
+            <a:ext cx="1978896" cy="894296"/>
+          </a:xfrm>
+          <a:prstGeom prst="rect">
+            <a:avLst/>
+          </a:prstGeom>
+        </p:spPr>
+      </p:pic>
     </p:spTree>
     <p:extLst>
       <p:ext uri="{BB962C8B-B14F-4D97-AF65-F5344CB8AC3E}">
@@ -20987,12 +21035,8 @@
           <a:lstStyle/>
           <a:p>
             <a:r>
-              <a:rPr lang="en-US" sz="2000" b="1" dirty="0"/>
-              <a:t>How to </a:t>
-            </a:r>
-            <a:r>
-              <a:rPr lang="en-US" sz="2000" b="1" dirty="0" smtClean="0"/>
-              <a:t>find Kappa? Even faster? MODE EME Simulation</a:t>
+              <a:rPr lang="en-US" sz="2000" b="1" smtClean="0"/>
+              <a:t>What’s new?</a:t>
             </a:r>
             <a:endParaRPr lang="en-US" sz="2000" b="1" dirty="0"/>
           </a:p>
@@ -21039,6 +21083,348 @@
               <a:rPr lang="en-US" altLang="zh-CN" smtClean="0"/>
               <a:pPr/>
               <a:t>8</a:t>
+            </a:fld>
+            <a:endParaRPr lang="en-US" altLang="zh-CN"/>
+          </a:p>
+        </p:txBody>
+      </p:sp>
+      <p:sp>
+        <p:nvSpPr>
+          <p:cNvPr id="6" name="TextBox 5"/>
+          <p:cNvSpPr txBox="1"/>
+          <p:nvPr/>
+        </p:nvSpPr>
+        <p:spPr>
+          <a:xfrm>
+            <a:off x="457200" y="1182103"/>
+            <a:ext cx="8579296" cy="3970318"/>
+          </a:xfrm>
+          <a:prstGeom prst="rect">
+            <a:avLst/>
+          </a:prstGeom>
+          <a:noFill/>
+        </p:spPr>
+        <p:txBody>
+          <a:bodyPr wrap="square" rtlCol="0">
+            <a:spAutoFit/>
+          </a:bodyPr>
+          <a:lstStyle/>
+          <a:p>
+            <a:pPr marL="285750" indent="-285750">
+              <a:buFont typeface="Arial" panose="020B0604020202020204" pitchFamily="34" charset="0"/>
+              <a:buChar char="•"/>
+            </a:pPr>
+            <a:r>
+              <a:rPr lang="en-US" dirty="0" smtClean="0">
+                <a:solidFill>
+                  <a:srgbClr val="002060"/>
+                </a:solidFill>
+              </a:rPr>
+              <a:t>Fully automated flow </a:t>
+            </a:r>
+            <a:r>
+              <a:rPr lang="en-US" dirty="0">
+                <a:solidFill>
+                  <a:srgbClr val="002060"/>
+                </a:solidFill>
+              </a:rPr>
+              <a:t>i</a:t>
+            </a:r>
+            <a:r>
+              <a:rPr lang="en-US" dirty="0" smtClean="0">
+                <a:solidFill>
+                  <a:srgbClr val="002060"/>
+                </a:solidFill>
+              </a:rPr>
+              <a:t>n Python – no need for a MATLAB engine for coupled-mode theory or the setup of any 3</a:t>
+            </a:r>
+            <a:r>
+              <a:rPr lang="en-US" baseline="30000" dirty="0" smtClean="0">
+                <a:solidFill>
+                  <a:srgbClr val="002060"/>
+                </a:solidFill>
+              </a:rPr>
+              <a:t>rd</a:t>
+            </a:r>
+            <a:r>
+              <a:rPr lang="en-US" dirty="0" smtClean="0">
+                <a:solidFill>
+                  <a:srgbClr val="002060"/>
+                </a:solidFill>
+              </a:rPr>
+              <a:t> party tools (other than </a:t>
+            </a:r>
+            <a:r>
+              <a:rPr lang="en-US" dirty="0" err="1" smtClean="0">
+                <a:solidFill>
+                  <a:srgbClr val="002060"/>
+                </a:solidFill>
+              </a:rPr>
+              <a:t>Lumerical</a:t>
+            </a:r>
+            <a:r>
+              <a:rPr lang="en-US" dirty="0" smtClean="0">
+                <a:solidFill>
+                  <a:srgbClr val="002060"/>
+                </a:solidFill>
+              </a:rPr>
+              <a:t>)</a:t>
+            </a:r>
+          </a:p>
+          <a:p>
+            <a:pPr marL="285750" indent="-285750">
+              <a:buFont typeface="Arial" panose="020B0604020202020204" pitchFamily="34" charset="0"/>
+              <a:buChar char="•"/>
+            </a:pPr>
+            <a:endParaRPr lang="en-US" dirty="0" smtClean="0">
+              <a:solidFill>
+                <a:srgbClr val="002060"/>
+              </a:solidFill>
+            </a:endParaRPr>
+          </a:p>
+          <a:p>
+            <a:pPr marL="285750" indent="-285750">
+              <a:buFont typeface="Arial" panose="020B0604020202020204" pitchFamily="34" charset="0"/>
+              <a:buChar char="•"/>
+            </a:pPr>
+            <a:r>
+              <a:rPr lang="en-US" dirty="0">
+                <a:solidFill>
+                  <a:srgbClr val="002060"/>
+                </a:solidFill>
+              </a:rPr>
+              <a:t>Generates an S-parameter file (.</a:t>
+            </a:r>
+            <a:r>
+              <a:rPr lang="en-US" dirty="0" err="1">
+                <a:solidFill>
+                  <a:srgbClr val="002060"/>
+                </a:solidFill>
+              </a:rPr>
+              <a:t>dat</a:t>
+            </a:r>
+            <a:r>
+              <a:rPr lang="en-US" dirty="0">
+                <a:solidFill>
+                  <a:srgbClr val="002060"/>
+                </a:solidFill>
+              </a:rPr>
+              <a:t>) for circuit simulations</a:t>
+            </a:r>
+          </a:p>
+          <a:p>
+            <a:pPr marL="285750" indent="-285750">
+              <a:buFont typeface="Arial" panose="020B0604020202020204" pitchFamily="34" charset="0"/>
+              <a:buChar char="•"/>
+            </a:pPr>
+            <a:endParaRPr lang="en-US" dirty="0" smtClean="0">
+              <a:solidFill>
+                <a:srgbClr val="002060"/>
+              </a:solidFill>
+            </a:endParaRPr>
+          </a:p>
+          <a:p>
+            <a:pPr marL="285750" indent="-285750">
+              <a:buFont typeface="Arial" panose="020B0604020202020204" pitchFamily="34" charset="0"/>
+              <a:buChar char="•"/>
+            </a:pPr>
+            <a:r>
+              <a:rPr lang="en-US" dirty="0" smtClean="0">
+                <a:solidFill>
+                  <a:srgbClr val="002060"/>
+                </a:solidFill>
+              </a:rPr>
+              <a:t>Dual polarizations: TE-TM, compact model includes two-modes support</a:t>
+            </a:r>
+          </a:p>
+          <a:p>
+            <a:pPr marL="285750" indent="-285750">
+              <a:buFont typeface="Arial" panose="020B0604020202020204" pitchFamily="34" charset="0"/>
+              <a:buChar char="•"/>
+            </a:pPr>
+            <a:endParaRPr lang="en-US" dirty="0">
+              <a:solidFill>
+                <a:srgbClr val="002060"/>
+              </a:solidFill>
+            </a:endParaRPr>
+          </a:p>
+          <a:p>
+            <a:pPr marL="285750" indent="-285750">
+              <a:buFont typeface="Arial" panose="020B0604020202020204" pitchFamily="34" charset="0"/>
+              <a:buChar char="•"/>
+            </a:pPr>
+            <a:r>
+              <a:rPr lang="en-US" dirty="0" smtClean="0">
+                <a:solidFill>
+                  <a:srgbClr val="002060"/>
+                </a:solidFill>
+              </a:rPr>
+              <a:t>Two new approaches to find the bandgap and Kappa – reduce FDTD simulation time from more than 5 hours to an improved, to less than a minutes. This was the simulation flow bottleneck.</a:t>
+            </a:r>
+          </a:p>
+          <a:p>
+            <a:pPr marL="285750" indent="-285750">
+              <a:buFont typeface="Arial" panose="020B0604020202020204" pitchFamily="34" charset="0"/>
+              <a:buChar char="•"/>
+            </a:pPr>
+            <a:endParaRPr lang="en-US" dirty="0">
+              <a:solidFill>
+                <a:srgbClr val="002060"/>
+              </a:solidFill>
+            </a:endParaRPr>
+          </a:p>
+          <a:p>
+            <a:pPr marL="285750" indent="-285750">
+              <a:buFont typeface="Arial" panose="020B0604020202020204" pitchFamily="34" charset="0"/>
+              <a:buChar char="•"/>
+            </a:pPr>
+            <a:r>
+              <a:rPr lang="en-US" dirty="0" smtClean="0">
+                <a:solidFill>
+                  <a:srgbClr val="002060"/>
+                </a:solidFill>
+              </a:rPr>
+              <a:t>Accurately predicts and simulates the waveguide’s self-reflection</a:t>
+            </a:r>
+          </a:p>
+          <a:p>
+            <a:endParaRPr lang="en-US" dirty="0">
+              <a:solidFill>
+                <a:srgbClr val="002060"/>
+              </a:solidFill>
+            </a:endParaRPr>
+          </a:p>
+          <a:p>
+            <a:pPr marL="285750" indent="-285750">
+              <a:buFont typeface="Arial" panose="020B0604020202020204" pitchFamily="34" charset="0"/>
+              <a:buChar char="•"/>
+            </a:pPr>
+            <a:r>
+              <a:rPr lang="en-US" dirty="0" smtClean="0">
+                <a:solidFill>
+                  <a:srgbClr val="002060"/>
+                </a:solidFill>
+              </a:rPr>
+              <a:t>Higher level of abstraction</a:t>
+            </a:r>
+            <a:endParaRPr lang="en-US" dirty="0">
+              <a:solidFill>
+                <a:srgbClr val="002060"/>
+              </a:solidFill>
+            </a:endParaRPr>
+          </a:p>
+        </p:txBody>
+      </p:sp>
+    </p:spTree>
+    <p:extLst>
+      <p:ext uri="{BB962C8B-B14F-4D97-AF65-F5344CB8AC3E}">
+        <p14:creationId xmlns:p14="http://schemas.microsoft.com/office/powerpoint/2010/main" val="3948140843"/>
+      </p:ext>
+    </p:extLst>
+  </p:cSld>
+  <p:clrMapOvr>
+    <a:masterClrMapping/>
+  </p:clrMapOvr>
+  <p:timing>
+    <p:tnLst>
+      <p:par>
+        <p:cTn id="1" dur="indefinite" restart="never" nodeType="tmRoot"/>
+      </p:par>
+    </p:tnLst>
+  </p:timing>
+</p:sld>
+</file>
+
+<file path=ppt/slides/slide9.xml><?xml version="1.0" encoding="utf-8"?>
+<p:sld xmlns:a="http://schemas.openxmlformats.org/drawingml/2006/main" xmlns:r="http://schemas.openxmlformats.org/officeDocument/2006/relationships" xmlns:p="http://schemas.openxmlformats.org/presentationml/2006/main">
+  <p:cSld>
+    <p:spTree>
+      <p:nvGrpSpPr>
+        <p:cNvPr id="1" name=""/>
+        <p:cNvGrpSpPr/>
+        <p:nvPr/>
+      </p:nvGrpSpPr>
+      <p:grpSpPr>
+        <a:xfrm>
+          <a:off x="0" y="0"/>
+          <a:ext cx="0" cy="0"/>
+          <a:chOff x="0" y="0"/>
+          <a:chExt cx="0" cy="0"/>
+        </a:xfrm>
+      </p:grpSpPr>
+      <p:sp>
+        <p:nvSpPr>
+          <p:cNvPr id="2" name="Title 1"/>
+          <p:cNvSpPr>
+            <a:spLocks noGrp="1"/>
+          </p:cNvSpPr>
+          <p:nvPr>
+            <p:ph type="title"/>
+          </p:nvPr>
+        </p:nvSpPr>
+        <p:spPr>
+          <a:xfrm>
+            <a:off x="457200" y="274638"/>
+            <a:ext cx="8686800" cy="1143000"/>
+          </a:xfrm>
+        </p:spPr>
+        <p:txBody>
+          <a:bodyPr/>
+          <a:lstStyle/>
+          <a:p>
+            <a:r>
+              <a:rPr lang="en-US" sz="2000" b="1" dirty="0"/>
+              <a:t>How to </a:t>
+            </a:r>
+            <a:r>
+              <a:rPr lang="en-US" sz="2000" b="1" dirty="0" smtClean="0"/>
+              <a:t>find Kappa? Even faster? MODE EME Simulation</a:t>
+            </a:r>
+            <a:endParaRPr lang="en-US" sz="2000" b="1" dirty="0"/>
+          </a:p>
+        </p:txBody>
+      </p:sp>
+      <p:sp>
+        <p:nvSpPr>
+          <p:cNvPr id="3" name="Footer Placeholder 2"/>
+          <p:cNvSpPr>
+            <a:spLocks noGrp="1"/>
+          </p:cNvSpPr>
+          <p:nvPr>
+            <p:ph type="ftr" sz="quarter" idx="11"/>
+          </p:nvPr>
+        </p:nvSpPr>
+        <p:spPr/>
+        <p:txBody>
+          <a:bodyPr/>
+          <a:lstStyle/>
+          <a:p>
+            <a:r>
+              <a:rPr lang="en-US" altLang="zh-CN" dirty="0" smtClean="0"/>
+              <a:t>Hammood, Mustafa©2019</a:t>
+            </a:r>
+          </a:p>
+        </p:txBody>
+      </p:sp>
+      <p:sp>
+        <p:nvSpPr>
+          <p:cNvPr id="4" name="Slide Number Placeholder 3"/>
+          <p:cNvSpPr>
+            <a:spLocks noGrp="1"/>
+          </p:cNvSpPr>
+          <p:nvPr>
+            <p:ph type="sldNum" sz="quarter" idx="12"/>
+          </p:nvPr>
+        </p:nvSpPr>
+        <p:spPr/>
+        <p:txBody>
+          <a:bodyPr/>
+          <a:lstStyle/>
+          <a:p>
+            <a:fld id="{17BB8376-F12B-CB44-BE0C-DBE0A170CA7C}" type="slidenum">
+              <a:rPr lang="en-US" altLang="zh-CN" smtClean="0"/>
+              <a:pPr/>
+              <a:t>9</a:t>
             </a:fld>
             <a:endParaRPr lang="en-US" altLang="zh-CN"/>
           </a:p>
@@ -21196,344 +21582,6 @@
     <p:extLst>
       <p:ext uri="{BB962C8B-B14F-4D97-AF65-F5344CB8AC3E}">
         <p14:creationId xmlns:p14="http://schemas.microsoft.com/office/powerpoint/2010/main" val="2982080755"/>
-      </p:ext>
-    </p:extLst>
-  </p:cSld>
-  <p:clrMapOvr>
-    <a:masterClrMapping/>
-  </p:clrMapOvr>
-  <p:timing>
-    <p:tnLst>
-      <p:par>
-        <p:cTn id="1" dur="indefinite" restart="never" nodeType="tmRoot"/>
-      </p:par>
-    </p:tnLst>
-  </p:timing>
-</p:sld>
-</file>
-
-<file path=ppt/slides/slide9.xml><?xml version="1.0" encoding="utf-8"?>
-<p:sld xmlns:a="http://schemas.openxmlformats.org/drawingml/2006/main" xmlns:r="http://schemas.openxmlformats.org/officeDocument/2006/relationships" xmlns:p="http://schemas.openxmlformats.org/presentationml/2006/main">
-  <p:cSld>
-    <p:spTree>
-      <p:nvGrpSpPr>
-        <p:cNvPr id="1" name=""/>
-        <p:cNvGrpSpPr/>
-        <p:nvPr/>
-      </p:nvGrpSpPr>
-      <p:grpSpPr>
-        <a:xfrm>
-          <a:off x="0" y="0"/>
-          <a:ext cx="0" cy="0"/>
-          <a:chOff x="0" y="0"/>
-          <a:chExt cx="0" cy="0"/>
-        </a:xfrm>
-      </p:grpSpPr>
-      <p:sp>
-        <p:nvSpPr>
-          <p:cNvPr id="2" name="Title 1"/>
-          <p:cNvSpPr>
-            <a:spLocks noGrp="1"/>
-          </p:cNvSpPr>
-          <p:nvPr>
-            <p:ph type="title"/>
-          </p:nvPr>
-        </p:nvSpPr>
-        <p:spPr>
-          <a:xfrm>
-            <a:off x="457200" y="274638"/>
-            <a:ext cx="8686800" cy="1143000"/>
-          </a:xfrm>
-        </p:spPr>
-        <p:txBody>
-          <a:bodyPr/>
-          <a:lstStyle/>
-          <a:p>
-            <a:r>
-              <a:rPr lang="en-US" sz="2000" b="1" smtClean="0"/>
-              <a:t>What’s new?</a:t>
-            </a:r>
-            <a:endParaRPr lang="en-US" sz="2000" b="1" dirty="0"/>
-          </a:p>
-        </p:txBody>
-      </p:sp>
-      <p:sp>
-        <p:nvSpPr>
-          <p:cNvPr id="3" name="Footer Placeholder 2"/>
-          <p:cNvSpPr>
-            <a:spLocks noGrp="1"/>
-          </p:cNvSpPr>
-          <p:nvPr>
-            <p:ph type="ftr" sz="quarter" idx="11"/>
-          </p:nvPr>
-        </p:nvSpPr>
-        <p:spPr/>
-        <p:txBody>
-          <a:bodyPr/>
-          <a:lstStyle/>
-          <a:p>
-            <a:r>
-              <a:rPr lang="en-US" altLang="zh-CN" dirty="0" smtClean="0"/>
-              <a:t>Hammood, Mustafa©2019</a:t>
-            </a:r>
-          </a:p>
-        </p:txBody>
-      </p:sp>
-      <p:sp>
-        <p:nvSpPr>
-          <p:cNvPr id="4" name="Slide Number Placeholder 3"/>
-          <p:cNvSpPr>
-            <a:spLocks noGrp="1"/>
-          </p:cNvSpPr>
-          <p:nvPr>
-            <p:ph type="sldNum" sz="quarter" idx="12"/>
-          </p:nvPr>
-        </p:nvSpPr>
-        <p:spPr/>
-        <p:txBody>
-          <a:bodyPr/>
-          <a:lstStyle/>
-          <a:p>
-            <a:fld id="{17BB8376-F12B-CB44-BE0C-DBE0A170CA7C}" type="slidenum">
-              <a:rPr lang="en-US" altLang="zh-CN" smtClean="0"/>
-              <a:pPr/>
-              <a:t>9</a:t>
-            </a:fld>
-            <a:endParaRPr lang="en-US" altLang="zh-CN"/>
-          </a:p>
-        </p:txBody>
-      </p:sp>
-      <p:sp>
-        <p:nvSpPr>
-          <p:cNvPr id="6" name="TextBox 5"/>
-          <p:cNvSpPr txBox="1"/>
-          <p:nvPr/>
-        </p:nvSpPr>
-        <p:spPr>
-          <a:xfrm>
-            <a:off x="457200" y="1182103"/>
-            <a:ext cx="8579296" cy="3970318"/>
-          </a:xfrm>
-          <a:prstGeom prst="rect">
-            <a:avLst/>
-          </a:prstGeom>
-          <a:noFill/>
-        </p:spPr>
-        <p:txBody>
-          <a:bodyPr wrap="square" rtlCol="0">
-            <a:spAutoFit/>
-          </a:bodyPr>
-          <a:lstStyle/>
-          <a:p>
-            <a:pPr marL="285750" indent="-285750">
-              <a:buFont typeface="Arial" panose="020B0604020202020204" pitchFamily="34" charset="0"/>
-              <a:buChar char="•"/>
-            </a:pPr>
-            <a:r>
-              <a:rPr lang="en-US" dirty="0" smtClean="0">
-                <a:solidFill>
-                  <a:srgbClr val="002060"/>
-                </a:solidFill>
-              </a:rPr>
-              <a:t>Fully automated flow </a:t>
-            </a:r>
-            <a:r>
-              <a:rPr lang="en-US" dirty="0">
-                <a:solidFill>
-                  <a:srgbClr val="002060"/>
-                </a:solidFill>
-              </a:rPr>
-              <a:t>i</a:t>
-            </a:r>
-            <a:r>
-              <a:rPr lang="en-US" dirty="0" smtClean="0">
-                <a:solidFill>
-                  <a:srgbClr val="002060"/>
-                </a:solidFill>
-              </a:rPr>
-              <a:t>n Python – no need for a MATLAB engine for coupled-mode theory or the setup of any 3</a:t>
-            </a:r>
-            <a:r>
-              <a:rPr lang="en-US" baseline="30000" dirty="0" smtClean="0">
-                <a:solidFill>
-                  <a:srgbClr val="002060"/>
-                </a:solidFill>
-              </a:rPr>
-              <a:t>rd</a:t>
-            </a:r>
-            <a:r>
-              <a:rPr lang="en-US" dirty="0" smtClean="0">
-                <a:solidFill>
-                  <a:srgbClr val="002060"/>
-                </a:solidFill>
-              </a:rPr>
-              <a:t> party tools (other than </a:t>
-            </a:r>
-            <a:r>
-              <a:rPr lang="en-US" dirty="0" err="1" smtClean="0">
-                <a:solidFill>
-                  <a:srgbClr val="002060"/>
-                </a:solidFill>
-              </a:rPr>
-              <a:t>Lumerical</a:t>
-            </a:r>
-            <a:r>
-              <a:rPr lang="en-US" dirty="0" smtClean="0">
-                <a:solidFill>
-                  <a:srgbClr val="002060"/>
-                </a:solidFill>
-              </a:rPr>
-              <a:t>)</a:t>
-            </a:r>
-          </a:p>
-          <a:p>
-            <a:pPr marL="285750" indent="-285750">
-              <a:buFont typeface="Arial" panose="020B0604020202020204" pitchFamily="34" charset="0"/>
-              <a:buChar char="•"/>
-            </a:pPr>
-            <a:endParaRPr lang="en-US" dirty="0" smtClean="0">
-              <a:solidFill>
-                <a:srgbClr val="002060"/>
-              </a:solidFill>
-            </a:endParaRPr>
-          </a:p>
-          <a:p>
-            <a:pPr marL="285750" indent="-285750">
-              <a:buFont typeface="Arial" panose="020B0604020202020204" pitchFamily="34" charset="0"/>
-              <a:buChar char="•"/>
-            </a:pPr>
-            <a:r>
-              <a:rPr lang="en-US" dirty="0">
-                <a:solidFill>
-                  <a:srgbClr val="002060"/>
-                </a:solidFill>
-              </a:rPr>
-              <a:t>Generates an S-parameter file (.</a:t>
-            </a:r>
-            <a:r>
-              <a:rPr lang="en-US" dirty="0" err="1">
-                <a:solidFill>
-                  <a:srgbClr val="002060"/>
-                </a:solidFill>
-              </a:rPr>
-              <a:t>dat</a:t>
-            </a:r>
-            <a:r>
-              <a:rPr lang="en-US" dirty="0">
-                <a:solidFill>
-                  <a:srgbClr val="002060"/>
-                </a:solidFill>
-              </a:rPr>
-              <a:t>) for circuit simulations</a:t>
-            </a:r>
-          </a:p>
-          <a:p>
-            <a:pPr marL="285750" indent="-285750">
-              <a:buFont typeface="Arial" panose="020B0604020202020204" pitchFamily="34" charset="0"/>
-              <a:buChar char="•"/>
-            </a:pPr>
-            <a:endParaRPr lang="en-US" dirty="0" smtClean="0">
-              <a:solidFill>
-                <a:srgbClr val="002060"/>
-              </a:solidFill>
-            </a:endParaRPr>
-          </a:p>
-          <a:p>
-            <a:pPr marL="285750" indent="-285750">
-              <a:buFont typeface="Arial" panose="020B0604020202020204" pitchFamily="34" charset="0"/>
-              <a:buChar char="•"/>
-            </a:pPr>
-            <a:r>
-              <a:rPr lang="en-US" dirty="0" smtClean="0">
-                <a:solidFill>
-                  <a:srgbClr val="002060"/>
-                </a:solidFill>
-              </a:rPr>
-              <a:t>Dual polarizations: TE-TM, compact model includes two-modes support</a:t>
-            </a:r>
-          </a:p>
-          <a:p>
-            <a:pPr marL="285750" indent="-285750">
-              <a:buFont typeface="Arial" panose="020B0604020202020204" pitchFamily="34" charset="0"/>
-              <a:buChar char="•"/>
-            </a:pPr>
-            <a:endParaRPr lang="en-US" dirty="0">
-              <a:solidFill>
-                <a:srgbClr val="002060"/>
-              </a:solidFill>
-            </a:endParaRPr>
-          </a:p>
-          <a:p>
-            <a:pPr marL="285750" indent="-285750">
-              <a:buFont typeface="Arial" panose="020B0604020202020204" pitchFamily="34" charset="0"/>
-              <a:buChar char="•"/>
-            </a:pPr>
-            <a:r>
-              <a:rPr lang="en-US" dirty="0" smtClean="0">
-                <a:solidFill>
-                  <a:srgbClr val="002060"/>
-                </a:solidFill>
-              </a:rPr>
-              <a:t>Two new approaches to find the bandgap and Kappa – reduce FDTD simulation time from more than 5 hours to an improved, to less than a minutes. This was the simulation flow bottleneck.</a:t>
-            </a:r>
-          </a:p>
-          <a:p>
-            <a:pPr marL="285750" indent="-285750">
-              <a:buFont typeface="Arial" panose="020B0604020202020204" pitchFamily="34" charset="0"/>
-              <a:buChar char="•"/>
-            </a:pPr>
-            <a:endParaRPr lang="en-US" dirty="0">
-              <a:solidFill>
-                <a:srgbClr val="002060"/>
-              </a:solidFill>
-            </a:endParaRPr>
-          </a:p>
-          <a:p>
-            <a:pPr marL="285750" indent="-285750">
-              <a:buFont typeface="Arial" panose="020B0604020202020204" pitchFamily="34" charset="0"/>
-              <a:buChar char="•"/>
-            </a:pPr>
-            <a:r>
-              <a:rPr lang="en-US" dirty="0" smtClean="0">
-                <a:solidFill>
-                  <a:srgbClr val="002060"/>
-                </a:solidFill>
-              </a:rPr>
-              <a:t>Accurately predicts and simulates the waveguide’s self-reflection</a:t>
-            </a:r>
-          </a:p>
-          <a:p>
-            <a:endParaRPr lang="en-US" dirty="0">
-              <a:solidFill>
-                <a:srgbClr val="002060"/>
-              </a:solidFill>
-            </a:endParaRPr>
-          </a:p>
-          <a:p>
-            <a:pPr marL="285750" indent="-285750">
-              <a:buFont typeface="Arial" panose="020B0604020202020204" pitchFamily="34" charset="0"/>
-              <a:buChar char="•"/>
-            </a:pPr>
-            <a:r>
-              <a:rPr lang="en-US" dirty="0" smtClean="0">
-                <a:solidFill>
-                  <a:srgbClr val="002060"/>
-                </a:solidFill>
-              </a:rPr>
-              <a:t>Higher level of abstraction</a:t>
-            </a:r>
-            <a:endParaRPr lang="en-US" dirty="0">
-              <a:solidFill>
-                <a:srgbClr val="002060"/>
-              </a:solidFill>
-            </a:endParaRPr>
-          </a:p>
-        </p:txBody>
-      </p:sp>
-    </p:spTree>
-    <p:extLst>
-      <p:ext uri="{BB962C8B-B14F-4D97-AF65-F5344CB8AC3E}">
-        <p14:creationId xmlns:p14="http://schemas.microsoft.com/office/powerpoint/2010/main" val="3948140843"/>
       </p:ext>
     </p:extLst>
   </p:cSld>

</xml_diff>

<commit_message>
core: fix contra DC sim flow
mac compatible
</commit_message>
<xml_diff>
--- a/SiEPIC_Photonics_Package/solvers_simulators/contraDC/Documentation/contraDC_Simulator.pptx
+++ b/SiEPIC_Photonics_Package/solvers_simulators/contraDC/Documentation/contraDC_Simulator.pptx
@@ -7,10 +7,10 @@
     <p:sldMasterId id="2147484533" r:id="rId3"/>
   </p:sldMasterIdLst>
   <p:notesMasterIdLst>
-    <p:notesMasterId r:id="rId22"/>
+    <p:notesMasterId r:id="rId23"/>
   </p:notesMasterIdLst>
   <p:handoutMasterIdLst>
-    <p:handoutMasterId r:id="rId23"/>
+    <p:handoutMasterId r:id="rId24"/>
   </p:handoutMasterIdLst>
   <p:sldIdLst>
     <p:sldId id="426" r:id="rId4"/>
@@ -31,6 +31,7 @@
     <p:sldId id="455" r:id="rId19"/>
     <p:sldId id="473" r:id="rId20"/>
     <p:sldId id="457" r:id="rId21"/>
+    <p:sldId id="474" r:id="rId22"/>
   </p:sldIdLst>
   <p:sldSz cx="9144000" cy="6858000" type="screen4x3"/>
   <p:notesSz cx="6858000" cy="9144000"/>
@@ -245,6 +246,7 @@
           </a:p>
         </c:rich>
       </c:tx>
+      <c:layout/>
       <c:overlay val="0"/>
       <c:spPr>
         <a:noFill/>
@@ -489,6 +491,7 @@
               </a:p>
             </c:rich>
           </c:tx>
+          <c:layout/>
           <c:overlay val="0"/>
           <c:spPr>
             <a:noFill/>
@@ -638,6 +641,7 @@
               </a:p>
             </c:rich>
           </c:tx>
+          <c:layout/>
           <c:overlay val="0"/>
           <c:spPr>
             <a:noFill/>
@@ -747,6 +751,7 @@
               </a:p>
             </c:rich>
           </c:tx>
+          <c:layout/>
           <c:overlay val="0"/>
           <c:spPr>
             <a:noFill/>
@@ -923,6 +928,7 @@
           </a:p>
         </c:rich>
       </c:tx>
+      <c:layout/>
       <c:overlay val="0"/>
       <c:spPr>
         <a:noFill/>
@@ -1175,6 +1181,7 @@
               </a:p>
             </c:rich>
           </c:tx>
+          <c:layout/>
           <c:overlay val="0"/>
           <c:spPr>
             <a:noFill/>
@@ -1324,6 +1331,7 @@
               </a:p>
             </c:rich>
           </c:tx>
+          <c:layout/>
           <c:overlay val="0"/>
           <c:spPr>
             <a:noFill/>
@@ -1433,6 +1441,7 @@
               </a:p>
             </c:rich>
           </c:tx>
+          <c:layout/>
           <c:overlay val="0"/>
           <c:spPr>
             <a:noFill/>
@@ -2765,7 +2774,7 @@
             <a:fld id="{16215AEE-C922-4944-98A7-22910184AC8A}" type="datetimeFigureOut">
               <a:rPr lang="en-US" altLang="zh-CN"/>
               <a:pPr/>
-              <a:t>5/8/2019</a:t>
+              <a:t>5/13/2019</a:t>
             </a:fld>
             <a:endParaRPr lang="en-US" altLang="zh-CN"/>
           </a:p>
@@ -2969,7 +2978,7 @@
             <a:fld id="{CA038EEF-2DAF-6B44-A6B5-C268C3465D47}" type="datetimeFigureOut">
               <a:rPr lang="en-CA" altLang="zh-CN"/>
               <a:pPr/>
-              <a:t>2019-05-08</a:t>
+              <a:t>2019-05-13</a:t>
             </a:fld>
             <a:endParaRPr lang="en-CA" altLang="zh-CN"/>
           </a:p>
@@ -3334,10 +3343,10 @@
           </a:ln>
           <a:extLst>
             <a:ext uri="{FAA26D3D-D897-4be2-8F04-BA451C77F1D7}">
-              <ma14:placeholderFlag xmlns="" xmlns:ma14="http://schemas.microsoft.com/office/mac/drawingml/2011/main" val="1"/>
+              <ma14:placeholderFlag xmlns:ma14="http://schemas.microsoft.com/office/mac/drawingml/2011/main" xmlns="" val="1"/>
             </a:ext>
             <a:ext uri="{909E8E84-426E-40dd-AFC4-6F175D3DCCD1}">
-              <a14:hiddenFill xmlns:a14="http://schemas.microsoft.com/office/drawing/2010/main" xmlns="">
+              <a14:hiddenFill xmlns="" xmlns:a14="http://schemas.microsoft.com/office/drawing/2010/main">
                 <a:solidFill>
                   <a:srgbClr val="FFFFFF"/>
                 </a:solidFill>
@@ -3360,17 +3369,17 @@
           <a:noFill/>
           <a:extLst>
             <a:ext uri="{FAA26D3D-D897-4be2-8F04-BA451C77F1D7}">
-              <ma14:placeholderFlag xmlns="" xmlns:ma14="http://schemas.microsoft.com/office/mac/drawingml/2011/main" val="1"/>
+              <ma14:placeholderFlag xmlns:ma14="http://schemas.microsoft.com/office/mac/drawingml/2011/main" xmlns="" val="1"/>
             </a:ext>
             <a:ext uri="{909E8E84-426E-40dd-AFC4-6F175D3DCCD1}">
-              <a14:hiddenFill xmlns:a14="http://schemas.microsoft.com/office/drawing/2010/main" xmlns="">
+              <a14:hiddenFill xmlns="" xmlns:a14="http://schemas.microsoft.com/office/drawing/2010/main">
                 <a:solidFill>
                   <a:srgbClr val="FFFFFF"/>
                 </a:solidFill>
               </a14:hiddenFill>
             </a:ext>
             <a:ext uri="{91240B29-F687-4f45-9708-019B960494DF}">
-              <a14:hiddenLine xmlns:a14="http://schemas.microsoft.com/office/drawing/2010/main" xmlns="" w="9525">
+              <a14:hiddenLine xmlns="" xmlns:a14="http://schemas.microsoft.com/office/drawing/2010/main" w="9525">
                 <a:solidFill>
                   <a:srgbClr val="000000"/>
                 </a:solidFill>
@@ -3410,14 +3419,14 @@
           <a:noFill/>
           <a:extLst>
             <a:ext uri="{909E8E84-426E-40dd-AFC4-6F175D3DCCD1}">
-              <a14:hiddenFill xmlns:a14="http://schemas.microsoft.com/office/drawing/2010/main" xmlns="">
+              <a14:hiddenFill xmlns="" xmlns:a14="http://schemas.microsoft.com/office/drawing/2010/main">
                 <a:solidFill>
                   <a:srgbClr val="FFFFFF"/>
                 </a:solidFill>
               </a14:hiddenFill>
             </a:ext>
             <a:ext uri="{91240B29-F687-4f45-9708-019B960494DF}">
-              <a14:hiddenLine xmlns:a14="http://schemas.microsoft.com/office/drawing/2010/main" xmlns="" w="9525">
+              <a14:hiddenLine xmlns="" xmlns:a14="http://schemas.microsoft.com/office/drawing/2010/main" w="9525">
                 <a:solidFill>
                   <a:srgbClr val="000000"/>
                 </a:solidFill>
@@ -4284,7 +4293,7 @@
             <a:fld id="{2C31E0B7-D99D-9840-9AA4-AFE996601F1A}" type="datetime1">
               <a:rPr lang="en-US" altLang="zh-CN"/>
               <a:pPr/>
-              <a:t>5/8/2019</a:t>
+              <a:t>5/13/2019</a:t>
             </a:fld>
             <a:endParaRPr lang="en-US" altLang="zh-CN"/>
           </a:p>
@@ -4469,7 +4478,7 @@
             <a:fld id="{8CD81206-CB00-054A-A73E-85C388CF01BA}" type="datetime1">
               <a:rPr lang="en-US" altLang="zh-CN"/>
               <a:pPr/>
-              <a:t>5/8/2019</a:t>
+              <a:t>5/13/2019</a:t>
             </a:fld>
             <a:endParaRPr lang="en-US" altLang="zh-CN"/>
           </a:p>
@@ -4664,7 +4673,7 @@
             <a:fld id="{763C9DB7-BA8E-3248-A482-551635BAD7C2}" type="datetime1">
               <a:rPr lang="en-US" altLang="zh-CN"/>
               <a:pPr/>
-              <a:t>5/8/2019</a:t>
+              <a:t>5/13/2019</a:t>
             </a:fld>
             <a:endParaRPr lang="en-US" altLang="zh-CN"/>
           </a:p>
@@ -4798,7 +4807,7 @@
             <a:fld id="{E076C303-4390-464C-B7E9-6F5306EF3170}" type="datetime1">
               <a:rPr lang="en-US" altLang="zh-CN"/>
               <a:pPr/>
-              <a:t>5/8/2019</a:t>
+              <a:t>5/13/2019</a:t>
             </a:fld>
             <a:endParaRPr lang="en-US" altLang="zh-CN"/>
           </a:p>
@@ -4937,7 +4946,7 @@
             <a:fld id="{5CA8F940-8C0D-5F40-9547-CE421C3644DF}" type="datetime1">
               <a:rPr lang="en-US" altLang="zh-CN" smtClean="0"/>
               <a:pPr/>
-              <a:t>5/8/2019</a:t>
+              <a:t>5/13/2019</a:t>
             </a:fld>
             <a:endParaRPr lang="en-US" altLang="zh-CN"/>
           </a:p>
@@ -5036,14 +5045,14 @@
           </a:ln>
           <a:extLst>
             <a:ext uri="{909E8E84-426E-40dd-AFC4-6F175D3DCCD1}">
-              <a14:hiddenFill xmlns="" xmlns:a14="http://schemas.microsoft.com/office/drawing/2010/main">
+              <a14:hiddenFill xmlns:a14="http://schemas.microsoft.com/office/drawing/2010/main" xmlns="">
                 <a:solidFill>
                   <a:srgbClr val="FFFFFF"/>
                 </a:solidFill>
               </a14:hiddenFill>
             </a:ext>
             <a:ext uri="{91240B29-F687-4f45-9708-019B960494DF}">
-              <a14:hiddenLine xmlns="" xmlns:a14="http://schemas.microsoft.com/office/drawing/2010/main" w="9525">
+              <a14:hiddenLine xmlns:a14="http://schemas.microsoft.com/office/drawing/2010/main" xmlns="" w="9525">
                 <a:solidFill>
                   <a:srgbClr val="000000"/>
                 </a:solidFill>
@@ -5297,14 +5306,14 @@
             </a:ln>
             <a:extLst>
               <a:ext uri="{909E8E84-426E-40dd-AFC4-6F175D3DCCD1}">
-                <a14:hiddenFill xmlns="" xmlns:a14="http://schemas.microsoft.com/office/drawing/2010/main">
+                <a14:hiddenFill xmlns:a14="http://schemas.microsoft.com/office/drawing/2010/main" xmlns="">
                   <a:solidFill>
                     <a:srgbClr val="FFFFFF"/>
                   </a:solidFill>
                 </a14:hiddenFill>
               </a:ext>
               <a:ext uri="{91240B29-F687-4f45-9708-019B960494DF}">
-                <a14:hiddenLine xmlns="" xmlns:a14="http://schemas.microsoft.com/office/drawing/2010/main" w="9525">
+                <a14:hiddenLine xmlns:a14="http://schemas.microsoft.com/office/drawing/2010/main" xmlns="" w="9525">
                   <a:solidFill>
                     <a:srgbClr val="000000"/>
                   </a:solidFill>
@@ -5547,14 +5556,14 @@
           </a:ln>
           <a:extLst>
             <a:ext uri="{909E8E84-426E-40dd-AFC4-6F175D3DCCD1}">
-              <a14:hiddenFill xmlns:a14="http://schemas.microsoft.com/office/drawing/2010/main" xmlns="">
+              <a14:hiddenFill xmlns="" xmlns:a14="http://schemas.microsoft.com/office/drawing/2010/main">
                 <a:solidFill>
                   <a:srgbClr val="FFFFFF"/>
                 </a:solidFill>
               </a14:hiddenFill>
             </a:ext>
             <a:ext uri="{91240B29-F687-4f45-9708-019B960494DF}">
-              <a14:hiddenLine xmlns:a14="http://schemas.microsoft.com/office/drawing/2010/main" xmlns="" w="9525">
+              <a14:hiddenLine xmlns="" xmlns:a14="http://schemas.microsoft.com/office/drawing/2010/main" w="9525">
                 <a:solidFill>
                   <a:srgbClr val="000000"/>
                 </a:solidFill>
@@ -5773,14 +5782,14 @@
             </a:ln>
             <a:extLst>
               <a:ext uri="{909E8E84-426E-40dd-AFC4-6F175D3DCCD1}">
-                <a14:hiddenFill xmlns:a14="http://schemas.microsoft.com/office/drawing/2010/main" xmlns="">
+                <a14:hiddenFill xmlns="" xmlns:a14="http://schemas.microsoft.com/office/drawing/2010/main">
                   <a:solidFill>
                     <a:srgbClr val="FFFFFF"/>
                   </a:solidFill>
                 </a14:hiddenFill>
               </a:ext>
               <a:ext uri="{91240B29-F687-4f45-9708-019B960494DF}">
-                <a14:hiddenLine xmlns:a14="http://schemas.microsoft.com/office/drawing/2010/main" xmlns="" w="9525">
+                <a14:hiddenLine xmlns="" xmlns:a14="http://schemas.microsoft.com/office/drawing/2010/main" w="9525">
                   <a:solidFill>
                     <a:srgbClr val="000000"/>
                   </a:solidFill>
@@ -6137,7 +6146,7 @@
             <a:fld id="{93BCDC2B-E37E-7845-AABF-FC5B18D3CD04}" type="datetime1">
               <a:rPr lang="en-US" altLang="zh-CN" smtClean="0"/>
               <a:pPr/>
-              <a:t>5/8/2019</a:t>
+              <a:t>5/13/2019</a:t>
             </a:fld>
             <a:endParaRPr lang="en-US" altLang="zh-CN"/>
           </a:p>
@@ -6236,14 +6245,14 @@
           </a:ln>
           <a:extLst>
             <a:ext uri="{909E8E84-426E-40dd-AFC4-6F175D3DCCD1}">
-              <a14:hiddenFill xmlns="" xmlns:a14="http://schemas.microsoft.com/office/drawing/2010/main">
+              <a14:hiddenFill xmlns:a14="http://schemas.microsoft.com/office/drawing/2010/main" xmlns="">
                 <a:solidFill>
                   <a:srgbClr val="FFFFFF"/>
                 </a:solidFill>
               </a14:hiddenFill>
             </a:ext>
             <a:ext uri="{91240B29-F687-4f45-9708-019B960494DF}">
-              <a14:hiddenLine xmlns="" xmlns:a14="http://schemas.microsoft.com/office/drawing/2010/main" w="9525">
+              <a14:hiddenLine xmlns:a14="http://schemas.microsoft.com/office/drawing/2010/main" xmlns="" w="9525">
                 <a:solidFill>
                   <a:srgbClr val="000000"/>
                 </a:solidFill>
@@ -6462,14 +6471,14 @@
             </a:ln>
             <a:extLst>
               <a:ext uri="{909E8E84-426E-40dd-AFC4-6F175D3DCCD1}">
-                <a14:hiddenFill xmlns="" xmlns:a14="http://schemas.microsoft.com/office/drawing/2010/main">
+                <a14:hiddenFill xmlns:a14="http://schemas.microsoft.com/office/drawing/2010/main" xmlns="">
                   <a:solidFill>
                     <a:srgbClr val="FFFFFF"/>
                   </a:solidFill>
                 </a14:hiddenFill>
               </a:ext>
               <a:ext uri="{91240B29-F687-4f45-9708-019B960494DF}">
-                <a14:hiddenLine xmlns="" xmlns:a14="http://schemas.microsoft.com/office/drawing/2010/main" w="9525">
+                <a14:hiddenLine xmlns:a14="http://schemas.microsoft.com/office/drawing/2010/main" xmlns="" w="9525">
                   <a:solidFill>
                     <a:srgbClr val="000000"/>
                   </a:solidFill>
@@ -6712,14 +6721,14 @@
           </a:ln>
           <a:extLst>
             <a:ext uri="{909E8E84-426E-40dd-AFC4-6F175D3DCCD1}">
-              <a14:hiddenFill xmlns:a14="http://schemas.microsoft.com/office/drawing/2010/main" xmlns="">
+              <a14:hiddenFill xmlns="" xmlns:a14="http://schemas.microsoft.com/office/drawing/2010/main">
                 <a:solidFill>
                   <a:srgbClr val="FFFFFF"/>
                 </a:solidFill>
               </a14:hiddenFill>
             </a:ext>
             <a:ext uri="{91240B29-F687-4f45-9708-019B960494DF}">
-              <a14:hiddenLine xmlns:a14="http://schemas.microsoft.com/office/drawing/2010/main" xmlns="" w="9525">
+              <a14:hiddenLine xmlns="" xmlns:a14="http://schemas.microsoft.com/office/drawing/2010/main" w="9525">
                 <a:solidFill>
                   <a:srgbClr val="000000"/>
                 </a:solidFill>
@@ -6973,14 +6982,14 @@
             </a:ln>
             <a:extLst>
               <a:ext uri="{909E8E84-426E-40dd-AFC4-6F175D3DCCD1}">
-                <a14:hiddenFill xmlns:a14="http://schemas.microsoft.com/office/drawing/2010/main" xmlns="">
+                <a14:hiddenFill xmlns="" xmlns:a14="http://schemas.microsoft.com/office/drawing/2010/main">
                   <a:solidFill>
                     <a:srgbClr val="FFFFFF"/>
                   </a:solidFill>
                 </a14:hiddenFill>
               </a:ext>
               <a:ext uri="{91240B29-F687-4f45-9708-019B960494DF}">
-                <a14:hiddenLine xmlns:a14="http://schemas.microsoft.com/office/drawing/2010/main" xmlns="" w="9525">
+                <a14:hiddenLine xmlns="" xmlns:a14="http://schemas.microsoft.com/office/drawing/2010/main" w="9525">
                   <a:solidFill>
                     <a:srgbClr val="000000"/>
                   </a:solidFill>
@@ -7207,7 +7216,7 @@
             <a:fld id="{5CA8F940-8C0D-5F40-9547-CE421C3644DF}" type="datetime1">
               <a:rPr lang="en-US" altLang="zh-CN" smtClean="0"/>
               <a:pPr/>
-              <a:t>5/8/2019</a:t>
+              <a:t>5/13/2019</a:t>
             </a:fld>
             <a:endParaRPr lang="en-US" altLang="zh-CN"/>
           </a:p>
@@ -7306,14 +7315,14 @@
           </a:ln>
           <a:extLst>
             <a:ext uri="{909E8E84-426E-40dd-AFC4-6F175D3DCCD1}">
-              <a14:hiddenFill xmlns="" xmlns:a14="http://schemas.microsoft.com/office/drawing/2010/main">
+              <a14:hiddenFill xmlns:a14="http://schemas.microsoft.com/office/drawing/2010/main" xmlns="">
                 <a:solidFill>
                   <a:srgbClr val="FFFFFF"/>
                 </a:solidFill>
               </a14:hiddenFill>
             </a:ext>
             <a:ext uri="{91240B29-F687-4f45-9708-019B960494DF}">
-              <a14:hiddenLine xmlns="" xmlns:a14="http://schemas.microsoft.com/office/drawing/2010/main" w="9525">
+              <a14:hiddenLine xmlns:a14="http://schemas.microsoft.com/office/drawing/2010/main" xmlns="" w="9525">
                 <a:solidFill>
                   <a:srgbClr val="000000"/>
                 </a:solidFill>
@@ -7567,14 +7576,14 @@
             </a:ln>
             <a:extLst>
               <a:ext uri="{909E8E84-426E-40dd-AFC4-6F175D3DCCD1}">
-                <a14:hiddenFill xmlns="" xmlns:a14="http://schemas.microsoft.com/office/drawing/2010/main">
+                <a14:hiddenFill xmlns:a14="http://schemas.microsoft.com/office/drawing/2010/main" xmlns="">
                   <a:solidFill>
                     <a:srgbClr val="FFFFFF"/>
                   </a:solidFill>
                 </a14:hiddenFill>
               </a:ext>
               <a:ext uri="{91240B29-F687-4f45-9708-019B960494DF}">
-                <a14:hiddenLine xmlns="" xmlns:a14="http://schemas.microsoft.com/office/drawing/2010/main" w="9525">
+                <a14:hiddenLine xmlns:a14="http://schemas.microsoft.com/office/drawing/2010/main" xmlns="" w="9525">
                   <a:solidFill>
                     <a:srgbClr val="000000"/>
                   </a:solidFill>
@@ -7817,14 +7826,14 @@
           </a:ln>
           <a:extLst>
             <a:ext uri="{909E8E84-426E-40dd-AFC4-6F175D3DCCD1}">
-              <a14:hiddenFill xmlns:a14="http://schemas.microsoft.com/office/drawing/2010/main" xmlns="">
+              <a14:hiddenFill xmlns="" xmlns:a14="http://schemas.microsoft.com/office/drawing/2010/main">
                 <a:solidFill>
                   <a:srgbClr val="FFFFFF"/>
                 </a:solidFill>
               </a14:hiddenFill>
             </a:ext>
             <a:ext uri="{91240B29-F687-4f45-9708-019B960494DF}">
-              <a14:hiddenLine xmlns:a14="http://schemas.microsoft.com/office/drawing/2010/main" xmlns="" w="9525">
+              <a14:hiddenLine xmlns="" xmlns:a14="http://schemas.microsoft.com/office/drawing/2010/main" w="9525">
                 <a:solidFill>
                   <a:srgbClr val="000000"/>
                 </a:solidFill>
@@ -8208,14 +8217,14 @@
             </a:ln>
             <a:extLst>
               <a:ext uri="{909E8E84-426E-40dd-AFC4-6F175D3DCCD1}">
-                <a14:hiddenFill xmlns:a14="http://schemas.microsoft.com/office/drawing/2010/main" xmlns="">
+                <a14:hiddenFill xmlns="" xmlns:a14="http://schemas.microsoft.com/office/drawing/2010/main">
                   <a:solidFill>
                     <a:srgbClr val="FFFFFF"/>
                   </a:solidFill>
                 </a14:hiddenFill>
               </a:ext>
               <a:ext uri="{91240B29-F687-4f45-9708-019B960494DF}">
-                <a14:hiddenLine xmlns:a14="http://schemas.microsoft.com/office/drawing/2010/main" xmlns="" w="9525">
+                <a14:hiddenLine xmlns="" xmlns:a14="http://schemas.microsoft.com/office/drawing/2010/main" w="9525">
                   <a:solidFill>
                     <a:srgbClr val="000000"/>
                   </a:solidFill>
@@ -8254,7 +8263,7 @@
             <a:fld id="{DD399CBA-90F1-8740-8ACB-6A73FE316139}" type="datetime1">
               <a:rPr lang="en-US" altLang="zh-CN" smtClean="0"/>
               <a:pPr/>
-              <a:t>5/8/2019</a:t>
+              <a:t>5/13/2019</a:t>
             </a:fld>
             <a:endParaRPr lang="en-US" altLang="zh-CN"/>
           </a:p>
@@ -8353,14 +8362,14 @@
           </a:ln>
           <a:extLst>
             <a:ext uri="{909E8E84-426E-40dd-AFC4-6F175D3DCCD1}">
-              <a14:hiddenFill xmlns="" xmlns:a14="http://schemas.microsoft.com/office/drawing/2010/main">
+              <a14:hiddenFill xmlns:a14="http://schemas.microsoft.com/office/drawing/2010/main" xmlns="">
                 <a:solidFill>
                   <a:srgbClr val="FFFFFF"/>
                 </a:solidFill>
               </a14:hiddenFill>
             </a:ext>
             <a:ext uri="{91240B29-F687-4f45-9708-019B960494DF}">
-              <a14:hiddenLine xmlns="" xmlns:a14="http://schemas.microsoft.com/office/drawing/2010/main" w="9525">
+              <a14:hiddenLine xmlns:a14="http://schemas.microsoft.com/office/drawing/2010/main" xmlns="" w="9525">
                 <a:solidFill>
                   <a:srgbClr val="000000"/>
                 </a:solidFill>
@@ -8744,14 +8753,14 @@
             </a:ln>
             <a:extLst>
               <a:ext uri="{909E8E84-426E-40dd-AFC4-6F175D3DCCD1}">
-                <a14:hiddenFill xmlns="" xmlns:a14="http://schemas.microsoft.com/office/drawing/2010/main">
+                <a14:hiddenFill xmlns:a14="http://schemas.microsoft.com/office/drawing/2010/main" xmlns="">
                   <a:solidFill>
                     <a:srgbClr val="FFFFFF"/>
                   </a:solidFill>
                 </a14:hiddenFill>
               </a:ext>
               <a:ext uri="{91240B29-F687-4f45-9708-019B960494DF}">
-                <a14:hiddenLine xmlns="" xmlns:a14="http://schemas.microsoft.com/office/drawing/2010/main" w="9525">
+                <a14:hiddenLine xmlns:a14="http://schemas.microsoft.com/office/drawing/2010/main" xmlns="" w="9525">
                   <a:solidFill>
                     <a:srgbClr val="000000"/>
                   </a:solidFill>
@@ -8829,14 +8838,14 @@
           </a:ln>
           <a:extLst>
             <a:ext uri="{909E8E84-426E-40dd-AFC4-6F175D3DCCD1}">
-              <a14:hiddenFill xmlns="" xmlns:a14="http://schemas.microsoft.com/office/drawing/2010/main">
+              <a14:hiddenFill xmlns:a14="http://schemas.microsoft.com/office/drawing/2010/main" xmlns="">
                 <a:solidFill>
                   <a:srgbClr val="FFFFFF"/>
                 </a:solidFill>
               </a14:hiddenFill>
             </a:ext>
             <a:ext uri="{91240B29-F687-4f45-9708-019B960494DF}">
-              <a14:hiddenLine xmlns="" xmlns:a14="http://schemas.microsoft.com/office/drawing/2010/main" w="9525">
+              <a14:hiddenLine xmlns:a14="http://schemas.microsoft.com/office/drawing/2010/main" xmlns="" w="9525">
                 <a:solidFill>
                   <a:srgbClr val="000000"/>
                 </a:solidFill>
@@ -9055,14 +9064,14 @@
             </a:ln>
             <a:extLst>
               <a:ext uri="{909E8E84-426E-40dd-AFC4-6F175D3DCCD1}">
-                <a14:hiddenFill xmlns="" xmlns:a14="http://schemas.microsoft.com/office/drawing/2010/main">
+                <a14:hiddenFill xmlns:a14="http://schemas.microsoft.com/office/drawing/2010/main" xmlns="">
                   <a:solidFill>
                     <a:srgbClr val="FFFFFF"/>
                   </a:solidFill>
                 </a14:hiddenFill>
               </a:ext>
               <a:ext uri="{91240B29-F687-4f45-9708-019B960494DF}">
-                <a14:hiddenLine xmlns="" xmlns:a14="http://schemas.microsoft.com/office/drawing/2010/main" w="9525">
+                <a14:hiddenLine xmlns:a14="http://schemas.microsoft.com/office/drawing/2010/main" xmlns="" w="9525">
                   <a:solidFill>
                     <a:srgbClr val="000000"/>
                   </a:solidFill>
@@ -9417,7 +9426,7 @@
             <a:fld id="{93BCDC2B-E37E-7845-AABF-FC5B18D3CD04}" type="datetime1">
               <a:rPr lang="en-US" altLang="zh-CN"/>
               <a:pPr/>
-              <a:t>5/8/2019</a:t>
+              <a:t>5/13/2019</a:t>
             </a:fld>
             <a:endParaRPr lang="en-US" altLang="zh-CN"/>
           </a:p>
@@ -9546,14 +9555,14 @@
           </a:ln>
           <a:extLst>
             <a:ext uri="{909E8E84-426E-40dd-AFC4-6F175D3DCCD1}">
-              <a14:hiddenFill xmlns="" xmlns:a14="http://schemas.microsoft.com/office/drawing/2010/main">
+              <a14:hiddenFill xmlns:a14="http://schemas.microsoft.com/office/drawing/2010/main" xmlns="">
                 <a:solidFill>
                   <a:srgbClr val="FFFFFF"/>
                 </a:solidFill>
               </a14:hiddenFill>
             </a:ext>
             <a:ext uri="{91240B29-F687-4f45-9708-019B960494DF}">
-              <a14:hiddenLine xmlns="" xmlns:a14="http://schemas.microsoft.com/office/drawing/2010/main" w="9525">
+              <a14:hiddenLine xmlns:a14="http://schemas.microsoft.com/office/drawing/2010/main" xmlns="" w="9525">
                 <a:solidFill>
                   <a:srgbClr val="000000"/>
                 </a:solidFill>
@@ -9807,14 +9816,14 @@
             </a:ln>
             <a:extLst>
               <a:ext uri="{909E8E84-426E-40dd-AFC4-6F175D3DCCD1}">
-                <a14:hiddenFill xmlns="" xmlns:a14="http://schemas.microsoft.com/office/drawing/2010/main">
+                <a14:hiddenFill xmlns:a14="http://schemas.microsoft.com/office/drawing/2010/main" xmlns="">
                   <a:solidFill>
                     <a:srgbClr val="FFFFFF"/>
                   </a:solidFill>
                 </a14:hiddenFill>
               </a:ext>
               <a:ext uri="{91240B29-F687-4f45-9708-019B960494DF}">
-                <a14:hiddenLine xmlns="" xmlns:a14="http://schemas.microsoft.com/office/drawing/2010/main" w="9525">
+                <a14:hiddenLine xmlns:a14="http://schemas.microsoft.com/office/drawing/2010/main" xmlns="" w="9525">
                   <a:solidFill>
                     <a:srgbClr val="000000"/>
                   </a:solidFill>
@@ -10041,7 +10050,7 @@
             <a:fld id="{5CA8F940-8C0D-5F40-9547-CE421C3644DF}" type="datetime1">
               <a:rPr lang="en-US" altLang="zh-CN"/>
               <a:pPr/>
-              <a:t>5/8/2019</a:t>
+              <a:t>5/13/2019</a:t>
             </a:fld>
             <a:endParaRPr lang="en-US" altLang="zh-CN"/>
           </a:p>
@@ -10170,14 +10179,14 @@
           </a:ln>
           <a:extLst>
             <a:ext uri="{909E8E84-426E-40dd-AFC4-6F175D3DCCD1}">
-              <a14:hiddenFill xmlns="" xmlns:a14="http://schemas.microsoft.com/office/drawing/2010/main">
+              <a14:hiddenFill xmlns:a14="http://schemas.microsoft.com/office/drawing/2010/main" xmlns="">
                 <a:solidFill>
                   <a:srgbClr val="FFFFFF"/>
                 </a:solidFill>
               </a14:hiddenFill>
             </a:ext>
             <a:ext uri="{91240B29-F687-4f45-9708-019B960494DF}">
-              <a14:hiddenLine xmlns="" xmlns:a14="http://schemas.microsoft.com/office/drawing/2010/main" w="9525">
+              <a14:hiddenLine xmlns:a14="http://schemas.microsoft.com/office/drawing/2010/main" xmlns="" w="9525">
                 <a:solidFill>
                   <a:srgbClr val="000000"/>
                 </a:solidFill>
@@ -10561,14 +10570,14 @@
             </a:ln>
             <a:extLst>
               <a:ext uri="{909E8E84-426E-40dd-AFC4-6F175D3DCCD1}">
-                <a14:hiddenFill xmlns="" xmlns:a14="http://schemas.microsoft.com/office/drawing/2010/main">
+                <a14:hiddenFill xmlns:a14="http://schemas.microsoft.com/office/drawing/2010/main" xmlns="">
                   <a:solidFill>
                     <a:srgbClr val="FFFFFF"/>
                   </a:solidFill>
                 </a14:hiddenFill>
               </a:ext>
               <a:ext uri="{91240B29-F687-4f45-9708-019B960494DF}">
-                <a14:hiddenLine xmlns="" xmlns:a14="http://schemas.microsoft.com/office/drawing/2010/main" w="9525">
+                <a14:hiddenLine xmlns:a14="http://schemas.microsoft.com/office/drawing/2010/main" xmlns="" w="9525">
                   <a:solidFill>
                     <a:srgbClr val="000000"/>
                   </a:solidFill>
@@ -10607,7 +10616,7 @@
             <a:fld id="{DD399CBA-90F1-8740-8ACB-6A73FE316139}" type="datetime1">
               <a:rPr lang="en-US" altLang="zh-CN"/>
               <a:pPr/>
-              <a:t>5/8/2019</a:t>
+              <a:t>5/13/2019</a:t>
             </a:fld>
             <a:endParaRPr lang="en-US" altLang="zh-CN"/>
           </a:p>
@@ -10796,7 +10805,7 @@
             <a:fld id="{E65CEB06-13C5-8042-B7D9-86F62FC68B21}" type="datetime1">
               <a:rPr lang="en-US" altLang="zh-CN"/>
               <a:pPr/>
-              <a:t>5/8/2019</a:t>
+              <a:t>5/13/2019</a:t>
             </a:fld>
             <a:endParaRPr lang="en-US" altLang="zh-CN"/>
           </a:p>
@@ -11053,7 +11062,7 @@
             <a:fld id="{2C31E0B7-D99D-9840-9AA4-AFE996601F1A}" type="datetime1">
               <a:rPr lang="en-US" altLang="zh-CN"/>
               <a:pPr/>
-              <a:t>5/8/2019</a:t>
+              <a:t>5/13/2019</a:t>
             </a:fld>
             <a:endParaRPr lang="en-US" altLang="zh-CN"/>
           </a:p>
@@ -11238,7 +11247,7 @@
             <a:fld id="{E65CEB06-13C5-8042-B7D9-86F62FC68B21}" type="datetime1">
               <a:rPr lang="en-US" altLang="zh-CN"/>
               <a:pPr/>
-              <a:t>5/8/2019</a:t>
+              <a:t>5/13/2019</a:t>
             </a:fld>
             <a:endParaRPr lang="en-US" altLang="zh-CN"/>
           </a:p>
@@ -11500,7 +11509,7 @@
             <a:fld id="{385F2447-58C6-0F4D-AFAC-D240FBEAC3D4}" type="datetime1">
               <a:rPr lang="en-US" altLang="zh-CN"/>
               <a:pPr/>
-              <a:t>5/8/2019</a:t>
+              <a:t>5/13/2019</a:t>
             </a:fld>
             <a:endParaRPr lang="en-US" altLang="zh-CN"/>
           </a:p>
@@ -11802,7 +11811,7 @@
             <a:fld id="{E90B6505-6397-EF47-ACB9-9C7F9DC228F7}" type="datetime1">
               <a:rPr lang="en-US" altLang="zh-CN"/>
               <a:pPr/>
-              <a:t>5/8/2019</a:t>
+              <a:t>5/13/2019</a:t>
             </a:fld>
             <a:endParaRPr lang="en-US" altLang="zh-CN"/>
           </a:p>
@@ -12238,7 +12247,7 @@
             <a:fld id="{7DA9DDF0-8E9D-F747-A826-0A16262FD38B}" type="datetime1">
               <a:rPr lang="en-US" altLang="zh-CN"/>
               <a:pPr/>
-              <a:t>5/8/2019</a:t>
+              <a:t>5/13/2019</a:t>
             </a:fld>
             <a:endParaRPr lang="en-US" altLang="zh-CN"/>
           </a:p>
@@ -12372,7 +12381,7 @@
             <a:fld id="{3C451A12-666D-2B4A-9912-EC4A679D5D15}" type="datetime1">
               <a:rPr lang="en-US" altLang="zh-CN"/>
               <a:pPr/>
-              <a:t>5/8/2019</a:t>
+              <a:t>5/13/2019</a:t>
             </a:fld>
             <a:endParaRPr lang="en-US" altLang="zh-CN"/>
           </a:p>
@@ -12484,7 +12493,7 @@
             <a:fld id="{E38B5506-74D3-1544-BC99-3AF1A8C1C66D}" type="datetime1">
               <a:rPr lang="en-US" altLang="zh-CN"/>
               <a:pPr/>
-              <a:t>5/8/2019</a:t>
+              <a:t>5/13/2019</a:t>
             </a:fld>
             <a:endParaRPr lang="en-US" altLang="zh-CN"/>
           </a:p>
@@ -12776,7 +12785,7 @@
             <a:fld id="{E54C1426-CCF5-AF49-BEFF-95069A0371A2}" type="datetime1">
               <a:rPr lang="en-US" altLang="zh-CN"/>
               <a:pPr/>
-              <a:t>5/8/2019</a:t>
+              <a:t>5/13/2019</a:t>
             </a:fld>
             <a:endParaRPr lang="en-US" altLang="zh-CN"/>
           </a:p>
@@ -13051,7 +13060,7 @@
             <a:fld id="{F5DD3FC9-CD0F-8D4D-89C4-5B675B0D57BB}" type="datetime1">
               <a:rPr lang="en-US" altLang="zh-CN"/>
               <a:pPr/>
-              <a:t>5/8/2019</a:t>
+              <a:t>5/13/2019</a:t>
             </a:fld>
             <a:endParaRPr lang="en-US" altLang="zh-CN"/>
           </a:p>
@@ -13236,7 +13245,7 @@
             <a:fld id="{8CD81206-CB00-054A-A73E-85C388CF01BA}" type="datetime1">
               <a:rPr lang="en-US" altLang="zh-CN"/>
               <a:pPr/>
-              <a:t>5/8/2019</a:t>
+              <a:t>5/13/2019</a:t>
             </a:fld>
             <a:endParaRPr lang="en-US" altLang="zh-CN"/>
           </a:p>
@@ -13498,7 +13507,7 @@
             <a:fld id="{385F2447-58C6-0F4D-AFAC-D240FBEAC3D4}" type="datetime1">
               <a:rPr lang="en-US" altLang="zh-CN"/>
               <a:pPr/>
-              <a:t>5/8/2019</a:t>
+              <a:t>5/13/2019</a:t>
             </a:fld>
             <a:endParaRPr lang="en-US" altLang="zh-CN"/>
           </a:p>
@@ -13693,7 +13702,7 @@
             <a:fld id="{763C9DB7-BA8E-3248-A482-551635BAD7C2}" type="datetime1">
               <a:rPr lang="en-US" altLang="zh-CN"/>
               <a:pPr/>
-              <a:t>5/8/2019</a:t>
+              <a:t>5/13/2019</a:t>
             </a:fld>
             <a:endParaRPr lang="en-US" altLang="zh-CN"/>
           </a:p>
@@ -13827,7 +13836,7 @@
             <a:fld id="{E076C303-4390-464C-B7E9-6F5306EF3170}" type="datetime1">
               <a:rPr lang="en-US" altLang="zh-CN"/>
               <a:pPr/>
-              <a:t>5/8/2019</a:t>
+              <a:t>5/13/2019</a:t>
             </a:fld>
             <a:endParaRPr lang="en-US" altLang="zh-CN"/>
           </a:p>
@@ -14129,7 +14138,7 @@
             <a:fld id="{E90B6505-6397-EF47-ACB9-9C7F9DC228F7}" type="datetime1">
               <a:rPr lang="en-US" altLang="zh-CN"/>
               <a:pPr/>
-              <a:t>5/8/2019</a:t>
+              <a:t>5/13/2019</a:t>
             </a:fld>
             <a:endParaRPr lang="en-US" altLang="zh-CN"/>
           </a:p>
@@ -14565,7 +14574,7 @@
             <a:fld id="{7DA9DDF0-8E9D-F747-A826-0A16262FD38B}" type="datetime1">
               <a:rPr lang="en-US" altLang="zh-CN"/>
               <a:pPr/>
-              <a:t>5/8/2019</a:t>
+              <a:t>5/13/2019</a:t>
             </a:fld>
             <a:endParaRPr lang="en-US" altLang="zh-CN"/>
           </a:p>
@@ -14699,7 +14708,7 @@
             <a:fld id="{3C451A12-666D-2B4A-9912-EC4A679D5D15}" type="datetime1">
               <a:rPr lang="en-US" altLang="zh-CN"/>
               <a:pPr/>
-              <a:t>5/8/2019</a:t>
+              <a:t>5/13/2019</a:t>
             </a:fld>
             <a:endParaRPr lang="en-US" altLang="zh-CN"/>
           </a:p>
@@ -14811,7 +14820,7 @@
             <a:fld id="{E38B5506-74D3-1544-BC99-3AF1A8C1C66D}" type="datetime1">
               <a:rPr lang="en-US" altLang="zh-CN"/>
               <a:pPr/>
-              <a:t>5/8/2019</a:t>
+              <a:t>5/13/2019</a:t>
             </a:fld>
             <a:endParaRPr lang="en-US" altLang="zh-CN"/>
           </a:p>
@@ -15103,7 +15112,7 @@
             <a:fld id="{E54C1426-CCF5-AF49-BEFF-95069A0371A2}" type="datetime1">
               <a:rPr lang="en-US" altLang="zh-CN"/>
               <a:pPr/>
-              <a:t>5/8/2019</a:t>
+              <a:t>5/13/2019</a:t>
             </a:fld>
             <a:endParaRPr lang="en-US" altLang="zh-CN"/>
           </a:p>
@@ -15375,7 +15384,7 @@
             <a:fld id="{F5DD3FC9-CD0F-8D4D-89C4-5B675B0D57BB}" type="datetime1">
               <a:rPr lang="en-US" altLang="zh-CN"/>
               <a:pPr/>
-              <a:t>5/8/2019</a:t>
+              <a:t>5/13/2019</a:t>
             </a:fld>
             <a:endParaRPr lang="en-US" altLang="zh-CN"/>
           </a:p>
@@ -15497,17 +15506,17 @@
           </a:ln>
           <a:extLst>
             <a:ext uri="{FAA26D3D-D897-4be2-8F04-BA451C77F1D7}">
-              <ma14:placeholderFlag xmlns="" xmlns:ma14="http://schemas.microsoft.com/office/mac/drawingml/2011/main" val="1"/>
+              <ma14:placeholderFlag xmlns:ma14="http://schemas.microsoft.com/office/mac/drawingml/2011/main" xmlns="" val="1"/>
             </a:ext>
             <a:ext uri="{909E8E84-426E-40dd-AFC4-6F175D3DCCD1}">
-              <a14:hiddenFill xmlns="" xmlns:a14="http://schemas.microsoft.com/office/drawing/2010/main">
+              <a14:hiddenFill xmlns:a14="http://schemas.microsoft.com/office/drawing/2010/main" xmlns="">
                 <a:solidFill>
                   <a:srgbClr val="FFFFFF"/>
                 </a:solidFill>
               </a14:hiddenFill>
             </a:ext>
             <a:ext uri="{91240B29-F687-4f45-9708-019B960494DF}">
-              <a14:hiddenLine xmlns="" xmlns:a14="http://schemas.microsoft.com/office/drawing/2010/main" w="9525">
+              <a14:hiddenLine xmlns:a14="http://schemas.microsoft.com/office/drawing/2010/main" xmlns="" w="9525">
                 <a:solidFill>
                   <a:srgbClr val="000000"/>
                 </a:solidFill>
@@ -15558,17 +15567,17 @@
           </a:ln>
           <a:extLst>
             <a:ext uri="{FAA26D3D-D897-4be2-8F04-BA451C77F1D7}">
-              <ma14:placeholderFlag xmlns="" xmlns:ma14="http://schemas.microsoft.com/office/mac/drawingml/2011/main" val="1"/>
+              <ma14:placeholderFlag xmlns:ma14="http://schemas.microsoft.com/office/mac/drawingml/2011/main" xmlns="" val="1"/>
             </a:ext>
             <a:ext uri="{909E8E84-426E-40dd-AFC4-6F175D3DCCD1}">
-              <a14:hiddenFill xmlns="" xmlns:a14="http://schemas.microsoft.com/office/drawing/2010/main">
+              <a14:hiddenFill xmlns:a14="http://schemas.microsoft.com/office/drawing/2010/main" xmlns="">
                 <a:solidFill>
                   <a:srgbClr val="FFFFFF"/>
                 </a:solidFill>
               </a14:hiddenFill>
             </a:ext>
             <a:ext uri="{91240B29-F687-4f45-9708-019B960494DF}">
-              <a14:hiddenLine xmlns="" xmlns:a14="http://schemas.microsoft.com/office/drawing/2010/main" w="9525">
+              <a14:hiddenLine xmlns:a14="http://schemas.microsoft.com/office/drawing/2010/main" xmlns="" w="9525">
                 <a:solidFill>
                   <a:srgbClr val="000000"/>
                 </a:solidFill>
@@ -15662,7 +15671,7 @@
             <a:fld id="{DF89C5E0-80CB-C842-991E-0650A17D1E84}" type="datetime1">
               <a:rPr lang="en-US" altLang="zh-CN"/>
               <a:pPr/>
-              <a:t>5/8/2019</a:t>
+              <a:t>5/13/2019</a:t>
             </a:fld>
             <a:endParaRPr lang="en-US" altLang="zh-CN"/>
           </a:p>
@@ -16215,17 +16224,17 @@
           </a:ln>
           <a:extLst>
             <a:ext uri="{FAA26D3D-D897-4be2-8F04-BA451C77F1D7}">
-              <ma14:placeholderFlag xmlns:ma14="http://schemas.microsoft.com/office/mac/drawingml/2011/main" xmlns="" val="1"/>
+              <ma14:placeholderFlag xmlns="" xmlns:ma14="http://schemas.microsoft.com/office/mac/drawingml/2011/main" val="1"/>
             </a:ext>
             <a:ext uri="{909E8E84-426E-40dd-AFC4-6F175D3DCCD1}">
-              <a14:hiddenFill xmlns:a14="http://schemas.microsoft.com/office/drawing/2010/main" xmlns="">
+              <a14:hiddenFill xmlns="" xmlns:a14="http://schemas.microsoft.com/office/drawing/2010/main">
                 <a:solidFill>
                   <a:srgbClr val="FFFFFF"/>
                 </a:solidFill>
               </a14:hiddenFill>
             </a:ext>
             <a:ext uri="{91240B29-F687-4f45-9708-019B960494DF}">
-              <a14:hiddenLine xmlns:a14="http://schemas.microsoft.com/office/drawing/2010/main" xmlns="" w="9525">
+              <a14:hiddenLine xmlns="" xmlns:a14="http://schemas.microsoft.com/office/drawing/2010/main" w="9525">
                 <a:solidFill>
                   <a:srgbClr val="000000"/>
                 </a:solidFill>
@@ -16276,17 +16285,17 @@
           </a:ln>
           <a:extLst>
             <a:ext uri="{FAA26D3D-D897-4be2-8F04-BA451C77F1D7}">
-              <ma14:placeholderFlag xmlns:ma14="http://schemas.microsoft.com/office/mac/drawingml/2011/main" xmlns="" val="1"/>
+              <ma14:placeholderFlag xmlns="" xmlns:ma14="http://schemas.microsoft.com/office/mac/drawingml/2011/main" val="1"/>
             </a:ext>
             <a:ext uri="{909E8E84-426E-40dd-AFC4-6F175D3DCCD1}">
-              <a14:hiddenFill xmlns:a14="http://schemas.microsoft.com/office/drawing/2010/main" xmlns="">
+              <a14:hiddenFill xmlns="" xmlns:a14="http://schemas.microsoft.com/office/drawing/2010/main">
                 <a:solidFill>
                   <a:srgbClr val="FFFFFF"/>
                 </a:solidFill>
               </a14:hiddenFill>
             </a:ext>
             <a:ext uri="{91240B29-F687-4f45-9708-019B960494DF}">
-              <a14:hiddenLine xmlns:a14="http://schemas.microsoft.com/office/drawing/2010/main" xmlns="" w="9525">
+              <a14:hiddenLine xmlns="" xmlns:a14="http://schemas.microsoft.com/office/drawing/2010/main" w="9525">
                 <a:solidFill>
                   <a:srgbClr val="000000"/>
                 </a:solidFill>
@@ -16379,7 +16388,7 @@
             <a:fld id="{A47398D4-8B5A-BE43-B588-3D17D5B3482C}" type="datetime1">
               <a:rPr lang="en-US" altLang="zh-CN" smtClean="0"/>
               <a:pPr/>
-              <a:t>5/8/2019</a:t>
+              <a:t>5/13/2019</a:t>
             </a:fld>
             <a:endParaRPr lang="en-US" altLang="zh-CN"/>
           </a:p>
@@ -16928,17 +16937,17 @@
           </a:ln>
           <a:extLst>
             <a:ext uri="{FAA26D3D-D897-4be2-8F04-BA451C77F1D7}">
-              <ma14:placeholderFlag xmlns:ma14="http://schemas.microsoft.com/office/mac/drawingml/2011/main" xmlns="" val="1"/>
+              <ma14:placeholderFlag xmlns="" xmlns:ma14="http://schemas.microsoft.com/office/mac/drawingml/2011/main" val="1"/>
             </a:ext>
             <a:ext uri="{909E8E84-426E-40dd-AFC4-6F175D3DCCD1}">
-              <a14:hiddenFill xmlns:a14="http://schemas.microsoft.com/office/drawing/2010/main" xmlns="">
+              <a14:hiddenFill xmlns="" xmlns:a14="http://schemas.microsoft.com/office/drawing/2010/main">
                 <a:solidFill>
                   <a:srgbClr val="FFFFFF"/>
                 </a:solidFill>
               </a14:hiddenFill>
             </a:ext>
             <a:ext uri="{91240B29-F687-4f45-9708-019B960494DF}">
-              <a14:hiddenLine xmlns:a14="http://schemas.microsoft.com/office/drawing/2010/main" xmlns="" w="9525">
+              <a14:hiddenLine xmlns="" xmlns:a14="http://schemas.microsoft.com/office/drawing/2010/main" w="9525">
                 <a:solidFill>
                   <a:srgbClr val="000000"/>
                 </a:solidFill>
@@ -16989,17 +16998,17 @@
           </a:ln>
           <a:extLst>
             <a:ext uri="{FAA26D3D-D897-4be2-8F04-BA451C77F1D7}">
-              <ma14:placeholderFlag xmlns:ma14="http://schemas.microsoft.com/office/mac/drawingml/2011/main" xmlns="" val="1"/>
+              <ma14:placeholderFlag xmlns="" xmlns:ma14="http://schemas.microsoft.com/office/mac/drawingml/2011/main" val="1"/>
             </a:ext>
             <a:ext uri="{909E8E84-426E-40dd-AFC4-6F175D3DCCD1}">
-              <a14:hiddenFill xmlns:a14="http://schemas.microsoft.com/office/drawing/2010/main" xmlns="">
+              <a14:hiddenFill xmlns="" xmlns:a14="http://schemas.microsoft.com/office/drawing/2010/main">
                 <a:solidFill>
                   <a:srgbClr val="FFFFFF"/>
                 </a:solidFill>
               </a14:hiddenFill>
             </a:ext>
             <a:ext uri="{91240B29-F687-4f45-9708-019B960494DF}">
-              <a14:hiddenLine xmlns:a14="http://schemas.microsoft.com/office/drawing/2010/main" xmlns="" w="9525">
+              <a14:hiddenLine xmlns="" xmlns:a14="http://schemas.microsoft.com/office/drawing/2010/main" w="9525">
                 <a:solidFill>
                   <a:srgbClr val="000000"/>
                 </a:solidFill>
@@ -17093,7 +17102,7 @@
             <a:fld id="{DF89C5E0-80CB-C842-991E-0650A17D1E84}" type="datetime1">
               <a:rPr lang="en-US" altLang="zh-CN"/>
               <a:pPr/>
-              <a:t>5/8/2019</a:t>
+              <a:t>5/13/2019</a:t>
             </a:fld>
             <a:endParaRPr lang="en-US" altLang="zh-CN"/>
           </a:p>
@@ -17662,14 +17671,14 @@
           </a:ln>
           <a:extLst>
             <a:ext uri="{909E8E84-426E-40dd-AFC4-6F175D3DCCD1}">
-              <a14:hiddenFill xmlns:a14="http://schemas.microsoft.com/office/drawing/2010/main" xmlns="">
+              <a14:hiddenFill xmlns="" xmlns:a14="http://schemas.microsoft.com/office/drawing/2010/main">
                 <a:solidFill>
                   <a:srgbClr val="FFFFFF"/>
                 </a:solidFill>
               </a14:hiddenFill>
             </a:ext>
             <a:ext uri="{91240B29-F687-4f45-9708-019B960494DF}">
-              <a14:hiddenLine xmlns:a14="http://schemas.microsoft.com/office/drawing/2010/main" xmlns="" w="9525">
+              <a14:hiddenLine xmlns="" xmlns:a14="http://schemas.microsoft.com/office/drawing/2010/main" w="9525">
                 <a:solidFill>
                   <a:srgbClr val="000000"/>
                 </a:solidFill>
@@ -17714,11 +17723,25 @@
               </a:rPr>
             </a:br>
             <a:r>
-              <a:rPr kumimoji="0" lang="en-US" altLang="zh-CN" sz="2000" dirty="0">
+              <a:rPr kumimoji="0" lang="en-US" altLang="zh-CN" sz="2000" dirty="0" smtClean="0">
                 <a:ea typeface="Times New Roman" charset="0"/>
                 <a:cs typeface="Times New Roman" charset="0"/>
               </a:rPr>
-              <a:t>March, 2019</a:t>
+              <a:t>2019 </a:t>
+            </a:r>
+            <a:r>
+              <a:rPr kumimoji="0" lang="en-US" altLang="zh-CN" sz="2000" dirty="0" err="1" smtClean="0">
+                <a:ea typeface="Times New Roman" charset="0"/>
+                <a:cs typeface="Times New Roman" charset="0"/>
+              </a:rPr>
+              <a:t>SiEPIC</a:t>
+            </a:r>
+            <a:r>
+              <a:rPr kumimoji="0" lang="en-US" altLang="zh-CN" sz="2000" dirty="0" smtClean="0">
+                <a:ea typeface="Times New Roman" charset="0"/>
+                <a:cs typeface="Times New Roman" charset="0"/>
+              </a:rPr>
+              <a:t> Passives Workshop, Vancouver, Canada</a:t>
             </a:r>
             <a:endParaRPr kumimoji="0" lang="en-US" altLang="zh-CN" sz="2000" b="1" dirty="0">
               <a:ea typeface="ＭＳ Ｐゴシック" charset="-128"/>
@@ -17774,14 +17797,14 @@
           </a:ln>
           <a:extLst>
             <a:ext uri="{909E8E84-426E-40dd-AFC4-6F175D3DCCD1}">
-              <a14:hiddenFill xmlns:a14="http://schemas.microsoft.com/office/drawing/2010/main" xmlns="">
+              <a14:hiddenFill xmlns="" xmlns:a14="http://schemas.microsoft.com/office/drawing/2010/main">
                 <a:solidFill>
                   <a:srgbClr val="FFFFFF"/>
                 </a:solidFill>
               </a14:hiddenFill>
             </a:ext>
             <a:ext uri="{91240B29-F687-4f45-9708-019B960494DF}">
-              <a14:hiddenLine xmlns:a14="http://schemas.microsoft.com/office/drawing/2010/main" xmlns="" w="9525">
+              <a14:hiddenLine xmlns="" xmlns:a14="http://schemas.microsoft.com/office/drawing/2010/main" w="9525">
                 <a:solidFill>
                   <a:srgbClr val="000000"/>
                 </a:solidFill>
@@ -21030,6 +21053,404 @@
     <p:extLst>
       <p:ext uri="{BB962C8B-B14F-4D97-AF65-F5344CB8AC3E}">
         <p14:creationId xmlns:p14="http://schemas.microsoft.com/office/powerpoint/2010/main" val="652708281"/>
+      </p:ext>
+    </p:extLst>
+  </p:cSld>
+  <p:clrMapOvr>
+    <a:masterClrMapping/>
+  </p:clrMapOvr>
+</p:sld>
+</file>
+
+<file path=ppt/slides/slide19.xml><?xml version="1.0" encoding="utf-8"?>
+<p:sld xmlns:a="http://schemas.openxmlformats.org/drawingml/2006/main" xmlns:r="http://schemas.openxmlformats.org/officeDocument/2006/relationships" xmlns:p="http://schemas.openxmlformats.org/presentationml/2006/main">
+  <p:cSld>
+    <p:spTree>
+      <p:nvGrpSpPr>
+        <p:cNvPr id="1" name=""/>
+        <p:cNvGrpSpPr/>
+        <p:nvPr/>
+      </p:nvGrpSpPr>
+      <p:grpSpPr>
+        <a:xfrm>
+          <a:off x="0" y="0"/>
+          <a:ext cx="0" cy="0"/>
+          <a:chOff x="0" y="0"/>
+          <a:chExt cx="0" cy="0"/>
+        </a:xfrm>
+      </p:grpSpPr>
+      <p:sp>
+        <p:nvSpPr>
+          <p:cNvPr id="2" name="Title 1"/>
+          <p:cNvSpPr>
+            <a:spLocks noGrp="1"/>
+          </p:cNvSpPr>
+          <p:nvPr>
+            <p:ph type="title"/>
+          </p:nvPr>
+        </p:nvSpPr>
+        <p:spPr>
+          <a:xfrm>
+            <a:off x="457200" y="274638"/>
+            <a:ext cx="8686800" cy="1143000"/>
+          </a:xfrm>
+        </p:spPr>
+        <p:txBody>
+          <a:bodyPr/>
+          <a:lstStyle/>
+          <a:p>
+            <a:r>
+              <a:rPr lang="en-US" sz="2000" b="1" dirty="0" smtClean="0"/>
+              <a:t>Activity:</a:t>
+            </a:r>
+            <a:endParaRPr lang="en-US" sz="2000" b="1" dirty="0"/>
+          </a:p>
+        </p:txBody>
+      </p:sp>
+      <p:sp>
+        <p:nvSpPr>
+          <p:cNvPr id="3" name="Footer Placeholder 2"/>
+          <p:cNvSpPr>
+            <a:spLocks noGrp="1"/>
+          </p:cNvSpPr>
+          <p:nvPr>
+            <p:ph type="ftr" sz="quarter" idx="11"/>
+          </p:nvPr>
+        </p:nvSpPr>
+        <p:spPr/>
+        <p:txBody>
+          <a:bodyPr/>
+          <a:lstStyle/>
+          <a:p>
+            <a:r>
+              <a:rPr lang="en-US" altLang="zh-CN" dirty="0"/>
+              <a:t>Hammood, Mustafa©2019</a:t>
+            </a:r>
+          </a:p>
+        </p:txBody>
+      </p:sp>
+      <p:sp>
+        <p:nvSpPr>
+          <p:cNvPr id="4" name="Slide Number Placeholder 3"/>
+          <p:cNvSpPr>
+            <a:spLocks noGrp="1"/>
+          </p:cNvSpPr>
+          <p:nvPr>
+            <p:ph type="sldNum" sz="quarter" idx="12"/>
+          </p:nvPr>
+        </p:nvSpPr>
+        <p:spPr/>
+        <p:txBody>
+          <a:bodyPr/>
+          <a:lstStyle/>
+          <a:p>
+            <a:fld id="{17BB8376-F12B-CB44-BE0C-DBE0A170CA7C}" type="slidenum">
+              <a:rPr lang="en-US" altLang="zh-CN" smtClean="0"/>
+              <a:pPr/>
+              <a:t>19</a:t>
+            </a:fld>
+            <a:endParaRPr lang="en-US" altLang="zh-CN"/>
+          </a:p>
+        </p:txBody>
+      </p:sp>
+      <p:sp>
+        <p:nvSpPr>
+          <p:cNvPr id="6" name="TextBox 5"/>
+          <p:cNvSpPr txBox="1"/>
+          <p:nvPr/>
+        </p:nvSpPr>
+        <p:spPr>
+          <a:xfrm>
+            <a:off x="457200" y="1182103"/>
+            <a:ext cx="8579296" cy="5170646"/>
+          </a:xfrm>
+          <a:prstGeom prst="rect">
+            <a:avLst/>
+          </a:prstGeom>
+          <a:noFill/>
+        </p:spPr>
+        <p:txBody>
+          <a:bodyPr wrap="square" rtlCol="0">
+            <a:spAutoFit/>
+          </a:bodyPr>
+          <a:lstStyle/>
+          <a:p>
+            <a:pPr marL="285750" indent="-285750">
+              <a:buFont typeface="Arial" panose="020B0604020202020204" pitchFamily="34" charset="0"/>
+              <a:buChar char="•"/>
+            </a:pPr>
+            <a:r>
+              <a:rPr lang="en-US" dirty="0" smtClean="0">
+                <a:solidFill>
+                  <a:srgbClr val="002060"/>
+                </a:solidFill>
+              </a:rPr>
+              <a:t>Design a 4-Channel CWDM filter, Add-drop (de) MUX in INTERCONNECT.</a:t>
+            </a:r>
+            <a:endParaRPr lang="en-US" sz="1400" dirty="0" smtClean="0">
+              <a:solidFill>
+                <a:srgbClr val="002060"/>
+              </a:solidFill>
+            </a:endParaRPr>
+          </a:p>
+          <a:p>
+            <a:endParaRPr lang="en-US" dirty="0">
+              <a:solidFill>
+                <a:srgbClr val="002060"/>
+              </a:solidFill>
+            </a:endParaRPr>
+          </a:p>
+          <a:p>
+            <a:pPr marL="285750" indent="-285750">
+              <a:buFont typeface="Arial" panose="020B0604020202020204" pitchFamily="34" charset="0"/>
+              <a:buChar char="•"/>
+            </a:pPr>
+            <a:r>
+              <a:rPr lang="en-US" dirty="0" smtClean="0">
+                <a:solidFill>
+                  <a:srgbClr val="002060"/>
+                </a:solidFill>
+              </a:rPr>
+              <a:t>Design for ~C-Band.</a:t>
+            </a:r>
+          </a:p>
+          <a:p>
+            <a:pPr marL="285750" indent="-285750">
+              <a:buFont typeface="Arial" panose="020B0604020202020204" pitchFamily="34" charset="0"/>
+              <a:buChar char="•"/>
+            </a:pPr>
+            <a:endParaRPr lang="en-US" dirty="0" smtClean="0">
+              <a:solidFill>
+                <a:srgbClr val="002060"/>
+              </a:solidFill>
+            </a:endParaRPr>
+          </a:p>
+          <a:p>
+            <a:pPr marL="285750" indent="-285750">
+              <a:buFont typeface="Arial" panose="020B0604020202020204" pitchFamily="34" charset="0"/>
+              <a:buChar char="•"/>
+            </a:pPr>
+            <a:r>
+              <a:rPr lang="en-US" dirty="0" smtClean="0">
+                <a:solidFill>
+                  <a:srgbClr val="002060"/>
+                </a:solidFill>
+              </a:rPr>
+              <a:t>Use ITU CWDM grid specs:</a:t>
+            </a:r>
+          </a:p>
+          <a:p>
+            <a:pPr marL="742950" lvl="1" indent="-285750">
+              <a:buFont typeface="Arial" panose="020B0604020202020204" pitchFamily="34" charset="0"/>
+              <a:buChar char="•"/>
+            </a:pPr>
+            <a:r>
+              <a:rPr lang="en-US" dirty="0" smtClean="0">
+                <a:solidFill>
+                  <a:srgbClr val="002060"/>
+                </a:solidFill>
+              </a:rPr>
+              <a:t>Channel bandwidth +/- 6.5 nm (13 nm)</a:t>
+            </a:r>
+          </a:p>
+          <a:p>
+            <a:pPr marL="742950" lvl="1" indent="-285750">
+              <a:buFont typeface="Arial" panose="020B0604020202020204" pitchFamily="34" charset="0"/>
+              <a:buChar char="•"/>
+            </a:pPr>
+            <a:r>
+              <a:rPr lang="en-US" dirty="0" smtClean="0">
+                <a:solidFill>
+                  <a:srgbClr val="002060"/>
+                </a:solidFill>
+              </a:rPr>
+              <a:t>Channel grid (spacing) 20 nm</a:t>
+            </a:r>
+          </a:p>
+          <a:p>
+            <a:pPr marL="742950" lvl="1" indent="-285750">
+              <a:buFont typeface="Arial" panose="020B0604020202020204" pitchFamily="34" charset="0"/>
+              <a:buChar char="•"/>
+            </a:pPr>
+            <a:endParaRPr lang="en-US" dirty="0">
+              <a:solidFill>
+                <a:srgbClr val="002060"/>
+              </a:solidFill>
+            </a:endParaRPr>
+          </a:p>
+          <a:p>
+            <a:pPr marL="285750" indent="-285750">
+              <a:buFont typeface="Arial" panose="020B0604020202020204" pitchFamily="34" charset="0"/>
+              <a:buChar char="•"/>
+            </a:pPr>
+            <a:r>
+              <a:rPr lang="en-US" dirty="0" smtClean="0">
+                <a:solidFill>
+                  <a:srgbClr val="002060"/>
+                </a:solidFill>
+              </a:rPr>
+              <a:t>Think of system architecture</a:t>
+            </a:r>
+          </a:p>
+          <a:p>
+            <a:pPr marL="742950" lvl="1" indent="-285750">
+              <a:buFont typeface="Arial" panose="020B0604020202020204" pitchFamily="34" charset="0"/>
+              <a:buChar char="•"/>
+            </a:pPr>
+            <a:r>
+              <a:rPr lang="en-US" dirty="0" smtClean="0">
+                <a:solidFill>
+                  <a:srgbClr val="002060"/>
+                </a:solidFill>
+              </a:rPr>
+              <a:t>Which waveguide to inject light from? Narrow? Wide?</a:t>
+            </a:r>
+          </a:p>
+          <a:p>
+            <a:pPr marL="742950" lvl="1" indent="-285750">
+              <a:buFont typeface="Arial" panose="020B0604020202020204" pitchFamily="34" charset="0"/>
+              <a:buChar char="•"/>
+            </a:pPr>
+            <a:r>
+              <a:rPr lang="en-US" dirty="0" smtClean="0">
+                <a:solidFill>
+                  <a:srgbClr val="002060"/>
+                </a:solidFill>
+              </a:rPr>
+              <a:t>What is the order to place the contra-DCs in?</a:t>
+            </a:r>
+          </a:p>
+          <a:p>
+            <a:pPr lvl="1"/>
+            <a:endParaRPr lang="en-US" dirty="0">
+              <a:solidFill>
+                <a:srgbClr val="002060"/>
+              </a:solidFill>
+            </a:endParaRPr>
+          </a:p>
+          <a:p>
+            <a:pPr marL="285750" indent="-285750">
+              <a:buFont typeface="Arial" panose="020B0604020202020204" pitchFamily="34" charset="0"/>
+              <a:buChar char="•"/>
+            </a:pPr>
+            <a:r>
+              <a:rPr lang="en-US" dirty="0" smtClean="0">
+                <a:solidFill>
+                  <a:srgbClr val="002060"/>
+                </a:solidFill>
+              </a:rPr>
+              <a:t>Refer to Intel Si-Photonics 100G CWDM4 and 400G CWDM8 Transceivers:</a:t>
+            </a:r>
+          </a:p>
+          <a:p>
+            <a:pPr marL="742950" lvl="1" indent="-285750">
+              <a:buFont typeface="Arial" panose="020B0604020202020204" pitchFamily="34" charset="0"/>
+              <a:buChar char="•"/>
+            </a:pPr>
+            <a:r>
+              <a:rPr lang="en-US" sz="1200" b="1" dirty="0" smtClean="0">
+                <a:solidFill>
+                  <a:srgbClr val="002060"/>
+                </a:solidFill>
+              </a:rPr>
+              <a:t>100G CWDM4</a:t>
+            </a:r>
+            <a:r>
+              <a:rPr lang="en-US" sz="1200" dirty="0" smtClean="0">
+                <a:solidFill>
+                  <a:srgbClr val="002060"/>
+                </a:solidFill>
+              </a:rPr>
+              <a:t>: </a:t>
+            </a:r>
+            <a:r>
+              <a:rPr lang="en-US" sz="1200" dirty="0" smtClean="0">
+                <a:hlinkClick r:id="rId2"/>
+              </a:rPr>
+              <a:t>https</a:t>
+            </a:r>
+            <a:r>
+              <a:rPr lang="en-US" sz="1200" dirty="0">
+                <a:hlinkClick r:id="rId2"/>
+              </a:rPr>
+              <a:t>://</a:t>
+            </a:r>
+            <a:r>
+              <a:rPr lang="en-US" sz="1200" dirty="0" smtClean="0">
+                <a:hlinkClick r:id="rId2"/>
+              </a:rPr>
+              <a:t>www.intel.ca/content/www/ca/en/architecture-and-technology/silicon-photonics/optical-transceiver-100g-cwdm4-qsfp28-brief.html</a:t>
+            </a:r>
+            <a:endParaRPr lang="en-US" sz="1200" dirty="0" smtClean="0"/>
+          </a:p>
+          <a:p>
+            <a:pPr marL="742950" lvl="1" indent="-285750">
+              <a:buFont typeface="Arial" panose="020B0604020202020204" pitchFamily="34" charset="0"/>
+              <a:buChar char="•"/>
+            </a:pPr>
+            <a:endParaRPr lang="en-US" sz="1200" dirty="0" smtClean="0">
+              <a:solidFill>
+                <a:srgbClr val="002060"/>
+              </a:solidFill>
+            </a:endParaRPr>
+          </a:p>
+          <a:p>
+            <a:pPr marL="742950" lvl="1" indent="-285750">
+              <a:buFont typeface="Arial" panose="020B0604020202020204" pitchFamily="34" charset="0"/>
+              <a:buChar char="•"/>
+            </a:pPr>
+            <a:r>
+              <a:rPr lang="en-US" sz="1200" b="1" dirty="0" smtClean="0">
+                <a:solidFill>
+                  <a:srgbClr val="002060"/>
+                </a:solidFill>
+              </a:rPr>
+              <a:t>400G CWDM8</a:t>
+            </a:r>
+            <a:r>
+              <a:rPr lang="en-US" sz="1200" dirty="0" smtClean="0">
+                <a:solidFill>
+                  <a:srgbClr val="002060"/>
+                </a:solidFill>
+              </a:rPr>
+              <a:t>: No public specs yet, only demos: </a:t>
+            </a:r>
+            <a:r>
+              <a:rPr lang="en-US" sz="1200" dirty="0">
+                <a:hlinkClick r:id="rId3"/>
+              </a:rPr>
+              <a:t>https://www.tomshardware.com/news/intel-silicon-photonics-transceiver-400g,39028.html</a:t>
+            </a:r>
+            <a:endParaRPr lang="en-US" sz="1200" dirty="0" smtClean="0">
+              <a:solidFill>
+                <a:srgbClr val="002060"/>
+              </a:solidFill>
+            </a:endParaRPr>
+          </a:p>
+          <a:p>
+            <a:pPr marL="742950" lvl="1" indent="-285750">
+              <a:buFont typeface="Arial" panose="020B0604020202020204" pitchFamily="34" charset="0"/>
+              <a:buChar char="•"/>
+            </a:pPr>
+            <a:endParaRPr lang="en-US" dirty="0">
+              <a:solidFill>
+                <a:srgbClr val="002060"/>
+              </a:solidFill>
+            </a:endParaRPr>
+          </a:p>
+          <a:p>
+            <a:endParaRPr lang="en-US" dirty="0" smtClean="0">
+              <a:solidFill>
+                <a:srgbClr val="002060"/>
+              </a:solidFill>
+            </a:endParaRPr>
+          </a:p>
+        </p:txBody>
+      </p:sp>
+    </p:spTree>
+    <p:extLst>
+      <p:ext uri="{BB962C8B-B14F-4D97-AF65-F5344CB8AC3E}">
+        <p14:creationId xmlns:p14="http://schemas.microsoft.com/office/powerpoint/2010/main" val="3495145130"/>
       </p:ext>
     </p:extLst>
   </p:cSld>
@@ -24605,6 +25026,81 @@
           </a:prstGeom>
         </p:spPr>
       </p:pic>
+      <p:sp>
+        <p:nvSpPr>
+          <p:cNvPr id="10" name="Rectangle 9">
+            <a:extLst>
+              <a:ext uri="{FF2B5EF4-FFF2-40B4-BE49-F238E27FC236}">
+                <a16:creationId xmlns:a16="http://schemas.microsoft.com/office/drawing/2014/main" id="{0C69B568-A866-4660-A711-B234B241B3E4}"/>
+              </a:ext>
+            </a:extLst>
+          </p:cNvPr>
+          <p:cNvSpPr/>
+          <p:nvPr/>
+        </p:nvSpPr>
+        <p:spPr>
+          <a:xfrm>
+            <a:off x="7010401" y="5702682"/>
+            <a:ext cx="2144026" cy="246221"/>
+          </a:xfrm>
+          <a:prstGeom prst="rect">
+            <a:avLst/>
+          </a:prstGeom>
+        </p:spPr>
+        <p:txBody>
+          <a:bodyPr wrap="square">
+            <a:spAutoFit/>
+          </a:bodyPr>
+          <a:lstStyle/>
+          <a:p>
+            <a:r>
+              <a:rPr lang="en-CA" sz="1000" dirty="0" smtClean="0">
+                <a:solidFill>
+                  <a:schemeClr val="bg1"/>
+                </a:solidFill>
+              </a:rPr>
+              <a:t>*Fig. </a:t>
+            </a:r>
+            <a:r>
+              <a:rPr lang="en-CA" sz="1000" dirty="0">
+                <a:solidFill>
+                  <a:schemeClr val="bg1"/>
+                </a:solidFill>
+              </a:rPr>
+              <a:t>f</a:t>
+            </a:r>
+            <a:r>
+              <a:rPr lang="en-CA" sz="1000" dirty="0" smtClean="0">
+                <a:solidFill>
+                  <a:schemeClr val="bg1"/>
+                </a:solidFill>
+              </a:rPr>
+              <a:t>rom </a:t>
+            </a:r>
+            <a:r>
+              <a:rPr lang="en-CA" sz="1000" dirty="0" err="1" smtClean="0">
+                <a:solidFill>
+                  <a:schemeClr val="bg1"/>
+                </a:solidFill>
+              </a:rPr>
+              <a:t>J.St</a:t>
+            </a:r>
+            <a:r>
+              <a:rPr lang="en-CA" sz="1000" dirty="0" smtClean="0">
+                <a:solidFill>
+                  <a:schemeClr val="bg1"/>
+                </a:solidFill>
+              </a:rPr>
+              <a:t>.-Yves M.Sc. Thesis</a:t>
+            </a:r>
+            <a:endParaRPr lang="en-CA" sz="1000" dirty="0">
+              <a:solidFill>
+                <a:schemeClr val="bg1"/>
+              </a:solidFill>
+            </a:endParaRPr>
+          </a:p>
+        </p:txBody>
+      </p:sp>
     </p:spTree>
     <p:extLst>
       <p:ext uri="{BB962C8B-B14F-4D97-AF65-F5344CB8AC3E}">

</xml_diff>